<commit_message>
Added Revenue of Hyderabad
</commit_message>
<xml_diff>
--- a/Tourism Challenge by Codebasics.pptx
+++ b/Tourism Challenge by Codebasics.pptx
@@ -9102,8 +9102,8 @@
           </a:p>
         </p:txBody>
       </p:sp>
-      <mc:AlternateContent xmlns:mc="http://schemas.openxmlformats.org/markup-compatibility/2006">
-        <mc:Choice xmlns:we="http://schemas.microsoft.com/office/webextensions/webextension/2010/11" xmlns:pca="http://schemas.microsoft.com/office/powerpoint/2013/contentapp" Requires="we pca">
+      <mc:AlternateContent xmlns:mc="http://schemas.openxmlformats.org/markup-compatibility/2006" xmlns:we="http://schemas.microsoft.com/office/webextensions/webextension/2010/11" xmlns:pca="http://schemas.microsoft.com/office/powerpoint/2013/contentapp">
+        <mc:Choice Requires="we pca">
           <p:graphicFrame>
             <p:nvGraphicFramePr>
               <p:cNvPr id="6" name="Add-in 5" title="Microsoft Power BI">
@@ -9135,7 +9135,7 @@
             </a:graphic>
           </p:graphicFrame>
         </mc:Choice>
-        <mc:Fallback>
+        <mc:Fallback xmlns="">
           <p:pic>
             <p:nvPicPr>
               <p:cNvPr id="6" name="Add-in 5" title="Microsoft Power BI">
@@ -9212,8 +9212,8 @@
           </a:p>
         </p:txBody>
       </p:sp>
-      <mc:AlternateContent xmlns:mc="http://schemas.openxmlformats.org/markup-compatibility/2006">
-        <mc:Choice xmlns:we="http://schemas.microsoft.com/office/webextensions/webextension/2010/11" xmlns:pca="http://schemas.microsoft.com/office/powerpoint/2013/contentapp" Requires="we pca">
+      <mc:AlternateContent xmlns:mc="http://schemas.openxmlformats.org/markup-compatibility/2006" xmlns:we="http://schemas.microsoft.com/office/webextensions/webextension/2010/11" xmlns:pca="http://schemas.microsoft.com/office/powerpoint/2013/contentapp">
+        <mc:Choice Requires="we pca">
           <p:graphicFrame>
             <p:nvGraphicFramePr>
               <p:cNvPr id="5" name="Add-in 4" title="Microsoft Power BI">
@@ -9245,7 +9245,7 @@
             </a:graphic>
           </p:graphicFrame>
         </mc:Choice>
-        <mc:Fallback>
+        <mc:Fallback xmlns="">
           <p:pic>
             <p:nvPicPr>
               <p:cNvPr id="5" name="Add-in 4" title="Microsoft Power BI">
@@ -9278,8 +9278,8 @@
           </p:pic>
         </mc:Fallback>
       </mc:AlternateContent>
-      <mc:AlternateContent xmlns:mc="http://schemas.openxmlformats.org/markup-compatibility/2006">
-        <mc:Choice xmlns:we="http://schemas.microsoft.com/office/webextensions/webextension/2010/11" xmlns:pca="http://schemas.microsoft.com/office/powerpoint/2013/contentapp" Requires="we pca">
+      <mc:AlternateContent xmlns:mc="http://schemas.openxmlformats.org/markup-compatibility/2006" xmlns:we="http://schemas.microsoft.com/office/webextensions/webextension/2010/11" xmlns:pca="http://schemas.microsoft.com/office/powerpoint/2013/contentapp">
+        <mc:Choice Requires="we pca">
           <p:graphicFrame>
             <p:nvGraphicFramePr>
               <p:cNvPr id="7" name="Add-in 6" title="Microsoft Power BI">
@@ -9311,7 +9311,7 @@
             </a:graphic>
           </p:graphicFrame>
         </mc:Choice>
-        <mc:Fallback>
+        <mc:Fallback xmlns="">
           <p:pic>
             <p:nvPicPr>
               <p:cNvPr id="7" name="Add-in 6" title="Microsoft Power BI">
@@ -9388,8 +9388,8 @@
           </a:p>
         </p:txBody>
       </p:sp>
-      <mc:AlternateContent xmlns:mc="http://schemas.openxmlformats.org/markup-compatibility/2006">
-        <mc:Choice xmlns:we="http://schemas.microsoft.com/office/webextensions/webextension/2010/11" xmlns:pca="http://schemas.microsoft.com/office/powerpoint/2013/contentapp" Requires="we pca">
+      <mc:AlternateContent xmlns:mc="http://schemas.openxmlformats.org/markup-compatibility/2006" xmlns:we="http://schemas.microsoft.com/office/webextensions/webextension/2010/11" xmlns:pca="http://schemas.microsoft.com/office/powerpoint/2013/contentapp">
+        <mc:Choice Requires="we pca">
           <p:graphicFrame>
             <p:nvGraphicFramePr>
               <p:cNvPr id="15" name="Add-in 14" title="Microsoft Power BI">
@@ -9421,7 +9421,7 @@
             </a:graphic>
           </p:graphicFrame>
         </mc:Choice>
-        <mc:Fallback>
+        <mc:Fallback xmlns="">
           <p:pic>
             <p:nvPicPr>
               <p:cNvPr id="15" name="Add-in 14" title="Microsoft Power BI">
@@ -10682,8 +10682,8 @@
           </a:p>
         </p:txBody>
       </p:sp>
-      <mc:AlternateContent xmlns:mc="http://schemas.openxmlformats.org/markup-compatibility/2006">
-        <mc:Choice xmlns:we="http://schemas.microsoft.com/office/webextensions/webextension/2010/11" xmlns:pca="http://schemas.microsoft.com/office/powerpoint/2013/contentapp" Requires="we pca">
+      <mc:AlternateContent xmlns:mc="http://schemas.openxmlformats.org/markup-compatibility/2006" xmlns:we="http://schemas.microsoft.com/office/webextensions/webextension/2010/11" xmlns:pca="http://schemas.microsoft.com/office/powerpoint/2013/contentapp">
+        <mc:Choice Requires="we pca">
           <p:graphicFrame>
             <p:nvGraphicFramePr>
               <p:cNvPr id="5" name="Add-in 4" title="Microsoft Power BI">
@@ -10709,7 +10709,7 @@
             </a:graphic>
           </p:graphicFrame>
         </mc:Choice>
-        <mc:Fallback>
+        <mc:Fallback xmlns="">
           <p:pic>
             <p:nvPicPr>
               <p:cNvPr id="5" name="Add-in 4" title="Microsoft Power BI">
@@ -10742,8 +10742,8 @@
           </p:pic>
         </mc:Fallback>
       </mc:AlternateContent>
-      <mc:AlternateContent xmlns:mc="http://schemas.openxmlformats.org/markup-compatibility/2006">
-        <mc:Choice xmlns:we="http://schemas.microsoft.com/office/webextensions/webextension/2010/11" xmlns:pca="http://schemas.microsoft.com/office/powerpoint/2013/contentapp" Requires="we pca">
+      <mc:AlternateContent xmlns:mc="http://schemas.openxmlformats.org/markup-compatibility/2006" xmlns:we="http://schemas.microsoft.com/office/webextensions/webextension/2010/11" xmlns:pca="http://schemas.microsoft.com/office/powerpoint/2013/contentapp">
+        <mc:Choice Requires="we pca">
           <p:graphicFrame>
             <p:nvGraphicFramePr>
               <p:cNvPr id="7" name="Add-in 6" title="Microsoft Power BI">
@@ -10775,7 +10775,7 @@
             </a:graphic>
           </p:graphicFrame>
         </mc:Choice>
-        <mc:Fallback>
+        <mc:Fallback xmlns="">
           <p:pic>
             <p:nvPicPr>
               <p:cNvPr id="7" name="Add-in 6" title="Microsoft Power BI">
@@ -10852,8 +10852,8 @@
           </a:p>
         </p:txBody>
       </p:sp>
-      <mc:AlternateContent xmlns:mc="http://schemas.openxmlformats.org/markup-compatibility/2006">
-        <mc:Choice xmlns:we="http://schemas.microsoft.com/office/webextensions/webextension/2010/11" xmlns:pca="http://schemas.microsoft.com/office/powerpoint/2013/contentapp" Requires="we pca">
+      <mc:AlternateContent xmlns:mc="http://schemas.openxmlformats.org/markup-compatibility/2006" xmlns:we="http://schemas.microsoft.com/office/webextensions/webextension/2010/11" xmlns:pca="http://schemas.microsoft.com/office/powerpoint/2013/contentapp">
+        <mc:Choice Requires="we pca">
           <p:graphicFrame>
             <p:nvGraphicFramePr>
               <p:cNvPr id="15" name="Add-in 14" title="Microsoft Power BI">
@@ -10879,7 +10879,7 @@
             </a:graphic>
           </p:graphicFrame>
         </mc:Choice>
-        <mc:Fallback>
+        <mc:Fallback xmlns="">
           <p:pic>
             <p:nvPicPr>
               <p:cNvPr id="15" name="Add-in 14" title="Microsoft Power BI">
@@ -11757,8 +11757,8 @@
           </a:prstGeom>
         </p:spPr>
       </p:pic>
-      <mc:AlternateContent xmlns:mc="http://schemas.openxmlformats.org/markup-compatibility/2006">
-        <mc:Choice xmlns:we="http://schemas.microsoft.com/office/webextensions/webextension/2010/11" xmlns:pca="http://schemas.microsoft.com/office/powerpoint/2013/contentapp" Requires="we pca">
+      <mc:AlternateContent xmlns:mc="http://schemas.openxmlformats.org/markup-compatibility/2006" xmlns:we="http://schemas.microsoft.com/office/webextensions/webextension/2010/11" xmlns:pca="http://schemas.microsoft.com/office/powerpoint/2013/contentapp">
+        <mc:Choice Requires="we pca">
           <p:graphicFrame>
             <p:nvGraphicFramePr>
               <p:cNvPr id="17" name="Add-in 16" title="Microsoft Power BI">
@@ -11790,7 +11790,7 @@
             </a:graphic>
           </p:graphicFrame>
         </mc:Choice>
-        <mc:Fallback>
+        <mc:Fallback xmlns="">
           <p:pic>
             <p:nvPicPr>
               <p:cNvPr id="17" name="Add-in 16" title="Microsoft Power BI">
@@ -12248,8 +12248,8 @@
           </a:prstGeom>
         </p:spPr>
       </p:pic>
-      <mc:AlternateContent xmlns:mc="http://schemas.openxmlformats.org/markup-compatibility/2006">
-        <mc:Choice xmlns:we="http://schemas.microsoft.com/office/webextensions/webextension/2010/11" xmlns:pca="http://schemas.microsoft.com/office/powerpoint/2013/contentapp" Requires="we pca">
+      <mc:AlternateContent xmlns:mc="http://schemas.openxmlformats.org/markup-compatibility/2006" xmlns:we="http://schemas.microsoft.com/office/webextensions/webextension/2010/11" xmlns:pca="http://schemas.microsoft.com/office/powerpoint/2013/contentapp">
+        <mc:Choice Requires="we pca">
           <p:graphicFrame>
             <p:nvGraphicFramePr>
               <p:cNvPr id="17" name="Add-in 16" title="Microsoft Power BI">
@@ -12281,7 +12281,7 @@
             </a:graphic>
           </p:graphicFrame>
         </mc:Choice>
-        <mc:Fallback>
+        <mc:Fallback xmlns="">
           <p:pic>
             <p:nvPicPr>
               <p:cNvPr id="17" name="Add-in 16" title="Microsoft Power BI">
@@ -12589,8 +12589,8 @@
           </a:p>
         </p:txBody>
       </p:sp>
-      <mc:AlternateContent xmlns:mc="http://schemas.openxmlformats.org/markup-compatibility/2006">
-        <mc:Choice xmlns:we="http://schemas.microsoft.com/office/webextensions/webextension/2010/11" xmlns:pca="http://schemas.microsoft.com/office/powerpoint/2013/contentapp" Requires="we pca">
+      <mc:AlternateContent xmlns:mc="http://schemas.openxmlformats.org/markup-compatibility/2006" xmlns:we="http://schemas.microsoft.com/office/webextensions/webextension/2010/11" xmlns:pca="http://schemas.microsoft.com/office/powerpoint/2013/contentapp">
+        <mc:Choice Requires="we pca">
           <p:graphicFrame>
             <p:nvGraphicFramePr>
               <p:cNvPr id="18" name="Add-in 17" title="Microsoft Power BI">
@@ -12622,7 +12622,7 @@
             </a:graphic>
           </p:graphicFrame>
         </mc:Choice>
-        <mc:Fallback>
+        <mc:Fallback xmlns="">
           <p:pic>
             <p:nvPicPr>
               <p:cNvPr id="18" name="Add-in 17" title="Microsoft Power BI">
@@ -12930,8 +12930,8 @@
           </a:p>
         </p:txBody>
       </p:sp>
-      <mc:AlternateContent xmlns:mc="http://schemas.openxmlformats.org/markup-compatibility/2006">
-        <mc:Choice xmlns:we="http://schemas.microsoft.com/office/webextensions/webextension/2010/11" xmlns:pca="http://schemas.microsoft.com/office/powerpoint/2013/contentapp" Requires="we pca">
+      <mc:AlternateContent xmlns:mc="http://schemas.openxmlformats.org/markup-compatibility/2006" xmlns:we="http://schemas.microsoft.com/office/webextensions/webextension/2010/11" xmlns:pca="http://schemas.microsoft.com/office/powerpoint/2013/contentapp">
+        <mc:Choice Requires="we pca">
           <p:graphicFrame>
             <p:nvGraphicFramePr>
               <p:cNvPr id="20" name="Add-in 19" title="Microsoft Power BI">
@@ -12963,7 +12963,7 @@
             </a:graphic>
           </p:graphicFrame>
         </mc:Choice>
-        <mc:Fallback>
+        <mc:Fallback xmlns="">
           <p:pic>
             <p:nvPicPr>
               <p:cNvPr id="20" name="Add-in 19" title="Microsoft Power BI">
@@ -13271,8 +13271,8 @@
           </a:p>
         </p:txBody>
       </p:sp>
-      <mc:AlternateContent xmlns:mc="http://schemas.openxmlformats.org/markup-compatibility/2006">
-        <mc:Choice xmlns:we="http://schemas.microsoft.com/office/webextensions/webextension/2010/11" xmlns:pca="http://schemas.microsoft.com/office/powerpoint/2013/contentapp" Requires="we pca">
+      <mc:AlternateContent xmlns:mc="http://schemas.openxmlformats.org/markup-compatibility/2006" xmlns:we="http://schemas.microsoft.com/office/webextensions/webextension/2010/11" xmlns:pca="http://schemas.microsoft.com/office/powerpoint/2013/contentapp">
+        <mc:Choice Requires="we pca">
           <p:graphicFrame>
             <p:nvGraphicFramePr>
               <p:cNvPr id="21" name="Add-in 20" title="Microsoft Power BI">
@@ -13304,7 +13304,7 @@
             </a:graphic>
           </p:graphicFrame>
         </mc:Choice>
-        <mc:Fallback>
+        <mc:Fallback xmlns="">
           <p:pic>
             <p:nvPicPr>
               <p:cNvPr id="21" name="Add-in 20" title="Microsoft Power BI">
@@ -13780,8 +13780,8 @@
           </a:prstGeom>
         </p:spPr>
       </p:pic>
-      <mc:AlternateContent xmlns:mc="http://schemas.openxmlformats.org/markup-compatibility/2006">
-        <mc:Choice xmlns:we="http://schemas.microsoft.com/office/webextensions/webextension/2010/11" xmlns:pca="http://schemas.microsoft.com/office/powerpoint/2013/contentapp" Requires="we pca">
+      <mc:AlternateContent xmlns:mc="http://schemas.openxmlformats.org/markup-compatibility/2006" xmlns:we="http://schemas.microsoft.com/office/webextensions/webextension/2010/11" xmlns:pca="http://schemas.microsoft.com/office/powerpoint/2013/contentapp">
+        <mc:Choice Requires="we pca">
           <p:graphicFrame>
             <p:nvGraphicFramePr>
               <p:cNvPr id="17" name="Add-in 16" title="Microsoft Power BI">
@@ -13807,7 +13807,7 @@
             </a:graphic>
           </p:graphicFrame>
         </mc:Choice>
-        <mc:Fallback>
+        <mc:Fallback xmlns="">
           <p:pic>
             <p:nvPicPr>
               <p:cNvPr id="17" name="Add-in 16" title="Microsoft Power BI">
@@ -14115,8 +14115,8 @@
           </a:p>
         </p:txBody>
       </p:sp>
-      <mc:AlternateContent xmlns:mc="http://schemas.openxmlformats.org/markup-compatibility/2006">
-        <mc:Choice xmlns:we="http://schemas.microsoft.com/office/webextensions/webextension/2010/11" xmlns:pca="http://schemas.microsoft.com/office/powerpoint/2013/contentapp" Requires="we pca">
+      <mc:AlternateContent xmlns:mc="http://schemas.openxmlformats.org/markup-compatibility/2006" xmlns:we="http://schemas.microsoft.com/office/webextensions/webextension/2010/11" xmlns:pca="http://schemas.microsoft.com/office/powerpoint/2013/contentapp">
+        <mc:Choice Requires="we pca">
           <p:graphicFrame>
             <p:nvGraphicFramePr>
               <p:cNvPr id="18" name="Add-in 17" title="Microsoft Power BI">
@@ -14148,7 +14148,7 @@
             </a:graphic>
           </p:graphicFrame>
         </mc:Choice>
-        <mc:Fallback>
+        <mc:Fallback xmlns="">
           <p:pic>
             <p:nvPicPr>
               <p:cNvPr id="18" name="Add-in 17" title="Microsoft Power BI">
@@ -14456,8 +14456,8 @@
           </a:p>
         </p:txBody>
       </p:sp>
-      <mc:AlternateContent xmlns:mc="http://schemas.openxmlformats.org/markup-compatibility/2006">
-        <mc:Choice xmlns:we="http://schemas.microsoft.com/office/webextensions/webextension/2010/11" xmlns:pca="http://schemas.microsoft.com/office/powerpoint/2013/contentapp" Requires="we pca">
+      <mc:AlternateContent xmlns:mc="http://schemas.openxmlformats.org/markup-compatibility/2006" xmlns:we="http://schemas.microsoft.com/office/webextensions/webextension/2010/11" xmlns:pca="http://schemas.microsoft.com/office/powerpoint/2013/contentapp">
+        <mc:Choice Requires="we pca">
           <p:graphicFrame>
             <p:nvGraphicFramePr>
               <p:cNvPr id="20" name="Add-in 19" title="Microsoft Power BI">
@@ -14483,7 +14483,7 @@
             </a:graphic>
           </p:graphicFrame>
         </mc:Choice>
-        <mc:Fallback>
+        <mc:Fallback xmlns="">
           <p:pic>
             <p:nvPicPr>
               <p:cNvPr id="20" name="Add-in 19" title="Microsoft Power BI">
@@ -14791,8 +14791,8 @@
           </a:p>
         </p:txBody>
       </p:sp>
-      <mc:AlternateContent xmlns:mc="http://schemas.openxmlformats.org/markup-compatibility/2006">
-        <mc:Choice xmlns:we="http://schemas.microsoft.com/office/webextensions/webextension/2010/11" xmlns:pca="http://schemas.microsoft.com/office/powerpoint/2013/contentapp" Requires="we pca">
+      <mc:AlternateContent xmlns:mc="http://schemas.openxmlformats.org/markup-compatibility/2006" xmlns:we="http://schemas.microsoft.com/office/webextensions/webextension/2010/11" xmlns:pca="http://schemas.microsoft.com/office/powerpoint/2013/contentapp">
+        <mc:Choice Requires="we pca">
           <p:graphicFrame>
             <p:nvGraphicFramePr>
               <p:cNvPr id="5" name="Add-in 4" title="Microsoft Power BI">
@@ -14824,7 +14824,7 @@
             </a:graphic>
           </p:graphicFrame>
         </mc:Choice>
-        <mc:Fallback>
+        <mc:Fallback xmlns="">
           <p:pic>
             <p:nvPicPr>
               <p:cNvPr id="5" name="Add-in 4" title="Microsoft Power BI">
@@ -17297,31 +17297,31 @@
         </p:style>
         <p:txBody>
           <a:bodyPr>
-            <a:normAutofit lnSpcReduction="10000"/>
+            <a:normAutofit/>
           </a:bodyPr>
           <a:lstStyle/>
           <a:p>
             <a:r>
               <a:rPr lang="en-US" sz="1400" dirty="0"/>
-              <a:t>📌From the graph we found that, Revenue of domestic visitors is declining from the year 2018, because of gradually declining of number of visitors. </a:t>
+              <a:t>📌From the graph we found that, Revenue of foreign visitors is an inclined slope  because of gradually increase of number of visitors. </a:t>
             </a:r>
           </a:p>
           <a:p>
             <a:r>
               <a:rPr lang="en-US" sz="1400" dirty="0"/>
-              <a:t>📌Due to decline of number of domestic visitors, the revenue generated from visitors is also declining , like in 2017 the revenue generated was around 32.59 billion, but in 2018 the revenue was around 23.45 billion, a decline of 29 %. </a:t>
+              <a:t>📌Due to increase of number of foreign visitors, the revenue generated from visitors is also growing , like in 2016 the revenue generated was around 0.92 billion, but in 2019 the revenue was around 1.79 billion, which is doubled. </a:t>
             </a:r>
           </a:p>
           <a:p>
             <a:r>
               <a:rPr lang="en-US" sz="1400" dirty="0"/>
-              <a:t>📌Here we are assuming that avg spend per domestic visitor was around 1200 Rs. </a:t>
+              <a:t>📌Here we are assuming that avg spend per foreign visitor was around 5600 Rs. </a:t>
             </a:r>
           </a:p>
           <a:p>
             <a:r>
               <a:rPr lang="en-US" sz="1400" dirty="0"/>
-              <a:t>📌 If we forecast the revenue for 2025 from previous year data, we got the estimated revenue around 5.8 billion Rs. , if we compare it with 2019 the revenue was 16.6 billion, a decline of 65%.</a:t>
+              <a:t>📌 If we forecast the revenue for 2025 from previous year data, we got the estimated revenue around 6.8 billion Rs. , if we compare it with 2019 the revenue was 1.79 billion, an incline of above 200%.</a:t>
             </a:r>
           </a:p>
         </p:txBody>
@@ -17484,7 +17484,7 @@
         </p:style>
         <p:txBody>
           <a:bodyPr vert="horz" lIns="91440" tIns="45720" rIns="91440" bIns="45720" rtlCol="0" anchor="t">
-            <a:normAutofit fontScale="92500"/>
+            <a:normAutofit fontScale="92500" lnSpcReduction="20000"/>
           </a:bodyPr>
           <a:lstStyle>
             <a:lvl1pPr marL="0" indent="0" algn="l" defTabSz="457200" rtl="0" eaLnBrk="1" latinLnBrk="0" hangingPunct="1">
@@ -17699,25 +17699,25 @@
           <a:p>
             <a:r>
               <a:rPr lang="en-US" sz="1400" dirty="0"/>
-              <a:t>📌Here the graph shows that number of visitors in Hyderabad is gradually decreasing from year 2018,</a:t>
+              <a:t>📌Here the graph shows that number of visitors in Hyderabad is gradually increasing yearly,</a:t>
             </a:r>
           </a:p>
           <a:p>
             <a:r>
               <a:rPr lang="en-US" sz="1400" dirty="0"/>
-              <a:t>📌 Mainly domestic visitors are reducing year by year in Hyderabad, in 2018 total domestic visitors are around 19.54 million, but in 2019 they are declined to up to 13.8 million, a decline of 29%.</a:t>
+              <a:t>📌 Mainly foreign visitors are increasing year by year in Hyderabad, in 2016 total foreign visitors are around 0.16 million, but in 2019 they are increased up to 0.32 million, an increment of 100%  which means the visitors are just doubled.</a:t>
             </a:r>
           </a:p>
           <a:p>
             <a:r>
               <a:rPr lang="en-US" sz="1400" dirty="0"/>
-              <a:t>📌 If we forecast number of visitors according to data from 2016-2019, in 2025 only 4.8 million people will visit Hyderabad, which is a decline of around 65% from 2019 visitors.</a:t>
+              <a:t>📌 If we forecast number of visitors according to data from 2016-2019, in 2025 around 1.2 million people will visit Hyderabad, which is an increment of around more than 200% from 2019 visitors.</a:t>
             </a:r>
           </a:p>
           <a:p>
             <a:r>
               <a:rPr lang="en-US" sz="1400" dirty="0"/>
-              <a:t>📌But this is a prediction, we can’t predict the future. In case the government efforts for increasing the number of visitors can also affect the prediction.</a:t>
+              <a:t>📌But this is a prediction, we can’t predict the future. In case there is any natural disaster or any policies by govt. which was not in favor of foreign tourist then there may be low values than what we predict.</a:t>
             </a:r>
           </a:p>
         </p:txBody>
@@ -17912,11 +17912,11 @@
   <p:clrMapOvr>
     <a:masterClrMapping/>
   </p:clrMapOvr>
-  <mc:AlternateContent xmlns:mc="http://schemas.openxmlformats.org/markup-compatibility/2006">
-    <mc:Choice xmlns:p14="http://schemas.microsoft.com/office/powerpoint/2010/main" Requires="p14">
+  <mc:AlternateContent xmlns:mc="http://schemas.openxmlformats.org/markup-compatibility/2006" xmlns:p14="http://schemas.microsoft.com/office/powerpoint/2010/main">
+    <mc:Choice Requires="p14">
       <p:transition p14:dur="10"/>
     </mc:Choice>
-    <mc:Fallback>
+    <mc:Fallback xmlns="">
       <p:transition/>
     </mc:Fallback>
   </mc:AlternateContent>
@@ -18931,24 +18931,24 @@
     <we:reference id="WA200003233" version="2.0.0.3" store="WA200003233" storeType="OMEX"/>
   </we:alternateReferences>
   <we:properties>
+    <we:property name="artifactName" value="&quot;Hyd_Foreignvisitors_16-19 by Years&quot;"/>
+    <we:property name="backgroundColor" value="&quot;#FFF&quot;"/>
+    <we:property name="bookmark" value="&quot;H4sIAAAAAAAAA91YbW/bNhD+KwE/e4P4IonMt9XtMGDrEDRFgWEIiiN5stnKokDRWbzA/72k5CJNssXxlrfNX2wdj7p77nl4OvmSWDf0LWx+hRWSY/LK+88rCJ+PKJmR7rqtQqyQ1qUUoIu6qFkDJnn5PjrfDeT4kkQIC4wf3LCGNt8wGX8njWqkQg4sfXRTGWVURc5mBNr2BBbZp4F2wBnpMQy+g9b9idMt0lIMa9zOCF70rQ+QA51GiJiDnSf3dJ0SpN/zlAeY6M7xFE2crO+w9yHurrksygpLYVghNUfKKRNpzzCtjsnv989Bx8TmvovgupRAttlKalOJRlHTiLoyNTRFtjeujTsXvXlz0YdUjVSjTZ+L+oM9h86gJSO4gMOE5ZK8RRjWYUT45trCqV8Hg++wGZe66OIm3edn3Bzttgxkm0p1Enwq5Lj208ZiAA3242ufyIjOpLq66MPwkVbfUTX6L/0f84CpppYcF9uzZBlct2h3FFxhfj/lbSDknL3+lAqVsaUNPqQ4rzYjvNcufGWAzW4geFpo26SxnbjzbVfe5vyXzlrs8vKM1LbAhltTacV1bZuKGvbCiPvRB3SL7vz/x9vfIdtPm6CWCVGYAismGFWWwsug7b2P0B59FeJ/mKVbQPaTYqkpZEOVsA1aBsYkerLrnXCHJaTvG3jvjtMAU5LJkiqgmltWaiMfIw7WRvKaqbLgFkRZc1mXe+NEvIjaXxwWSTChpC0LKxvGALnRFB4DkQSrIRVOa4GCC0pZbR4jDtdWMUppU3ErbFlrY8u9x3OejsjCB2dSDjdP6Ny361V3X12/Tc/m5S1Ff2O9fiRnz9TY/02XgOQ7X0KI92wV9Eka+o12MY1jyfPTNzPWjuYpwwfl9Wx/5/irOfQlPDYOf9rfQ7SHFfc3hHArryvjgfps02h8iD6ff+B4aLHeWc+zafhUKA2gVkXJrFRVAWj+uRwfke7n6pAP987yMvV454vLEwtyX++EwipboaxRVJqDsBKLvbODW6XX+wNnFFaDhZLastK1KFXJuX74OGOoK2+ywrAYyfXrOPRg8AQ6HIvcT8VyOPol0UNns+jG3yF//+LSaZ2S+gDtOgca/86Y8ORmo1u874apN2y/AFwVm/iVEQAA&quot;"/>
+    <we:property name="creatorSessionId" value="&quot;01a543b4-0de3-4e44-9b1b-77b81e413d74&quot;"/>
+    <we:property name="creatorTenantId" value="&quot;ebec9c67-55a5-439b-bb63-b3091205e550&quot;"/>
+    <we:property name="creatorUserId" value="&quot;100320028783E496&quot;"/>
+    <we:property name="datasetId" value="&quot;b140e74d-f57c-4169-9277-6930aac3a6e2&quot;"/>
+    <we:property name="embedUrl" value="&quot;/reportEmbed?reportId=e70feea7-9ed8-4355-bed3-d5381d601e01&amp;config=eyJjbHVzdGVyVXJsIjoiaHR0cHM6Ly9XQUJJLUlORElBLUNFTlRSQUwtQS1QUklNQVJZLXJlZGlyZWN0LmFuYWx5c2lzLndpbmRvd3MubmV0IiwiZW1iZWRGZWF0dXJlcyI6eyJtb2Rlcm5FbWJlZCI6dHJ1ZSwidXNhZ2VNZXRyaWNzVk5leHQiOnRydWV9fQ%3D%3D&amp;disableSensitivityBanner=true&quot;"/>
+    <we:property name="initialStateBookmark" value="&quot;H4sIAAAAAAAAA91YW2/bOgz+K4Wfs8G6+KK+dVmHAV23oh0GDENRUBKdaHMsQ1Z6mlPkv0+yM3RrsbrZejsnL44oSuRHfqJoXybadG0Nq/ewwGQ3eWXttwW4bzskmSTNRvbhw8Hh3vHB2fu9w/0gtq03tumS3cvEg5uh/2S6JdRxhyD8cjpJoK6PYBZHFdQdTpIWXWcbqM2/OCiHKe+WuJ4keNHW1kHc8sSDx7jteVAP42CbvGTBIihvzvEElR+kx9ha5zdjVqZZjhlXNC0lQ8II5WFNN8z2bo7rR6O9Y1PbeDBNcCDKdF5KlfNKEFXxIlcFVGmUV6b2GxW52r9oXcAdorFqY7z29Dk0CnXSg3PYDVguk0OEbul6hPu/TJzYpVN4jFU/1XjjV2GfA1ztbJZ0yTqE6sjZEMh+7u1KowMJ+uy1DWH3RoW4Gm9dd0byF0T0+nP7z9RhiKlOdtP1aZB0ppnVmxRcYf44+K3ARZ+t/BoCFbGFBdYFO69WPbzXxv3IAJ1cQ/C40NaBYxvexm0XVkf/50ZrbOL0JCl0ihXTKpeCyUJXOVH0mSXujXVoZs35/y9vv0M2njZONOU8VSnmlFMiNIHnkbaP1kO984OI/+Es3QAynhRNVFpWRHBdoaagVEhPVL0VbjeH8LyG93Y7FVBR0jIjAohkmmZSlQ9hBwtVsoKKLGUaeFawsshG7Xi88NJebGeJUy5KnaW6rCgFZEoSeAhEJWgJIXBScuSME0IL9RB2mNSCEkKqnGmus0IqnY0ez2k4IjPrjAo+XD+hU1svF81deX0Y7ub5DUb/JP31SE6eqLD/TZWAoDudg/N3LBXkUQr6tXIxtGNB8+tPPdYmzYOH95rX0/HKIapSIAMafrLKlVAifxbXxva3/R1Iu11wPyO4G35dCbfkZx1a4234+fQNx32T9dZ4ng7Np8BSAUqRZlSXIk8B1Z/T8QHT/VQV8v7eWZ4nH299cXlkQo7VTki10DmWBfJcMuC6xHS0dzCL8Hq/ZY9CC9CQEZ3lsuCZyBiT92+nN3WlnSzQzfrk2qXvWlB4BA32QW6HYBns9QLpodGRdP1/F5/vTDitg1OfoF5GQ/3njAFPLDayxpEF8SPH4FcsDevvHLx2BW8RAAA=&quot;"/>
+    <we:property name="isFiltersActionButtonVisible" value="true"/>
+    <we:property name="isFooterCollapsed" value="true"/>
+    <we:property name="pageDisplayName" value="&quot;Hyderabad&quot;"/>
+    <we:property name="pageName" value="&quot;ReportSection38056e54c208b3e13124&quot;"/>
     <we:property name="pptInsertionSessionID" value="&quot;F65446D1-87C4-42FC-A21D-0B2D581AA73D&quot;"/>
-    <we:property name="reportUrl" value="&quot;/groups/me/reports/e70feea7-9ed8-4355-bed3-d5381d601e01/ReportSection38056e54c208b3e13124?ctid=ebec9c67-55a5-439b-bb63-b3091205e550&amp;pbi_source=shareVisual&amp;visual=f9f89e3a2222bf6c9c96&amp;height=294.61&amp;width=350.66&amp;bookmarkGuid=a1765203-4d1c-4bfd-b783-29cebd85d27b&amp;fromEntryPoint=sharevisual&quot;"/>
-    <we:property name="artifactName" value="&quot;Hyd_Foreignvisitors_16-19 by Years&quot;"/>
+    <we:property name="reportEmbeddedTime" value="&quot;2023-05-17T14:25:55.546Z&quot;"/>
     <we:property name="reportName" value="&quot;Telangana_Tourism_ResumeChallenge&quot;"/>
     <we:property name="reportState" value="&quot;CONNECTED&quot;"/>
-    <we:property name="embedUrl" value="&quot;/reportEmbed?reportId=e70feea7-9ed8-4355-bed3-d5381d601e01&amp;config=eyJjbHVzdGVyVXJsIjoiaHR0cHM6Ly9XQUJJLUlORElBLUNFTlRSQUwtQS1QUklNQVJZLXJlZGlyZWN0LmFuYWx5c2lzLndpbmRvd3MubmV0IiwiZW1iZWRGZWF0dXJlcyI6eyJtb2Rlcm5FbWJlZCI6dHJ1ZSwidXNhZ2VNZXRyaWNzVk5leHQiOnRydWV9fQ%3D%3D&amp;disableSensitivityBanner=true&quot;"/>
-    <we:property name="pageName" value="&quot;ReportSection38056e54c208b3e13124&quot;"/>
-    <we:property name="pageDisplayName" value="&quot;Hyderabad&quot;"/>
-    <we:property name="datasetId" value="&quot;b140e74d-f57c-4169-9277-6930aac3a6e2&quot;"/>
-    <we:property name="backgroundColor" value="&quot;#FFF&quot;"/>
-    <we:property name="bookmark" value="&quot;H4sIAAAAAAAAA91YbW/bNhD+K4E+u4P4IonMt9XtMGDrEDRFgWEIiiN5stXKokDRWbzA/31HyUWaBI3jLW+bv9g8Hnn33D08Hn2ZuWboW9j8BivMjrPX3n9ZQfhyxLJZ1l2X8UKBZIzllWMF1DqvJJKW72PjuyE7vswihAXGj82whjZtSMI/zmYZtO0JLNKohnbAWdZjGHwHbfMXTso0FcMat7MML/rWB0hbnkaImLY9J3UakyvsB0EWwcbmHE/Rxkn6Hnsf4m4sVF6UWEjLc2UEMsG4pDXDNDu6uV8/GR0dm/suQtORA0nmSmVsKWvNbC2r0lZQ50leN23cqZjN24s+EG6KxqZP4fvRnUNn0WUjuIDDhOUye4cwrMOI8O21iVO/DhbfYz1OdbGJG9rnF9wc7ZYM2ZZCdRI8BXKc+3njMIAB9+mNp7DHxlJcm+jD8ImVr5ge9Zf+z3lAiqnLjvPtGUmGplu0uxRcYf4w+W0hJJ+9+UyBSthogQ9k5/VmhPemCV8zwGc3EDwttC1xbEfjtO3Ku+T/snEOuzQ9yyqXYy2cLY0WpnJ1ySx/YYn7yQdsFt35/y9v30O2P22SOS5lbnMsueRMOwYvI20ffIT26CsR/8NZugVkf1Ics7mqmZauRsfBWkpPUr0T7rCEHm/ivdtODVwrrgqmgRnheGGsegw7WFklKq6LXDiQRSVUVey1E/EiGn9xmCXJpVauyJ2qOQcU1jB4DEQKnAEKnDESpaArm1f2MewI4zSnhqAuhZOuqIx1xd7jOacjsvChseTDzRM69+161d2X1+/obl7eYvQ30utHcvZMhf3fVAkg3fkSQrxnqWBPUtBvlIupHSPNz9/0WLs0Tx4+aF7P9lcOXSuNAjh9TF1abXX5Iq6Nw2/7e5D2sOD+jhBu+XUlPJCfLbXGh/Dz+RuOhybrnfE8m5pPjcoCGp0X3Cld5oD2n9PxEdP9XBXy4d4sL5OPdz5cnpiQ+2on5E67ElWFsjQCpFOY7+0dmhU97w/sUXgFDgrmitJUstCFEObh7YymrrSzFYbFmFy/jkMPFk+gwzHI/RSsBkc9Ij10LpFu/B3S968NndbJqY/QrpOh8e+MCU8qNqbF+y6YasP2b6ua+n1/EQAA&quot;"/>
-    <we:property name="initialStateBookmark" value="&quot;H4sIAAAAAAAAA91YW2/bOgz+K4Wfs8G6+KK+dVmHAV23oh0GDENRUBKdaHMsQ1Z6mlPkv0+yM3RrsbrZejsnL44oSuRHfqJoXybadG0Nq/ewwGQ3eWXttwW4bzskmSTNRvbhw8Hh3vHB2fu9w/0gtq03tumS3cvEg5uh/2S6JdRxhyD8cjpJoK6PYBZHFdQdTpIWXWcbqM2/OCiHKe+WuJ4keNHW1kHc8sSDx7jteVAP42CbvGTBIihvzvEElR+kx9ha5zdjVqZZjhlXNC0lQ8II5WFNN8z2bo7rR6O9Y1PbeDBNcCDKdF5KlfNKEFXxIlcFVGmUV6b2GxW52r9oXcAdorFqY7z29Dk0CnXSg3PYDVguk0OEbul6hPu/TJzYpVN4jFU/1XjjV2GfA1ztbJZ0yTqE6sjZEMh+7u1KowMJ+uy1DWH3RoW4Gm9dd0byF0T0+nP7z9RhiKlOdtP1aZB0ppnVmxRcYf44+K3ARZ+t/BoCFbGFBdYFO69WPbzXxv3IAJ1cQ/C40NaBYxvexm0XVkf/50ZrbOL0JCl0ihXTKpeCyUJXOVH0mSXujXVoZs35/y9vv0M2njZONOU8VSnmlFMiNIHnkbaP1kO984OI/+Es3QAynhRNVFpWRHBdoaagVEhPVL0VbjeH8LyG93Y7FVBR0jIjAohkmmZSlQ9hBwtVsoKKLGUaeFawsshG7Xi88NJebGeJUy5KnaW6rCgFZEoSeAhEJWgJIXBScuSME0IL9RB2mNSCEkKqnGmus0IqnY0ez2k4IjPrjAo+XD+hU1svF81deX0Y7ub5DUb/JP31SE6eqLD/TZWAoDudg/N3LBXkUQr6tXIxtGNB8+tPPdYmzYOH95rX0/HKIapSIAMafrLKlVAifxbXxva3/R1Iu11wPyO4G35dCbfkZx1a4234+fQNx32T9dZ4ng7Np8BSAUqRZlSXIk8B1Z/T8QHT/VQV8v7eWZ4nH299cXlkQo7VTki10DmWBfJcMuC6xHS0dzCL8Hq/ZY9CC9CQEZ3lsuCZyBiT92+nN3WlnSzQzfrk2qXvWlB4BA32QW6HYBns9QLpodGRdP1/F5/vTDitg1OfoF5GQ/3njAFPLDayxpEF8SPH4FcsDevvHLx2BW8RAAA=&quot;"/>
-    <we:property name="isFooterCollapsed" value="true"/>
-    <we:property name="isFiltersActionButtonVisible" value="true"/>
-    <we:property name="reportEmbeddedTime" value="&quot;2023-05-17T14:25:55.546Z&quot;"/>
-    <we:property name="creatorTenantId" value="&quot;ebec9c67-55a5-439b-bb63-b3091205e550&quot;"/>
-    <we:property name="creatorUserId" value="&quot;100320028783E496&quot;"/>
-    <we:property name="creatorSessionId" value="&quot;01a543b4-0de3-4e44-9b1b-77b81e413d74&quot;"/>
+    <we:property name="reportUrl" value="&quot;/groups/me/reports/e70feea7-9ed8-4355-bed3-d5381d601e01/ReportSection38056e54c208b3e13124?ctid=ebec9c67-55a5-439b-bb63-b3091205e550&amp;pbi_source=shareVisual&amp;visual=f9f89e3a2222bf6c9c96&amp;height=294.61&amp;width=350.66&amp;bookmarkGuid=a1765203-4d1c-4bfd-b783-29cebd85d27b&amp;fromEntryPoint=sharevisual&quot;"/>
   </we:properties>
   <we:bindings/>
   <we:snapshot xmlns:r="http://schemas.openxmlformats.org/officeDocument/2006/relationships" r:embed="rId1"/>

</xml_diff>

<commit_message>
Added Highest Potential Districts
</commit_message>
<xml_diff>
--- a/Tourism Challenge by Codebasics.pptx
+++ b/Tourism Challenge by Codebasics.pptx
@@ -8675,8 +8675,8 @@
           </a:p>
         </p:txBody>
       </p:sp>
-      <mc:AlternateContent xmlns:mc="http://schemas.openxmlformats.org/markup-compatibility/2006" xmlns:we="http://schemas.microsoft.com/office/webextensions/webextension/2010/11" xmlns:pca="http://schemas.microsoft.com/office/powerpoint/2013/contentapp">
-        <mc:Choice Requires="we pca">
+      <mc:AlternateContent xmlns:mc="http://schemas.openxmlformats.org/markup-compatibility/2006">
+        <mc:Choice xmlns:we="http://schemas.microsoft.com/office/webextensions/webextension/2010/11" xmlns:pca="http://schemas.microsoft.com/office/powerpoint/2013/contentapp" Requires="we pca">
           <p:graphicFrame>
             <p:nvGraphicFramePr>
               <p:cNvPr id="7" name="Add-in 6" title="Microsoft Power BI">
@@ -8708,7 +8708,7 @@
             </a:graphic>
           </p:graphicFrame>
         </mc:Choice>
-        <mc:Fallback xmlns="">
+        <mc:Fallback>
           <p:pic>
             <p:nvPicPr>
               <p:cNvPr id="7" name="Add-in 6" title="Microsoft Power BI">
@@ -8741,8 +8741,8 @@
           </p:pic>
         </mc:Fallback>
       </mc:AlternateContent>
-      <mc:AlternateContent xmlns:mc="http://schemas.openxmlformats.org/markup-compatibility/2006" xmlns:we="http://schemas.microsoft.com/office/webextensions/webextension/2010/11" xmlns:pca="http://schemas.microsoft.com/office/powerpoint/2013/contentapp">
-        <mc:Choice Requires="we pca">
+      <mc:AlternateContent xmlns:mc="http://schemas.openxmlformats.org/markup-compatibility/2006">
+        <mc:Choice xmlns:we="http://schemas.microsoft.com/office/webextensions/webextension/2010/11" xmlns:pca="http://schemas.microsoft.com/office/powerpoint/2013/contentapp" Requires="we pca">
           <p:graphicFrame>
             <p:nvGraphicFramePr>
               <p:cNvPr id="8" name="Add-in 7" title="Microsoft Power BI">
@@ -8774,7 +8774,7 @@
             </a:graphic>
           </p:graphicFrame>
         </mc:Choice>
-        <mc:Fallback xmlns="">
+        <mc:Fallback>
           <p:pic>
             <p:nvPicPr>
               <p:cNvPr id="8" name="Add-in 7" title="Microsoft Power BI">
@@ -10743,8 +10743,8 @@
           </a:p>
         </p:txBody>
       </p:sp>
-      <mc:AlternateContent xmlns:mc="http://schemas.openxmlformats.org/markup-compatibility/2006" xmlns:we="http://schemas.microsoft.com/office/webextensions/webextension/2010/11" xmlns:pca="http://schemas.microsoft.com/office/powerpoint/2013/contentapp">
-        <mc:Choice Requires="we pca">
+      <mc:AlternateContent xmlns:mc="http://schemas.openxmlformats.org/markup-compatibility/2006">
+        <mc:Choice xmlns:we="http://schemas.microsoft.com/office/webextensions/webextension/2010/11" xmlns:pca="http://schemas.microsoft.com/office/powerpoint/2013/contentapp" Requires="we pca">
           <p:graphicFrame>
             <p:nvGraphicFramePr>
               <p:cNvPr id="4" name="Add-in 3" title="Microsoft Power BI">
@@ -10776,7 +10776,7 @@
             </a:graphic>
           </p:graphicFrame>
         </mc:Choice>
-        <mc:Fallback xmlns="">
+        <mc:Fallback>
           <p:pic>
             <p:nvPicPr>
               <p:cNvPr id="4" name="Add-in 3" title="Microsoft Power BI">
@@ -11596,8 +11596,8 @@
           </a:p>
         </p:txBody>
       </p:sp>
-      <mc:AlternateContent xmlns:mc="http://schemas.openxmlformats.org/markup-compatibility/2006" xmlns:we="http://schemas.microsoft.com/office/webextensions/webextension/2010/11" xmlns:pca="http://schemas.microsoft.com/office/powerpoint/2013/contentapp">
-        <mc:Choice Requires="we pca">
+      <mc:AlternateContent xmlns:mc="http://schemas.openxmlformats.org/markup-compatibility/2006">
+        <mc:Choice xmlns:we="http://schemas.microsoft.com/office/webextensions/webextension/2010/11" xmlns:pca="http://schemas.microsoft.com/office/powerpoint/2013/contentapp" Requires="we pca">
           <p:graphicFrame>
             <p:nvGraphicFramePr>
               <p:cNvPr id="6" name="Add-in 5" title="Microsoft Power BI">
@@ -11629,7 +11629,7 @@
             </a:graphic>
           </p:graphicFrame>
         </mc:Choice>
-        <mc:Fallback xmlns="">
+        <mc:Fallback>
           <p:pic>
             <p:nvPicPr>
               <p:cNvPr id="6" name="Add-in 5" title="Microsoft Power BI">
@@ -14712,7 +14712,7 @@
             <a:pPr algn="ctr"/>
             <a:r>
               <a:rPr lang="en-US" sz="1200" dirty="0"/>
-              <a:t>*Note :- The Population data is taken from 2011 Census Survey from Govt. of India</a:t>
+              <a:t>*Note :- The Population data is taken from 2011 Census from Govt. of India</a:t>
             </a:r>
             <a:endParaRPr lang="en-GB" sz="1200" dirty="0"/>
           </a:p>
@@ -16881,7 +16881,7 @@
             <a:pPr algn="ctr"/>
             <a:r>
               <a:rPr lang="en-US" sz="1200" dirty="0"/>
-              <a:t>*Note :- The Population data is taken from 2011 Census Survey from Govt. of India</a:t>
+              <a:t>*Note :- The Population data is taken from 2011 Census from Govt. of India</a:t>
             </a:r>
             <a:endParaRPr lang="en-GB" sz="1200" dirty="0"/>
           </a:p>
@@ -16927,51 +16927,1801 @@
       </p:grpSpPr>
       <p:sp>
         <p:nvSpPr>
-          <p:cNvPr id="2" name="Title 1">
+          <p:cNvPr id="4" name="Title 1">
             <a:extLst>
               <a:ext uri="{FF2B5EF4-FFF2-40B4-BE49-F238E27FC236}">
-                <a16:creationId xmlns:a16="http://schemas.microsoft.com/office/drawing/2014/main" id="{52181753-C5BF-44A5-B0ED-4046A3484262}"/>
+                <a16:creationId xmlns:a16="http://schemas.microsoft.com/office/drawing/2014/main" id="{C6EC006E-EC7E-B586-58C8-0B9A78BD44C2}"/>
+              </a:ext>
+            </a:extLst>
+          </p:cNvPr>
+          <p:cNvSpPr txBox="1">
+            <a:spLocks/>
+          </p:cNvSpPr>
+          <p:nvPr/>
+        </p:nvSpPr>
+        <p:spPr>
+          <a:xfrm>
+            <a:off x="2330621" y="30930"/>
+            <a:ext cx="7530757" cy="515798"/>
+          </a:xfrm>
+          <a:prstGeom prst="snipRoundRect">
+            <a:avLst/>
+          </a:prstGeom>
+          <a:solidFill>
+            <a:schemeClr val="bg1">
+              <a:lumMod val="85000"/>
+            </a:schemeClr>
+          </a:solidFill>
+        </p:spPr>
+        <p:style>
+          <a:lnRef idx="2">
+            <a:schemeClr val="accent6"/>
+          </a:lnRef>
+          <a:fillRef idx="1">
+            <a:schemeClr val="lt1"/>
+          </a:fillRef>
+          <a:effectRef idx="0">
+            <a:schemeClr val="accent6"/>
+          </a:effectRef>
+          <a:fontRef idx="minor">
+            <a:schemeClr val="dk1"/>
+          </a:fontRef>
+        </p:style>
+        <p:txBody>
+          <a:bodyPr vert="horz" lIns="91440" tIns="45720" rIns="91440" bIns="45720" rtlCol="0" anchor="b">
+            <a:noAutofit/>
+          </a:bodyPr>
+          <a:lstStyle>
+            <a:lvl1pPr algn="l" defTabSz="457200" rtl="0" eaLnBrk="1" latinLnBrk="0" hangingPunct="1">
+              <a:spcBef>
+                <a:spcPct val="0"/>
+              </a:spcBef>
+              <a:buNone/>
+              <a:defRPr sz="5400" kern="1200">
+                <a:solidFill>
+                  <a:schemeClr val="dk1"/>
+                </a:solidFill>
+                <a:latin typeface="+mn-lt"/>
+                <a:ea typeface="+mn-ea"/>
+                <a:cs typeface="+mn-cs"/>
+              </a:defRPr>
+            </a:lvl1pPr>
+            <a:lvl2pPr eaLnBrk="1" hangingPunct="1">
+              <a:defRPr>
+                <a:solidFill>
+                  <a:schemeClr val="dk1"/>
+                </a:solidFill>
+                <a:latin typeface="+mn-lt"/>
+                <a:ea typeface="+mn-ea"/>
+                <a:cs typeface="+mn-cs"/>
+              </a:defRPr>
+            </a:lvl2pPr>
+            <a:lvl3pPr eaLnBrk="1" hangingPunct="1">
+              <a:defRPr>
+                <a:solidFill>
+                  <a:schemeClr val="dk1"/>
+                </a:solidFill>
+                <a:latin typeface="+mn-lt"/>
+                <a:ea typeface="+mn-ea"/>
+                <a:cs typeface="+mn-cs"/>
+              </a:defRPr>
+            </a:lvl3pPr>
+            <a:lvl4pPr eaLnBrk="1" hangingPunct="1">
+              <a:defRPr>
+                <a:solidFill>
+                  <a:schemeClr val="dk1"/>
+                </a:solidFill>
+                <a:latin typeface="+mn-lt"/>
+                <a:ea typeface="+mn-ea"/>
+                <a:cs typeface="+mn-cs"/>
+              </a:defRPr>
+            </a:lvl4pPr>
+            <a:lvl5pPr eaLnBrk="1" hangingPunct="1">
+              <a:defRPr>
+                <a:solidFill>
+                  <a:schemeClr val="dk1"/>
+                </a:solidFill>
+                <a:latin typeface="+mn-lt"/>
+                <a:ea typeface="+mn-ea"/>
+                <a:cs typeface="+mn-cs"/>
+              </a:defRPr>
+            </a:lvl5pPr>
+            <a:lvl6pPr eaLnBrk="1" hangingPunct="1">
+              <a:defRPr>
+                <a:solidFill>
+                  <a:schemeClr val="dk1"/>
+                </a:solidFill>
+                <a:latin typeface="+mn-lt"/>
+                <a:ea typeface="+mn-ea"/>
+                <a:cs typeface="+mn-cs"/>
+              </a:defRPr>
+            </a:lvl6pPr>
+            <a:lvl7pPr eaLnBrk="1" hangingPunct="1">
+              <a:defRPr>
+                <a:solidFill>
+                  <a:schemeClr val="dk1"/>
+                </a:solidFill>
+                <a:latin typeface="+mn-lt"/>
+                <a:ea typeface="+mn-ea"/>
+                <a:cs typeface="+mn-cs"/>
+              </a:defRPr>
+            </a:lvl7pPr>
+            <a:lvl8pPr eaLnBrk="1" hangingPunct="1">
+              <a:defRPr>
+                <a:solidFill>
+                  <a:schemeClr val="dk1"/>
+                </a:solidFill>
+                <a:latin typeface="+mn-lt"/>
+                <a:ea typeface="+mn-ea"/>
+                <a:cs typeface="+mn-cs"/>
+              </a:defRPr>
+            </a:lvl8pPr>
+            <a:lvl9pPr eaLnBrk="1" hangingPunct="1">
+              <a:defRPr>
+                <a:solidFill>
+                  <a:schemeClr val="dk1"/>
+                </a:solidFill>
+                <a:latin typeface="+mn-lt"/>
+                <a:ea typeface="+mn-ea"/>
+                <a:cs typeface="+mn-cs"/>
+              </a:defRPr>
+            </a:lvl9pPr>
+          </a:lstStyle>
+          <a:p>
+            <a:pPr algn="ctr"/>
+            <a:r>
+              <a:rPr lang="en-US" sz="3200" dirty="0"/>
+              <a:t>Highest Potential Districts</a:t>
+            </a:r>
+            <a:endParaRPr lang="en-GB" sz="3200" dirty="0"/>
+          </a:p>
+        </p:txBody>
+      </p:sp>
+      <p:sp>
+        <p:nvSpPr>
+          <p:cNvPr id="6" name="Subtitle 2">
+            <a:extLst>
+              <a:ext uri="{FF2B5EF4-FFF2-40B4-BE49-F238E27FC236}">
+                <a16:creationId xmlns:a16="http://schemas.microsoft.com/office/drawing/2014/main" id="{4DE28FAB-0E9E-1BDF-7B8C-2E3764807F78}"/>
+              </a:ext>
+            </a:extLst>
+          </p:cNvPr>
+          <p:cNvSpPr txBox="1">
+            <a:spLocks/>
+          </p:cNvSpPr>
+          <p:nvPr/>
+        </p:nvSpPr>
+        <p:spPr>
+          <a:xfrm>
+            <a:off x="4595812" y="748036"/>
+            <a:ext cx="3339736" cy="2883060"/>
+          </a:xfrm>
+          <a:prstGeom prst="roundRect">
+            <a:avLst/>
+          </a:prstGeom>
+        </p:spPr>
+        <p:style>
+          <a:lnRef idx="2">
+            <a:schemeClr val="accent5"/>
+          </a:lnRef>
+          <a:fillRef idx="1">
+            <a:schemeClr val="lt1"/>
+          </a:fillRef>
+          <a:effectRef idx="0">
+            <a:schemeClr val="accent5"/>
+          </a:effectRef>
+          <a:fontRef idx="minor">
+            <a:schemeClr val="dk1"/>
+          </a:fontRef>
+        </p:style>
+        <p:txBody>
+          <a:bodyPr vert="horz" lIns="91440" tIns="45720" rIns="91440" bIns="45720" rtlCol="0" anchor="t">
+            <a:normAutofit fontScale="85000" lnSpcReduction="20000"/>
+          </a:bodyPr>
+          <a:lstStyle>
+            <a:lvl1pPr marL="0" indent="0" algn="l" defTabSz="457200" rtl="0" eaLnBrk="1" latinLnBrk="0" hangingPunct="1">
+              <a:spcBef>
+                <a:spcPts val="1000"/>
+              </a:spcBef>
+              <a:spcAft>
+                <a:spcPts val="0"/>
+              </a:spcAft>
+              <a:buClr>
+                <a:schemeClr val="accent1"/>
+              </a:buClr>
+              <a:buFont typeface="Wingdings 3" charset="2"/>
+              <a:buNone/>
+              <a:defRPr sz="1800" kern="1200">
+                <a:solidFill>
+                  <a:schemeClr val="tx1">
+                    <a:lumMod val="65000"/>
+                    <a:lumOff val="35000"/>
+                  </a:schemeClr>
+                </a:solidFill>
+                <a:latin typeface="+mn-lt"/>
+                <a:ea typeface="+mn-ea"/>
+                <a:cs typeface="+mn-cs"/>
+              </a:defRPr>
+            </a:lvl1pPr>
+            <a:lvl2pPr marL="457200" indent="0" algn="ctr" defTabSz="457200" rtl="0" eaLnBrk="1" latinLnBrk="0" hangingPunct="1">
+              <a:spcBef>
+                <a:spcPts val="1000"/>
+              </a:spcBef>
+              <a:spcAft>
+                <a:spcPts val="0"/>
+              </a:spcAft>
+              <a:buClr>
+                <a:schemeClr val="accent1"/>
+              </a:buClr>
+              <a:buFont typeface="Wingdings 3" charset="2"/>
+              <a:buNone/>
+              <a:defRPr sz="1600" kern="1200">
+                <a:solidFill>
+                  <a:schemeClr val="tx1">
+                    <a:tint val="75000"/>
+                  </a:schemeClr>
+                </a:solidFill>
+                <a:latin typeface="+mn-lt"/>
+                <a:ea typeface="+mn-ea"/>
+                <a:cs typeface="+mn-cs"/>
+              </a:defRPr>
+            </a:lvl2pPr>
+            <a:lvl3pPr marL="914400" indent="0" algn="ctr" defTabSz="457200" rtl="0" eaLnBrk="1" latinLnBrk="0" hangingPunct="1">
+              <a:spcBef>
+                <a:spcPts val="1000"/>
+              </a:spcBef>
+              <a:spcAft>
+                <a:spcPts val="0"/>
+              </a:spcAft>
+              <a:buClr>
+                <a:schemeClr val="accent1"/>
+              </a:buClr>
+              <a:buFont typeface="Wingdings 3" charset="2"/>
+              <a:buNone/>
+              <a:defRPr sz="1400" kern="1200">
+                <a:solidFill>
+                  <a:schemeClr val="tx1">
+                    <a:tint val="75000"/>
+                  </a:schemeClr>
+                </a:solidFill>
+                <a:latin typeface="+mn-lt"/>
+                <a:ea typeface="+mn-ea"/>
+                <a:cs typeface="+mn-cs"/>
+              </a:defRPr>
+            </a:lvl3pPr>
+            <a:lvl4pPr marL="1371600" indent="0" algn="ctr" defTabSz="457200" rtl="0" eaLnBrk="1" latinLnBrk="0" hangingPunct="1">
+              <a:spcBef>
+                <a:spcPts val="1000"/>
+              </a:spcBef>
+              <a:spcAft>
+                <a:spcPts val="0"/>
+              </a:spcAft>
+              <a:buClr>
+                <a:schemeClr val="accent1"/>
+              </a:buClr>
+              <a:buFont typeface="Wingdings 3" charset="2"/>
+              <a:buNone/>
+              <a:defRPr sz="1200" kern="1200">
+                <a:solidFill>
+                  <a:schemeClr val="tx1">
+                    <a:tint val="75000"/>
+                  </a:schemeClr>
+                </a:solidFill>
+                <a:latin typeface="+mn-lt"/>
+                <a:ea typeface="+mn-ea"/>
+                <a:cs typeface="+mn-cs"/>
+              </a:defRPr>
+            </a:lvl4pPr>
+            <a:lvl5pPr marL="1828800" indent="0" algn="ctr" defTabSz="457200" rtl="0" eaLnBrk="1" latinLnBrk="0" hangingPunct="1">
+              <a:spcBef>
+                <a:spcPts val="1000"/>
+              </a:spcBef>
+              <a:spcAft>
+                <a:spcPts val="0"/>
+              </a:spcAft>
+              <a:buClr>
+                <a:schemeClr val="accent1"/>
+              </a:buClr>
+              <a:buFont typeface="Wingdings 3" charset="2"/>
+              <a:buNone/>
+              <a:defRPr sz="1200" kern="1200">
+                <a:solidFill>
+                  <a:schemeClr val="tx1">
+                    <a:tint val="75000"/>
+                  </a:schemeClr>
+                </a:solidFill>
+                <a:latin typeface="+mn-lt"/>
+                <a:ea typeface="+mn-ea"/>
+                <a:cs typeface="+mn-cs"/>
+              </a:defRPr>
+            </a:lvl5pPr>
+            <a:lvl6pPr marL="2286000" indent="0" algn="ctr" defTabSz="457200" rtl="0" eaLnBrk="1" latinLnBrk="0" hangingPunct="1">
+              <a:spcBef>
+                <a:spcPts val="1000"/>
+              </a:spcBef>
+              <a:spcAft>
+                <a:spcPts val="0"/>
+              </a:spcAft>
+              <a:buClr>
+                <a:schemeClr val="accent1"/>
+              </a:buClr>
+              <a:buFont typeface="Wingdings 3" charset="2"/>
+              <a:buNone/>
+              <a:defRPr sz="1200" kern="1200">
+                <a:solidFill>
+                  <a:schemeClr val="tx1">
+                    <a:tint val="75000"/>
+                  </a:schemeClr>
+                </a:solidFill>
+                <a:latin typeface="+mn-lt"/>
+                <a:ea typeface="+mn-ea"/>
+                <a:cs typeface="+mn-cs"/>
+              </a:defRPr>
+            </a:lvl6pPr>
+            <a:lvl7pPr marL="2743200" indent="0" algn="ctr" defTabSz="457200" rtl="0" eaLnBrk="1" latinLnBrk="0" hangingPunct="1">
+              <a:spcBef>
+                <a:spcPts val="1000"/>
+              </a:spcBef>
+              <a:spcAft>
+                <a:spcPts val="0"/>
+              </a:spcAft>
+              <a:buClr>
+                <a:schemeClr val="accent1"/>
+              </a:buClr>
+              <a:buFont typeface="Wingdings 3" charset="2"/>
+              <a:buNone/>
+              <a:defRPr sz="1200" kern="1200">
+                <a:solidFill>
+                  <a:schemeClr val="tx1">
+                    <a:tint val="75000"/>
+                  </a:schemeClr>
+                </a:solidFill>
+                <a:latin typeface="+mn-lt"/>
+                <a:ea typeface="+mn-ea"/>
+                <a:cs typeface="+mn-cs"/>
+              </a:defRPr>
+            </a:lvl7pPr>
+            <a:lvl8pPr marL="3200400" indent="0" algn="ctr" defTabSz="457200" rtl="0" eaLnBrk="1" latinLnBrk="0" hangingPunct="1">
+              <a:spcBef>
+                <a:spcPts val="1000"/>
+              </a:spcBef>
+              <a:spcAft>
+                <a:spcPts val="0"/>
+              </a:spcAft>
+              <a:buClr>
+                <a:schemeClr val="accent1"/>
+              </a:buClr>
+              <a:buFont typeface="Wingdings 3" charset="2"/>
+              <a:buNone/>
+              <a:defRPr sz="1200" kern="1200">
+                <a:solidFill>
+                  <a:schemeClr val="tx1">
+                    <a:tint val="75000"/>
+                  </a:schemeClr>
+                </a:solidFill>
+                <a:latin typeface="+mn-lt"/>
+                <a:ea typeface="+mn-ea"/>
+                <a:cs typeface="+mn-cs"/>
+              </a:defRPr>
+            </a:lvl8pPr>
+            <a:lvl9pPr marL="3657600" indent="0" algn="ctr" defTabSz="457200" rtl="0" eaLnBrk="1" latinLnBrk="0" hangingPunct="1">
+              <a:spcBef>
+                <a:spcPts val="1000"/>
+              </a:spcBef>
+              <a:spcAft>
+                <a:spcPts val="0"/>
+              </a:spcAft>
+              <a:buClr>
+                <a:schemeClr val="accent1"/>
+              </a:buClr>
+              <a:buFont typeface="Wingdings 3" charset="2"/>
+              <a:buNone/>
+              <a:defRPr sz="1200" kern="1200">
+                <a:solidFill>
+                  <a:schemeClr val="tx1">
+                    <a:tint val="75000"/>
+                  </a:schemeClr>
+                </a:solidFill>
+                <a:latin typeface="+mn-lt"/>
+                <a:ea typeface="+mn-ea"/>
+                <a:cs typeface="+mn-cs"/>
+              </a:defRPr>
+            </a:lvl9pPr>
+          </a:lstStyle>
+          <a:p>
+            <a:r>
+              <a:rPr lang="en-US" sz="1400" dirty="0"/>
+              <a:t>📌</a:t>
+            </a:r>
+            <a:r>
+              <a:rPr lang="en-US" sz="1400" b="1" dirty="0"/>
+              <a:t>Medak:</a:t>
+            </a:r>
+          </a:p>
+          <a:p>
+            <a:r>
+              <a:rPr lang="en-US" sz="1400" b="1" dirty="0"/>
+              <a:t>1). </a:t>
+            </a:r>
+            <a:r>
+              <a:rPr lang="en-US" sz="1400" dirty="0"/>
+              <a:t>According to stats Medak has highest potential to grow, Medak is mainly famous for Medak Church, Medak Fort, Huge number of ancient temples and Bathukamma a famous festival of Medak.</a:t>
+            </a:r>
+          </a:p>
+          <a:p>
+            <a:r>
+              <a:rPr lang="en-US" sz="1400" b="1" dirty="0"/>
+              <a:t>2). </a:t>
+            </a:r>
+            <a:r>
+              <a:rPr lang="en-US" sz="1400" dirty="0"/>
+              <a:t>Government can promote </a:t>
+            </a:r>
+            <a:r>
+              <a:rPr lang="en-US" sz="1400" b="1" dirty="0"/>
+              <a:t>Bathukamma </a:t>
+            </a:r>
+            <a:r>
+              <a:rPr lang="en-US" sz="1400" dirty="0"/>
+              <a:t>festival using different </a:t>
+            </a:r>
+            <a:r>
+              <a:rPr lang="en-US" sz="1400" b="1" dirty="0"/>
+              <a:t>travel influencers, </a:t>
+            </a:r>
+            <a:r>
+              <a:rPr lang="en-US" sz="1400" dirty="0"/>
+              <a:t>and they can hire some local bodies which tells tourist about the history of the festival and faith of peoples in </a:t>
+            </a:r>
+            <a:r>
+              <a:rPr lang="en-US" sz="1400" b="1" dirty="0"/>
+              <a:t>Goddess Maha Gauri. </a:t>
+            </a:r>
+            <a:r>
+              <a:rPr lang="en-US" sz="1400" dirty="0"/>
+              <a:t> </a:t>
+            </a:r>
+          </a:p>
+        </p:txBody>
+      </p:sp>
+      <p:sp>
+        <p:nvSpPr>
+          <p:cNvPr id="7" name="Rectangle: Rounded Corners 6">
+            <a:extLst>
+              <a:ext uri="{FF2B5EF4-FFF2-40B4-BE49-F238E27FC236}">
+                <a16:creationId xmlns:a16="http://schemas.microsoft.com/office/drawing/2014/main" id="{7E6C13AF-66E1-8687-FC23-90624FBEAF02}"/>
               </a:ext>
             </a:extLst>
           </p:cNvPr>
           <p:cNvSpPr>
-            <a:spLocks noGrp="1"/>
+            <a:spLocks/>
           </p:cNvSpPr>
-          <p:nvPr>
-            <p:ph type="ctrTitle"/>
-          </p:nvPr>
+          <p:nvPr/>
         </p:nvSpPr>
-        <p:spPr/>
+        <p:spPr>
+          <a:xfrm>
+            <a:off x="520434" y="748034"/>
+            <a:ext cx="3910934" cy="2883060"/>
+          </a:xfrm>
+          <a:prstGeom prst="roundRect">
+            <a:avLst/>
+          </a:prstGeom>
+          <a:solidFill>
+            <a:schemeClr val="bg1"/>
+          </a:solidFill>
+        </p:spPr>
+        <p:style>
+          <a:lnRef idx="2">
+            <a:schemeClr val="accent1">
+              <a:shade val="50000"/>
+            </a:schemeClr>
+          </a:lnRef>
+          <a:fillRef idx="1">
+            <a:schemeClr val="accent1"/>
+          </a:fillRef>
+          <a:effectRef idx="0">
+            <a:schemeClr val="accent1"/>
+          </a:effectRef>
+          <a:fontRef idx="minor">
+            <a:schemeClr val="lt1"/>
+          </a:fontRef>
+        </p:style>
         <p:txBody>
-          <a:bodyPr/>
+          <a:bodyPr rtlCol="0" anchor="ctr"/>
           <a:lstStyle/>
           <a:p>
+            <a:pPr algn="ctr"/>
             <a:endParaRPr lang="en-GB" dirty="0"/>
+          </a:p>
+        </p:txBody>
+      </p:sp>
+      <mc:AlternateContent xmlns:mc="http://schemas.openxmlformats.org/markup-compatibility/2006">
+        <mc:Choice xmlns:we="http://schemas.microsoft.com/office/webextensions/webextension/2010/11" xmlns:pca="http://schemas.microsoft.com/office/powerpoint/2013/contentapp" Requires="we pca">
+          <p:graphicFrame>
+            <p:nvGraphicFramePr>
+              <p:cNvPr id="8" name="Add-in 7" title="Microsoft Power BI">
+                <a:extLst>
+                  <a:ext uri="{FF2B5EF4-FFF2-40B4-BE49-F238E27FC236}">
+                    <a16:creationId xmlns:a16="http://schemas.microsoft.com/office/drawing/2014/main" id="{DCBBC8B4-B60B-22B0-4157-54DD7BB2CBF0}"/>
+                  </a:ext>
+                </a:extLst>
+              </p:cNvPr>
+              <p:cNvGraphicFramePr>
+                <a:graphicFrameLocks noGrp="1"/>
+              </p:cNvGraphicFramePr>
+              <p:nvPr>
+                <p:extLst>
+                  <p:ext uri="{D42A27DB-BD31-4B8C-83A1-F6EECF244321}">
+                    <p14:modId xmlns:p14="http://schemas.microsoft.com/office/powerpoint/2010/main" val="863725190"/>
+                  </p:ext>
+                </p:extLst>
+              </p:nvPr>
+            </p:nvGraphicFramePr>
+            <p:xfrm>
+              <a:off x="801072" y="972402"/>
+              <a:ext cx="3329153" cy="2566584"/>
+            </p:xfrm>
+            <a:graphic>
+              <a:graphicData uri="http://schemas.microsoft.com/office/webextensions/webextension/2010/11">
+                <we:webextensionref xmlns:we="http://schemas.microsoft.com/office/webextensions/webextension/2010/11" xmlns:r="http://schemas.openxmlformats.org/officeDocument/2006/relationships" r:id="rId2"/>
+              </a:graphicData>
+            </a:graphic>
+          </p:graphicFrame>
+        </mc:Choice>
+        <mc:Fallback>
+          <p:pic>
+            <p:nvPicPr>
+              <p:cNvPr id="8" name="Add-in 7" title="Microsoft Power BI">
+                <a:extLst>
+                  <a:ext uri="{FF2B5EF4-FFF2-40B4-BE49-F238E27FC236}">
+                    <a16:creationId xmlns:a16="http://schemas.microsoft.com/office/drawing/2014/main" id="{DCBBC8B4-B60B-22B0-4157-54DD7BB2CBF0}"/>
+                  </a:ext>
+                </a:extLst>
+              </p:cNvPr>
+              <p:cNvPicPr>
+                <a:picLocks noGrp="1" noRot="1" noChangeAspect="1" noMove="1" noResize="1" noEditPoints="1" noAdjustHandles="1" noChangeArrowheads="1" noChangeShapeType="1"/>
+              </p:cNvPicPr>
+              <p:nvPr/>
+            </p:nvPicPr>
+            <p:blipFill>
+              <a:blip r:embed="rId3"/>
+              <a:stretch>
+                <a:fillRect/>
+              </a:stretch>
+            </p:blipFill>
+            <p:spPr>
+              <a:xfrm>
+                <a:off x="801072" y="972402"/>
+                <a:ext cx="3329153" cy="2566584"/>
+              </a:xfrm>
+              <a:prstGeom prst="rect">
+                <a:avLst/>
+              </a:prstGeom>
+            </p:spPr>
+          </p:pic>
+        </mc:Fallback>
+      </mc:AlternateContent>
+      <p:sp>
+        <p:nvSpPr>
+          <p:cNvPr id="9" name="Subtitle 2">
+            <a:extLst>
+              <a:ext uri="{FF2B5EF4-FFF2-40B4-BE49-F238E27FC236}">
+                <a16:creationId xmlns:a16="http://schemas.microsoft.com/office/drawing/2014/main" id="{71279B16-816A-A353-9080-436C32586A4F}"/>
+              </a:ext>
+            </a:extLst>
+          </p:cNvPr>
+          <p:cNvSpPr txBox="1">
+            <a:spLocks/>
+          </p:cNvSpPr>
+          <p:nvPr/>
+        </p:nvSpPr>
+        <p:spPr>
+          <a:xfrm>
+            <a:off x="8051192" y="748036"/>
+            <a:ext cx="3339736" cy="2883060"/>
+          </a:xfrm>
+          <a:prstGeom prst="roundRect">
+            <a:avLst/>
+          </a:prstGeom>
+        </p:spPr>
+        <p:style>
+          <a:lnRef idx="2">
+            <a:schemeClr val="accent5"/>
+          </a:lnRef>
+          <a:fillRef idx="1">
+            <a:schemeClr val="lt1"/>
+          </a:fillRef>
+          <a:effectRef idx="0">
+            <a:schemeClr val="accent5"/>
+          </a:effectRef>
+          <a:fontRef idx="minor">
+            <a:schemeClr val="dk1"/>
+          </a:fontRef>
+        </p:style>
+        <p:txBody>
+          <a:bodyPr vert="horz" lIns="91440" tIns="45720" rIns="91440" bIns="45720" rtlCol="0" anchor="t">
+            <a:normAutofit fontScale="92500"/>
+          </a:bodyPr>
+          <a:lstStyle>
+            <a:lvl1pPr marL="0" indent="0" algn="l" defTabSz="457200" rtl="0" eaLnBrk="1" latinLnBrk="0" hangingPunct="1">
+              <a:spcBef>
+                <a:spcPts val="1000"/>
+              </a:spcBef>
+              <a:spcAft>
+                <a:spcPts val="0"/>
+              </a:spcAft>
+              <a:buClr>
+                <a:schemeClr val="accent1"/>
+              </a:buClr>
+              <a:buFont typeface="Wingdings 3" charset="2"/>
+              <a:buNone/>
+              <a:defRPr sz="1800" kern="1200">
+                <a:solidFill>
+                  <a:schemeClr val="tx1">
+                    <a:lumMod val="65000"/>
+                    <a:lumOff val="35000"/>
+                  </a:schemeClr>
+                </a:solidFill>
+                <a:latin typeface="+mn-lt"/>
+                <a:ea typeface="+mn-ea"/>
+                <a:cs typeface="+mn-cs"/>
+              </a:defRPr>
+            </a:lvl1pPr>
+            <a:lvl2pPr marL="457200" indent="0" algn="ctr" defTabSz="457200" rtl="0" eaLnBrk="1" latinLnBrk="0" hangingPunct="1">
+              <a:spcBef>
+                <a:spcPts val="1000"/>
+              </a:spcBef>
+              <a:spcAft>
+                <a:spcPts val="0"/>
+              </a:spcAft>
+              <a:buClr>
+                <a:schemeClr val="accent1"/>
+              </a:buClr>
+              <a:buFont typeface="Wingdings 3" charset="2"/>
+              <a:buNone/>
+              <a:defRPr sz="1600" kern="1200">
+                <a:solidFill>
+                  <a:schemeClr val="tx1">
+                    <a:tint val="75000"/>
+                  </a:schemeClr>
+                </a:solidFill>
+                <a:latin typeface="+mn-lt"/>
+                <a:ea typeface="+mn-ea"/>
+                <a:cs typeface="+mn-cs"/>
+              </a:defRPr>
+            </a:lvl2pPr>
+            <a:lvl3pPr marL="914400" indent="0" algn="ctr" defTabSz="457200" rtl="0" eaLnBrk="1" latinLnBrk="0" hangingPunct="1">
+              <a:spcBef>
+                <a:spcPts val="1000"/>
+              </a:spcBef>
+              <a:spcAft>
+                <a:spcPts val="0"/>
+              </a:spcAft>
+              <a:buClr>
+                <a:schemeClr val="accent1"/>
+              </a:buClr>
+              <a:buFont typeface="Wingdings 3" charset="2"/>
+              <a:buNone/>
+              <a:defRPr sz="1400" kern="1200">
+                <a:solidFill>
+                  <a:schemeClr val="tx1">
+                    <a:tint val="75000"/>
+                  </a:schemeClr>
+                </a:solidFill>
+                <a:latin typeface="+mn-lt"/>
+                <a:ea typeface="+mn-ea"/>
+                <a:cs typeface="+mn-cs"/>
+              </a:defRPr>
+            </a:lvl3pPr>
+            <a:lvl4pPr marL="1371600" indent="0" algn="ctr" defTabSz="457200" rtl="0" eaLnBrk="1" latinLnBrk="0" hangingPunct="1">
+              <a:spcBef>
+                <a:spcPts val="1000"/>
+              </a:spcBef>
+              <a:spcAft>
+                <a:spcPts val="0"/>
+              </a:spcAft>
+              <a:buClr>
+                <a:schemeClr val="accent1"/>
+              </a:buClr>
+              <a:buFont typeface="Wingdings 3" charset="2"/>
+              <a:buNone/>
+              <a:defRPr sz="1200" kern="1200">
+                <a:solidFill>
+                  <a:schemeClr val="tx1">
+                    <a:tint val="75000"/>
+                  </a:schemeClr>
+                </a:solidFill>
+                <a:latin typeface="+mn-lt"/>
+                <a:ea typeface="+mn-ea"/>
+                <a:cs typeface="+mn-cs"/>
+              </a:defRPr>
+            </a:lvl4pPr>
+            <a:lvl5pPr marL="1828800" indent="0" algn="ctr" defTabSz="457200" rtl="0" eaLnBrk="1" latinLnBrk="0" hangingPunct="1">
+              <a:spcBef>
+                <a:spcPts val="1000"/>
+              </a:spcBef>
+              <a:spcAft>
+                <a:spcPts val="0"/>
+              </a:spcAft>
+              <a:buClr>
+                <a:schemeClr val="accent1"/>
+              </a:buClr>
+              <a:buFont typeface="Wingdings 3" charset="2"/>
+              <a:buNone/>
+              <a:defRPr sz="1200" kern="1200">
+                <a:solidFill>
+                  <a:schemeClr val="tx1">
+                    <a:tint val="75000"/>
+                  </a:schemeClr>
+                </a:solidFill>
+                <a:latin typeface="+mn-lt"/>
+                <a:ea typeface="+mn-ea"/>
+                <a:cs typeface="+mn-cs"/>
+              </a:defRPr>
+            </a:lvl5pPr>
+            <a:lvl6pPr marL="2286000" indent="0" algn="ctr" defTabSz="457200" rtl="0" eaLnBrk="1" latinLnBrk="0" hangingPunct="1">
+              <a:spcBef>
+                <a:spcPts val="1000"/>
+              </a:spcBef>
+              <a:spcAft>
+                <a:spcPts val="0"/>
+              </a:spcAft>
+              <a:buClr>
+                <a:schemeClr val="accent1"/>
+              </a:buClr>
+              <a:buFont typeface="Wingdings 3" charset="2"/>
+              <a:buNone/>
+              <a:defRPr sz="1200" kern="1200">
+                <a:solidFill>
+                  <a:schemeClr val="tx1">
+                    <a:tint val="75000"/>
+                  </a:schemeClr>
+                </a:solidFill>
+                <a:latin typeface="+mn-lt"/>
+                <a:ea typeface="+mn-ea"/>
+                <a:cs typeface="+mn-cs"/>
+              </a:defRPr>
+            </a:lvl6pPr>
+            <a:lvl7pPr marL="2743200" indent="0" algn="ctr" defTabSz="457200" rtl="0" eaLnBrk="1" latinLnBrk="0" hangingPunct="1">
+              <a:spcBef>
+                <a:spcPts val="1000"/>
+              </a:spcBef>
+              <a:spcAft>
+                <a:spcPts val="0"/>
+              </a:spcAft>
+              <a:buClr>
+                <a:schemeClr val="accent1"/>
+              </a:buClr>
+              <a:buFont typeface="Wingdings 3" charset="2"/>
+              <a:buNone/>
+              <a:defRPr sz="1200" kern="1200">
+                <a:solidFill>
+                  <a:schemeClr val="tx1">
+                    <a:tint val="75000"/>
+                  </a:schemeClr>
+                </a:solidFill>
+                <a:latin typeface="+mn-lt"/>
+                <a:ea typeface="+mn-ea"/>
+                <a:cs typeface="+mn-cs"/>
+              </a:defRPr>
+            </a:lvl7pPr>
+            <a:lvl8pPr marL="3200400" indent="0" algn="ctr" defTabSz="457200" rtl="0" eaLnBrk="1" latinLnBrk="0" hangingPunct="1">
+              <a:spcBef>
+                <a:spcPts val="1000"/>
+              </a:spcBef>
+              <a:spcAft>
+                <a:spcPts val="0"/>
+              </a:spcAft>
+              <a:buClr>
+                <a:schemeClr val="accent1"/>
+              </a:buClr>
+              <a:buFont typeface="Wingdings 3" charset="2"/>
+              <a:buNone/>
+              <a:defRPr sz="1200" kern="1200">
+                <a:solidFill>
+                  <a:schemeClr val="tx1">
+                    <a:tint val="75000"/>
+                  </a:schemeClr>
+                </a:solidFill>
+                <a:latin typeface="+mn-lt"/>
+                <a:ea typeface="+mn-ea"/>
+                <a:cs typeface="+mn-cs"/>
+              </a:defRPr>
+            </a:lvl8pPr>
+            <a:lvl9pPr marL="3657600" indent="0" algn="ctr" defTabSz="457200" rtl="0" eaLnBrk="1" latinLnBrk="0" hangingPunct="1">
+              <a:spcBef>
+                <a:spcPts val="1000"/>
+              </a:spcBef>
+              <a:spcAft>
+                <a:spcPts val="0"/>
+              </a:spcAft>
+              <a:buClr>
+                <a:schemeClr val="accent1"/>
+              </a:buClr>
+              <a:buFont typeface="Wingdings 3" charset="2"/>
+              <a:buNone/>
+              <a:defRPr sz="1200" kern="1200">
+                <a:solidFill>
+                  <a:schemeClr val="tx1">
+                    <a:tint val="75000"/>
+                  </a:schemeClr>
+                </a:solidFill>
+                <a:latin typeface="+mn-lt"/>
+                <a:ea typeface="+mn-ea"/>
+                <a:cs typeface="+mn-cs"/>
+              </a:defRPr>
+            </a:lvl9pPr>
+          </a:lstStyle>
+          <a:p>
+            <a:r>
+              <a:rPr lang="en-US" sz="1400" dirty="0"/>
+              <a:t>📌</a:t>
+            </a:r>
+            <a:r>
+              <a:rPr lang="en-US" sz="1400" b="1" dirty="0"/>
+              <a:t>Nirmal:</a:t>
+            </a:r>
+          </a:p>
+          <a:p>
+            <a:r>
+              <a:rPr lang="en-US" sz="1400" b="1" dirty="0"/>
+              <a:t>1). </a:t>
+            </a:r>
+            <a:r>
+              <a:rPr lang="en-US" sz="1400" dirty="0"/>
+              <a:t>Nirmal is well known for its wooden toys. This city is also known as city of arts and crafts.</a:t>
+            </a:r>
+          </a:p>
+          <a:p>
+            <a:r>
+              <a:rPr lang="en-US" sz="1400" b="1" dirty="0"/>
+              <a:t>2). </a:t>
+            </a:r>
+            <a:r>
+              <a:rPr lang="en-US" sz="1400" dirty="0"/>
+              <a:t>Government can plan different </a:t>
+            </a:r>
+            <a:r>
+              <a:rPr lang="en-US" sz="1400" b="1" dirty="0"/>
+              <a:t>exhibitions</a:t>
+            </a:r>
+            <a:r>
+              <a:rPr lang="en-US" sz="1400" dirty="0"/>
+              <a:t> for the wooden paintings which are created by local bodies and organize some vents in which they provide </a:t>
+            </a:r>
+            <a:r>
+              <a:rPr lang="en-US" sz="1400" b="1" dirty="0"/>
+              <a:t>free toys</a:t>
+            </a:r>
+            <a:r>
+              <a:rPr lang="en-US" sz="1400" dirty="0"/>
+              <a:t> to the tourist and promote the arts of local peoples to the tourists.</a:t>
+            </a:r>
           </a:p>
         </p:txBody>
       </p:sp>
       <p:sp>
         <p:nvSpPr>
-          <p:cNvPr id="3" name="Subtitle 2">
+          <p:cNvPr id="10" name="Subtitle 2">
             <a:extLst>
               <a:ext uri="{FF2B5EF4-FFF2-40B4-BE49-F238E27FC236}">
-                <a16:creationId xmlns:a16="http://schemas.microsoft.com/office/drawing/2014/main" id="{9DBE146E-8902-43D9-45D6-CF7BB4079DD3}"/>
+                <a16:creationId xmlns:a16="http://schemas.microsoft.com/office/drawing/2014/main" id="{8EC409D8-D79F-170C-BFAB-983959F58AC2}"/>
               </a:ext>
             </a:extLst>
           </p:cNvPr>
-          <p:cNvSpPr>
-            <a:spLocks noGrp="1"/>
+          <p:cNvSpPr txBox="1">
+            <a:spLocks/>
           </p:cNvSpPr>
-          <p:nvPr>
-            <p:ph type="subTitle" idx="1"/>
-          </p:nvPr>
+          <p:nvPr/>
         </p:nvSpPr>
-        <p:spPr/>
+        <p:spPr>
+          <a:xfrm>
+            <a:off x="1091632" y="3810002"/>
+            <a:ext cx="3339736" cy="2883060"/>
+          </a:xfrm>
+          <a:prstGeom prst="roundRect">
+            <a:avLst/>
+          </a:prstGeom>
+        </p:spPr>
+        <p:style>
+          <a:lnRef idx="2">
+            <a:schemeClr val="accent5"/>
+          </a:lnRef>
+          <a:fillRef idx="1">
+            <a:schemeClr val="lt1"/>
+          </a:fillRef>
+          <a:effectRef idx="0">
+            <a:schemeClr val="accent5"/>
+          </a:effectRef>
+          <a:fontRef idx="minor">
+            <a:schemeClr val="dk1"/>
+          </a:fontRef>
+        </p:style>
         <p:txBody>
-          <a:bodyPr/>
-          <a:lstStyle/>
-          <a:p>
-            <a:endParaRPr lang="en-GB"/>
+          <a:bodyPr vert="horz" lIns="91440" tIns="45720" rIns="91440" bIns="45720" rtlCol="0" anchor="t">
+            <a:normAutofit fontScale="92500" lnSpcReduction="20000"/>
+          </a:bodyPr>
+          <a:lstStyle>
+            <a:lvl1pPr marL="0" indent="0" algn="l" defTabSz="457200" rtl="0" eaLnBrk="1" latinLnBrk="0" hangingPunct="1">
+              <a:spcBef>
+                <a:spcPts val="1000"/>
+              </a:spcBef>
+              <a:spcAft>
+                <a:spcPts val="0"/>
+              </a:spcAft>
+              <a:buClr>
+                <a:schemeClr val="accent1"/>
+              </a:buClr>
+              <a:buFont typeface="Wingdings 3" charset="2"/>
+              <a:buNone/>
+              <a:defRPr sz="1800" kern="1200">
+                <a:solidFill>
+                  <a:schemeClr val="tx1">
+                    <a:lumMod val="65000"/>
+                    <a:lumOff val="35000"/>
+                  </a:schemeClr>
+                </a:solidFill>
+                <a:latin typeface="+mn-lt"/>
+                <a:ea typeface="+mn-ea"/>
+                <a:cs typeface="+mn-cs"/>
+              </a:defRPr>
+            </a:lvl1pPr>
+            <a:lvl2pPr marL="457200" indent="0" algn="ctr" defTabSz="457200" rtl="0" eaLnBrk="1" latinLnBrk="0" hangingPunct="1">
+              <a:spcBef>
+                <a:spcPts val="1000"/>
+              </a:spcBef>
+              <a:spcAft>
+                <a:spcPts val="0"/>
+              </a:spcAft>
+              <a:buClr>
+                <a:schemeClr val="accent1"/>
+              </a:buClr>
+              <a:buFont typeface="Wingdings 3" charset="2"/>
+              <a:buNone/>
+              <a:defRPr sz="1600" kern="1200">
+                <a:solidFill>
+                  <a:schemeClr val="tx1">
+                    <a:tint val="75000"/>
+                  </a:schemeClr>
+                </a:solidFill>
+                <a:latin typeface="+mn-lt"/>
+                <a:ea typeface="+mn-ea"/>
+                <a:cs typeface="+mn-cs"/>
+              </a:defRPr>
+            </a:lvl2pPr>
+            <a:lvl3pPr marL="914400" indent="0" algn="ctr" defTabSz="457200" rtl="0" eaLnBrk="1" latinLnBrk="0" hangingPunct="1">
+              <a:spcBef>
+                <a:spcPts val="1000"/>
+              </a:spcBef>
+              <a:spcAft>
+                <a:spcPts val="0"/>
+              </a:spcAft>
+              <a:buClr>
+                <a:schemeClr val="accent1"/>
+              </a:buClr>
+              <a:buFont typeface="Wingdings 3" charset="2"/>
+              <a:buNone/>
+              <a:defRPr sz="1400" kern="1200">
+                <a:solidFill>
+                  <a:schemeClr val="tx1">
+                    <a:tint val="75000"/>
+                  </a:schemeClr>
+                </a:solidFill>
+                <a:latin typeface="+mn-lt"/>
+                <a:ea typeface="+mn-ea"/>
+                <a:cs typeface="+mn-cs"/>
+              </a:defRPr>
+            </a:lvl3pPr>
+            <a:lvl4pPr marL="1371600" indent="0" algn="ctr" defTabSz="457200" rtl="0" eaLnBrk="1" latinLnBrk="0" hangingPunct="1">
+              <a:spcBef>
+                <a:spcPts val="1000"/>
+              </a:spcBef>
+              <a:spcAft>
+                <a:spcPts val="0"/>
+              </a:spcAft>
+              <a:buClr>
+                <a:schemeClr val="accent1"/>
+              </a:buClr>
+              <a:buFont typeface="Wingdings 3" charset="2"/>
+              <a:buNone/>
+              <a:defRPr sz="1200" kern="1200">
+                <a:solidFill>
+                  <a:schemeClr val="tx1">
+                    <a:tint val="75000"/>
+                  </a:schemeClr>
+                </a:solidFill>
+                <a:latin typeface="+mn-lt"/>
+                <a:ea typeface="+mn-ea"/>
+                <a:cs typeface="+mn-cs"/>
+              </a:defRPr>
+            </a:lvl4pPr>
+            <a:lvl5pPr marL="1828800" indent="0" algn="ctr" defTabSz="457200" rtl="0" eaLnBrk="1" latinLnBrk="0" hangingPunct="1">
+              <a:spcBef>
+                <a:spcPts val="1000"/>
+              </a:spcBef>
+              <a:spcAft>
+                <a:spcPts val="0"/>
+              </a:spcAft>
+              <a:buClr>
+                <a:schemeClr val="accent1"/>
+              </a:buClr>
+              <a:buFont typeface="Wingdings 3" charset="2"/>
+              <a:buNone/>
+              <a:defRPr sz="1200" kern="1200">
+                <a:solidFill>
+                  <a:schemeClr val="tx1">
+                    <a:tint val="75000"/>
+                  </a:schemeClr>
+                </a:solidFill>
+                <a:latin typeface="+mn-lt"/>
+                <a:ea typeface="+mn-ea"/>
+                <a:cs typeface="+mn-cs"/>
+              </a:defRPr>
+            </a:lvl5pPr>
+            <a:lvl6pPr marL="2286000" indent="0" algn="ctr" defTabSz="457200" rtl="0" eaLnBrk="1" latinLnBrk="0" hangingPunct="1">
+              <a:spcBef>
+                <a:spcPts val="1000"/>
+              </a:spcBef>
+              <a:spcAft>
+                <a:spcPts val="0"/>
+              </a:spcAft>
+              <a:buClr>
+                <a:schemeClr val="accent1"/>
+              </a:buClr>
+              <a:buFont typeface="Wingdings 3" charset="2"/>
+              <a:buNone/>
+              <a:defRPr sz="1200" kern="1200">
+                <a:solidFill>
+                  <a:schemeClr val="tx1">
+                    <a:tint val="75000"/>
+                  </a:schemeClr>
+                </a:solidFill>
+                <a:latin typeface="+mn-lt"/>
+                <a:ea typeface="+mn-ea"/>
+                <a:cs typeface="+mn-cs"/>
+              </a:defRPr>
+            </a:lvl6pPr>
+            <a:lvl7pPr marL="2743200" indent="0" algn="ctr" defTabSz="457200" rtl="0" eaLnBrk="1" latinLnBrk="0" hangingPunct="1">
+              <a:spcBef>
+                <a:spcPts val="1000"/>
+              </a:spcBef>
+              <a:spcAft>
+                <a:spcPts val="0"/>
+              </a:spcAft>
+              <a:buClr>
+                <a:schemeClr val="accent1"/>
+              </a:buClr>
+              <a:buFont typeface="Wingdings 3" charset="2"/>
+              <a:buNone/>
+              <a:defRPr sz="1200" kern="1200">
+                <a:solidFill>
+                  <a:schemeClr val="tx1">
+                    <a:tint val="75000"/>
+                  </a:schemeClr>
+                </a:solidFill>
+                <a:latin typeface="+mn-lt"/>
+                <a:ea typeface="+mn-ea"/>
+                <a:cs typeface="+mn-cs"/>
+              </a:defRPr>
+            </a:lvl7pPr>
+            <a:lvl8pPr marL="3200400" indent="0" algn="ctr" defTabSz="457200" rtl="0" eaLnBrk="1" latinLnBrk="0" hangingPunct="1">
+              <a:spcBef>
+                <a:spcPts val="1000"/>
+              </a:spcBef>
+              <a:spcAft>
+                <a:spcPts val="0"/>
+              </a:spcAft>
+              <a:buClr>
+                <a:schemeClr val="accent1"/>
+              </a:buClr>
+              <a:buFont typeface="Wingdings 3" charset="2"/>
+              <a:buNone/>
+              <a:defRPr sz="1200" kern="1200">
+                <a:solidFill>
+                  <a:schemeClr val="tx1">
+                    <a:tint val="75000"/>
+                  </a:schemeClr>
+                </a:solidFill>
+                <a:latin typeface="+mn-lt"/>
+                <a:ea typeface="+mn-ea"/>
+                <a:cs typeface="+mn-cs"/>
+              </a:defRPr>
+            </a:lvl8pPr>
+            <a:lvl9pPr marL="3657600" indent="0" algn="ctr" defTabSz="457200" rtl="0" eaLnBrk="1" latinLnBrk="0" hangingPunct="1">
+              <a:spcBef>
+                <a:spcPts val="1000"/>
+              </a:spcBef>
+              <a:spcAft>
+                <a:spcPts val="0"/>
+              </a:spcAft>
+              <a:buClr>
+                <a:schemeClr val="accent1"/>
+              </a:buClr>
+              <a:buFont typeface="Wingdings 3" charset="2"/>
+              <a:buNone/>
+              <a:defRPr sz="1200" kern="1200">
+                <a:solidFill>
+                  <a:schemeClr val="tx1">
+                    <a:tint val="75000"/>
+                  </a:schemeClr>
+                </a:solidFill>
+                <a:latin typeface="+mn-lt"/>
+                <a:ea typeface="+mn-ea"/>
+                <a:cs typeface="+mn-cs"/>
+              </a:defRPr>
+            </a:lvl9pPr>
+          </a:lstStyle>
+          <a:p>
+            <a:r>
+              <a:rPr lang="en-US" sz="1400" dirty="0"/>
+              <a:t>📌</a:t>
+            </a:r>
+            <a:r>
+              <a:rPr lang="en-US" sz="1400" b="1" dirty="0"/>
+              <a:t>Hyderabad:</a:t>
+            </a:r>
+          </a:p>
+          <a:p>
+            <a:r>
+              <a:rPr lang="en-US" sz="1400" dirty="0"/>
+              <a:t>1). Hyderabad has many tourist places to visit, such as </a:t>
+            </a:r>
+            <a:r>
+              <a:rPr lang="en-US" sz="1400" b="1" dirty="0"/>
+              <a:t>palaces</a:t>
+            </a:r>
+            <a:r>
+              <a:rPr lang="en-US" sz="1400" dirty="0"/>
+              <a:t>, </a:t>
+            </a:r>
+            <a:r>
+              <a:rPr lang="en-US" sz="1400" b="1" dirty="0"/>
+              <a:t>forts</a:t>
+            </a:r>
+            <a:r>
+              <a:rPr lang="en-US" sz="1400" dirty="0"/>
+              <a:t> and </a:t>
+            </a:r>
+            <a:r>
+              <a:rPr lang="en-US" sz="1400" b="1" dirty="0"/>
+              <a:t>lakes</a:t>
+            </a:r>
+            <a:r>
+              <a:rPr lang="en-US" sz="1400" dirty="0"/>
+              <a:t>. It is also famous for its rich culture, buzzing markets and delicious cuisine.</a:t>
+            </a:r>
+          </a:p>
+          <a:p>
+            <a:r>
+              <a:rPr lang="en-US" sz="1400" b="1" dirty="0"/>
+              <a:t>2). </a:t>
+            </a:r>
+            <a:r>
+              <a:rPr lang="en-US" sz="1400" dirty="0"/>
+              <a:t>Government can take an initiative to allow tourist camping in </a:t>
+            </a:r>
+            <a:r>
+              <a:rPr lang="en-US" sz="1400" b="1" dirty="0"/>
+              <a:t>Nehru Zoo Park</a:t>
+            </a:r>
+            <a:r>
+              <a:rPr lang="en-US" sz="1400" dirty="0"/>
+              <a:t>, they can assign some tour guides or security persons which live with tourist camping in that park so that tourist will also connect with wildlife.</a:t>
+            </a:r>
+          </a:p>
+        </p:txBody>
+      </p:sp>
+      <p:sp>
+        <p:nvSpPr>
+          <p:cNvPr id="11" name="Subtitle 2">
+            <a:extLst>
+              <a:ext uri="{FF2B5EF4-FFF2-40B4-BE49-F238E27FC236}">
+                <a16:creationId xmlns:a16="http://schemas.microsoft.com/office/drawing/2014/main" id="{1DCE38D5-BC9C-338D-9C01-4EB1DFACF343}"/>
+              </a:ext>
+            </a:extLst>
+          </p:cNvPr>
+          <p:cNvSpPr txBox="1">
+            <a:spLocks/>
+          </p:cNvSpPr>
+          <p:nvPr/>
+        </p:nvSpPr>
+        <p:spPr>
+          <a:xfrm>
+            <a:off x="4595811" y="3810002"/>
+            <a:ext cx="3339736" cy="2883060"/>
+          </a:xfrm>
+          <a:prstGeom prst="roundRect">
+            <a:avLst/>
+          </a:prstGeom>
+        </p:spPr>
+        <p:style>
+          <a:lnRef idx="2">
+            <a:schemeClr val="accent5"/>
+          </a:lnRef>
+          <a:fillRef idx="1">
+            <a:schemeClr val="lt1"/>
+          </a:fillRef>
+          <a:effectRef idx="0">
+            <a:schemeClr val="accent5"/>
+          </a:effectRef>
+          <a:fontRef idx="minor">
+            <a:schemeClr val="dk1"/>
+          </a:fontRef>
+        </p:style>
+        <p:txBody>
+          <a:bodyPr vert="horz" lIns="91440" tIns="45720" rIns="91440" bIns="45720" rtlCol="0" anchor="t">
+            <a:normAutofit/>
+          </a:bodyPr>
+          <a:lstStyle>
+            <a:lvl1pPr marL="0" indent="0" algn="l" defTabSz="457200" rtl="0" eaLnBrk="1" latinLnBrk="0" hangingPunct="1">
+              <a:spcBef>
+                <a:spcPts val="1000"/>
+              </a:spcBef>
+              <a:spcAft>
+                <a:spcPts val="0"/>
+              </a:spcAft>
+              <a:buClr>
+                <a:schemeClr val="accent1"/>
+              </a:buClr>
+              <a:buFont typeface="Wingdings 3" charset="2"/>
+              <a:buNone/>
+              <a:defRPr sz="1800" kern="1200">
+                <a:solidFill>
+                  <a:schemeClr val="tx1">
+                    <a:lumMod val="65000"/>
+                    <a:lumOff val="35000"/>
+                  </a:schemeClr>
+                </a:solidFill>
+                <a:latin typeface="+mn-lt"/>
+                <a:ea typeface="+mn-ea"/>
+                <a:cs typeface="+mn-cs"/>
+              </a:defRPr>
+            </a:lvl1pPr>
+            <a:lvl2pPr marL="457200" indent="0" algn="ctr" defTabSz="457200" rtl="0" eaLnBrk="1" latinLnBrk="0" hangingPunct="1">
+              <a:spcBef>
+                <a:spcPts val="1000"/>
+              </a:spcBef>
+              <a:spcAft>
+                <a:spcPts val="0"/>
+              </a:spcAft>
+              <a:buClr>
+                <a:schemeClr val="accent1"/>
+              </a:buClr>
+              <a:buFont typeface="Wingdings 3" charset="2"/>
+              <a:buNone/>
+              <a:defRPr sz="1600" kern="1200">
+                <a:solidFill>
+                  <a:schemeClr val="tx1">
+                    <a:tint val="75000"/>
+                  </a:schemeClr>
+                </a:solidFill>
+                <a:latin typeface="+mn-lt"/>
+                <a:ea typeface="+mn-ea"/>
+                <a:cs typeface="+mn-cs"/>
+              </a:defRPr>
+            </a:lvl2pPr>
+            <a:lvl3pPr marL="914400" indent="0" algn="ctr" defTabSz="457200" rtl="0" eaLnBrk="1" latinLnBrk="0" hangingPunct="1">
+              <a:spcBef>
+                <a:spcPts val="1000"/>
+              </a:spcBef>
+              <a:spcAft>
+                <a:spcPts val="0"/>
+              </a:spcAft>
+              <a:buClr>
+                <a:schemeClr val="accent1"/>
+              </a:buClr>
+              <a:buFont typeface="Wingdings 3" charset="2"/>
+              <a:buNone/>
+              <a:defRPr sz="1400" kern="1200">
+                <a:solidFill>
+                  <a:schemeClr val="tx1">
+                    <a:tint val="75000"/>
+                  </a:schemeClr>
+                </a:solidFill>
+                <a:latin typeface="+mn-lt"/>
+                <a:ea typeface="+mn-ea"/>
+                <a:cs typeface="+mn-cs"/>
+              </a:defRPr>
+            </a:lvl3pPr>
+            <a:lvl4pPr marL="1371600" indent="0" algn="ctr" defTabSz="457200" rtl="0" eaLnBrk="1" latinLnBrk="0" hangingPunct="1">
+              <a:spcBef>
+                <a:spcPts val="1000"/>
+              </a:spcBef>
+              <a:spcAft>
+                <a:spcPts val="0"/>
+              </a:spcAft>
+              <a:buClr>
+                <a:schemeClr val="accent1"/>
+              </a:buClr>
+              <a:buFont typeface="Wingdings 3" charset="2"/>
+              <a:buNone/>
+              <a:defRPr sz="1200" kern="1200">
+                <a:solidFill>
+                  <a:schemeClr val="tx1">
+                    <a:tint val="75000"/>
+                  </a:schemeClr>
+                </a:solidFill>
+                <a:latin typeface="+mn-lt"/>
+                <a:ea typeface="+mn-ea"/>
+                <a:cs typeface="+mn-cs"/>
+              </a:defRPr>
+            </a:lvl4pPr>
+            <a:lvl5pPr marL="1828800" indent="0" algn="ctr" defTabSz="457200" rtl="0" eaLnBrk="1" latinLnBrk="0" hangingPunct="1">
+              <a:spcBef>
+                <a:spcPts val="1000"/>
+              </a:spcBef>
+              <a:spcAft>
+                <a:spcPts val="0"/>
+              </a:spcAft>
+              <a:buClr>
+                <a:schemeClr val="accent1"/>
+              </a:buClr>
+              <a:buFont typeface="Wingdings 3" charset="2"/>
+              <a:buNone/>
+              <a:defRPr sz="1200" kern="1200">
+                <a:solidFill>
+                  <a:schemeClr val="tx1">
+                    <a:tint val="75000"/>
+                  </a:schemeClr>
+                </a:solidFill>
+                <a:latin typeface="+mn-lt"/>
+                <a:ea typeface="+mn-ea"/>
+                <a:cs typeface="+mn-cs"/>
+              </a:defRPr>
+            </a:lvl5pPr>
+            <a:lvl6pPr marL="2286000" indent="0" algn="ctr" defTabSz="457200" rtl="0" eaLnBrk="1" latinLnBrk="0" hangingPunct="1">
+              <a:spcBef>
+                <a:spcPts val="1000"/>
+              </a:spcBef>
+              <a:spcAft>
+                <a:spcPts val="0"/>
+              </a:spcAft>
+              <a:buClr>
+                <a:schemeClr val="accent1"/>
+              </a:buClr>
+              <a:buFont typeface="Wingdings 3" charset="2"/>
+              <a:buNone/>
+              <a:defRPr sz="1200" kern="1200">
+                <a:solidFill>
+                  <a:schemeClr val="tx1">
+                    <a:tint val="75000"/>
+                  </a:schemeClr>
+                </a:solidFill>
+                <a:latin typeface="+mn-lt"/>
+                <a:ea typeface="+mn-ea"/>
+                <a:cs typeface="+mn-cs"/>
+              </a:defRPr>
+            </a:lvl6pPr>
+            <a:lvl7pPr marL="2743200" indent="0" algn="ctr" defTabSz="457200" rtl="0" eaLnBrk="1" latinLnBrk="0" hangingPunct="1">
+              <a:spcBef>
+                <a:spcPts val="1000"/>
+              </a:spcBef>
+              <a:spcAft>
+                <a:spcPts val="0"/>
+              </a:spcAft>
+              <a:buClr>
+                <a:schemeClr val="accent1"/>
+              </a:buClr>
+              <a:buFont typeface="Wingdings 3" charset="2"/>
+              <a:buNone/>
+              <a:defRPr sz="1200" kern="1200">
+                <a:solidFill>
+                  <a:schemeClr val="tx1">
+                    <a:tint val="75000"/>
+                  </a:schemeClr>
+                </a:solidFill>
+                <a:latin typeface="+mn-lt"/>
+                <a:ea typeface="+mn-ea"/>
+                <a:cs typeface="+mn-cs"/>
+              </a:defRPr>
+            </a:lvl7pPr>
+            <a:lvl8pPr marL="3200400" indent="0" algn="ctr" defTabSz="457200" rtl="0" eaLnBrk="1" latinLnBrk="0" hangingPunct="1">
+              <a:spcBef>
+                <a:spcPts val="1000"/>
+              </a:spcBef>
+              <a:spcAft>
+                <a:spcPts val="0"/>
+              </a:spcAft>
+              <a:buClr>
+                <a:schemeClr val="accent1"/>
+              </a:buClr>
+              <a:buFont typeface="Wingdings 3" charset="2"/>
+              <a:buNone/>
+              <a:defRPr sz="1200" kern="1200">
+                <a:solidFill>
+                  <a:schemeClr val="tx1">
+                    <a:tint val="75000"/>
+                  </a:schemeClr>
+                </a:solidFill>
+                <a:latin typeface="+mn-lt"/>
+                <a:ea typeface="+mn-ea"/>
+                <a:cs typeface="+mn-cs"/>
+              </a:defRPr>
+            </a:lvl8pPr>
+            <a:lvl9pPr marL="3657600" indent="0" algn="ctr" defTabSz="457200" rtl="0" eaLnBrk="1" latinLnBrk="0" hangingPunct="1">
+              <a:spcBef>
+                <a:spcPts val="1000"/>
+              </a:spcBef>
+              <a:spcAft>
+                <a:spcPts val="0"/>
+              </a:spcAft>
+              <a:buClr>
+                <a:schemeClr val="accent1"/>
+              </a:buClr>
+              <a:buFont typeface="Wingdings 3" charset="2"/>
+              <a:buNone/>
+              <a:defRPr sz="1200" kern="1200">
+                <a:solidFill>
+                  <a:schemeClr val="tx1">
+                    <a:tint val="75000"/>
+                  </a:schemeClr>
+                </a:solidFill>
+                <a:latin typeface="+mn-lt"/>
+                <a:ea typeface="+mn-ea"/>
+                <a:cs typeface="+mn-cs"/>
+              </a:defRPr>
+            </a:lvl9pPr>
+          </a:lstStyle>
+          <a:p>
+            <a:r>
+              <a:rPr lang="en-US" sz="1400" dirty="0"/>
+              <a:t>📌</a:t>
+            </a:r>
+            <a:r>
+              <a:rPr lang="en-US" sz="1400" b="1" dirty="0"/>
+              <a:t>Jagtial:</a:t>
+            </a:r>
+          </a:p>
+          <a:p>
+            <a:r>
+              <a:rPr lang="en-US" sz="1400" b="1" dirty="0"/>
+              <a:t>1). </a:t>
+            </a:r>
+            <a:r>
+              <a:rPr lang="en-US" sz="1400" dirty="0"/>
+              <a:t>Jagtial is famous for its temples and forts.</a:t>
+            </a:r>
+          </a:p>
+          <a:p>
+            <a:r>
+              <a:rPr lang="en-US" sz="1400" b="1" dirty="0"/>
+              <a:t>2). </a:t>
+            </a:r>
+            <a:r>
+              <a:rPr lang="en-US" sz="1400" dirty="0"/>
+              <a:t>Government can organize cultural events in </a:t>
+            </a:r>
+            <a:r>
+              <a:rPr lang="en-US" sz="1400" b="1" dirty="0"/>
+              <a:t>Sri Anjaneya Temple</a:t>
+            </a:r>
+            <a:r>
+              <a:rPr lang="en-US" sz="1400" dirty="0"/>
+              <a:t>, in which they organize </a:t>
+            </a:r>
+            <a:r>
+              <a:rPr lang="en-US" sz="1400" b="1" dirty="0"/>
+              <a:t>Dramatic Folk </a:t>
+            </a:r>
+            <a:r>
+              <a:rPr lang="en-US" sz="1400" dirty="0"/>
+              <a:t>of this temple which includes </a:t>
+            </a:r>
+            <a:r>
+              <a:rPr lang="en-US" sz="1400" b="1" dirty="0"/>
+              <a:t>history of this temple</a:t>
+            </a:r>
+            <a:r>
+              <a:rPr lang="en-US" sz="1400" dirty="0"/>
+              <a:t> and how it is made.</a:t>
+            </a:r>
+          </a:p>
+        </p:txBody>
+      </p:sp>
+      <p:sp>
+        <p:nvSpPr>
+          <p:cNvPr id="12" name="Subtitle 2">
+            <a:extLst>
+              <a:ext uri="{FF2B5EF4-FFF2-40B4-BE49-F238E27FC236}">
+                <a16:creationId xmlns:a16="http://schemas.microsoft.com/office/drawing/2014/main" id="{2F5143CA-B924-BC13-D11C-676958CEF5AB}"/>
+              </a:ext>
+            </a:extLst>
+          </p:cNvPr>
+          <p:cNvSpPr txBox="1">
+            <a:spLocks/>
+          </p:cNvSpPr>
+          <p:nvPr/>
+        </p:nvSpPr>
+        <p:spPr>
+          <a:xfrm>
+            <a:off x="8051191" y="3810001"/>
+            <a:ext cx="3339736" cy="2883060"/>
+          </a:xfrm>
+          <a:prstGeom prst="roundRect">
+            <a:avLst/>
+          </a:prstGeom>
+        </p:spPr>
+        <p:style>
+          <a:lnRef idx="2">
+            <a:schemeClr val="accent5"/>
+          </a:lnRef>
+          <a:fillRef idx="1">
+            <a:schemeClr val="lt1"/>
+          </a:fillRef>
+          <a:effectRef idx="0">
+            <a:schemeClr val="accent5"/>
+          </a:effectRef>
+          <a:fontRef idx="minor">
+            <a:schemeClr val="dk1"/>
+          </a:fontRef>
+        </p:style>
+        <p:txBody>
+          <a:bodyPr vert="horz" lIns="91440" tIns="45720" rIns="91440" bIns="45720" rtlCol="0" anchor="t">
+            <a:normAutofit fontScale="92500"/>
+          </a:bodyPr>
+          <a:lstStyle>
+            <a:lvl1pPr marL="0" indent="0" algn="l" defTabSz="457200" rtl="0" eaLnBrk="1" latinLnBrk="0" hangingPunct="1">
+              <a:spcBef>
+                <a:spcPts val="1000"/>
+              </a:spcBef>
+              <a:spcAft>
+                <a:spcPts val="0"/>
+              </a:spcAft>
+              <a:buClr>
+                <a:schemeClr val="accent1"/>
+              </a:buClr>
+              <a:buFont typeface="Wingdings 3" charset="2"/>
+              <a:buNone/>
+              <a:defRPr sz="1800" kern="1200">
+                <a:solidFill>
+                  <a:schemeClr val="tx1">
+                    <a:lumMod val="65000"/>
+                    <a:lumOff val="35000"/>
+                  </a:schemeClr>
+                </a:solidFill>
+                <a:latin typeface="+mn-lt"/>
+                <a:ea typeface="+mn-ea"/>
+                <a:cs typeface="+mn-cs"/>
+              </a:defRPr>
+            </a:lvl1pPr>
+            <a:lvl2pPr marL="457200" indent="0" algn="ctr" defTabSz="457200" rtl="0" eaLnBrk="1" latinLnBrk="0" hangingPunct="1">
+              <a:spcBef>
+                <a:spcPts val="1000"/>
+              </a:spcBef>
+              <a:spcAft>
+                <a:spcPts val="0"/>
+              </a:spcAft>
+              <a:buClr>
+                <a:schemeClr val="accent1"/>
+              </a:buClr>
+              <a:buFont typeface="Wingdings 3" charset="2"/>
+              <a:buNone/>
+              <a:defRPr sz="1600" kern="1200">
+                <a:solidFill>
+                  <a:schemeClr val="tx1">
+                    <a:tint val="75000"/>
+                  </a:schemeClr>
+                </a:solidFill>
+                <a:latin typeface="+mn-lt"/>
+                <a:ea typeface="+mn-ea"/>
+                <a:cs typeface="+mn-cs"/>
+              </a:defRPr>
+            </a:lvl2pPr>
+            <a:lvl3pPr marL="914400" indent="0" algn="ctr" defTabSz="457200" rtl="0" eaLnBrk="1" latinLnBrk="0" hangingPunct="1">
+              <a:spcBef>
+                <a:spcPts val="1000"/>
+              </a:spcBef>
+              <a:spcAft>
+                <a:spcPts val="0"/>
+              </a:spcAft>
+              <a:buClr>
+                <a:schemeClr val="accent1"/>
+              </a:buClr>
+              <a:buFont typeface="Wingdings 3" charset="2"/>
+              <a:buNone/>
+              <a:defRPr sz="1400" kern="1200">
+                <a:solidFill>
+                  <a:schemeClr val="tx1">
+                    <a:tint val="75000"/>
+                  </a:schemeClr>
+                </a:solidFill>
+                <a:latin typeface="+mn-lt"/>
+                <a:ea typeface="+mn-ea"/>
+                <a:cs typeface="+mn-cs"/>
+              </a:defRPr>
+            </a:lvl3pPr>
+            <a:lvl4pPr marL="1371600" indent="0" algn="ctr" defTabSz="457200" rtl="0" eaLnBrk="1" latinLnBrk="0" hangingPunct="1">
+              <a:spcBef>
+                <a:spcPts val="1000"/>
+              </a:spcBef>
+              <a:spcAft>
+                <a:spcPts val="0"/>
+              </a:spcAft>
+              <a:buClr>
+                <a:schemeClr val="accent1"/>
+              </a:buClr>
+              <a:buFont typeface="Wingdings 3" charset="2"/>
+              <a:buNone/>
+              <a:defRPr sz="1200" kern="1200">
+                <a:solidFill>
+                  <a:schemeClr val="tx1">
+                    <a:tint val="75000"/>
+                  </a:schemeClr>
+                </a:solidFill>
+                <a:latin typeface="+mn-lt"/>
+                <a:ea typeface="+mn-ea"/>
+                <a:cs typeface="+mn-cs"/>
+              </a:defRPr>
+            </a:lvl4pPr>
+            <a:lvl5pPr marL="1828800" indent="0" algn="ctr" defTabSz="457200" rtl="0" eaLnBrk="1" latinLnBrk="0" hangingPunct="1">
+              <a:spcBef>
+                <a:spcPts val="1000"/>
+              </a:spcBef>
+              <a:spcAft>
+                <a:spcPts val="0"/>
+              </a:spcAft>
+              <a:buClr>
+                <a:schemeClr val="accent1"/>
+              </a:buClr>
+              <a:buFont typeface="Wingdings 3" charset="2"/>
+              <a:buNone/>
+              <a:defRPr sz="1200" kern="1200">
+                <a:solidFill>
+                  <a:schemeClr val="tx1">
+                    <a:tint val="75000"/>
+                  </a:schemeClr>
+                </a:solidFill>
+                <a:latin typeface="+mn-lt"/>
+                <a:ea typeface="+mn-ea"/>
+                <a:cs typeface="+mn-cs"/>
+              </a:defRPr>
+            </a:lvl5pPr>
+            <a:lvl6pPr marL="2286000" indent="0" algn="ctr" defTabSz="457200" rtl="0" eaLnBrk="1" latinLnBrk="0" hangingPunct="1">
+              <a:spcBef>
+                <a:spcPts val="1000"/>
+              </a:spcBef>
+              <a:spcAft>
+                <a:spcPts val="0"/>
+              </a:spcAft>
+              <a:buClr>
+                <a:schemeClr val="accent1"/>
+              </a:buClr>
+              <a:buFont typeface="Wingdings 3" charset="2"/>
+              <a:buNone/>
+              <a:defRPr sz="1200" kern="1200">
+                <a:solidFill>
+                  <a:schemeClr val="tx1">
+                    <a:tint val="75000"/>
+                  </a:schemeClr>
+                </a:solidFill>
+                <a:latin typeface="+mn-lt"/>
+                <a:ea typeface="+mn-ea"/>
+                <a:cs typeface="+mn-cs"/>
+              </a:defRPr>
+            </a:lvl6pPr>
+            <a:lvl7pPr marL="2743200" indent="0" algn="ctr" defTabSz="457200" rtl="0" eaLnBrk="1" latinLnBrk="0" hangingPunct="1">
+              <a:spcBef>
+                <a:spcPts val="1000"/>
+              </a:spcBef>
+              <a:spcAft>
+                <a:spcPts val="0"/>
+              </a:spcAft>
+              <a:buClr>
+                <a:schemeClr val="accent1"/>
+              </a:buClr>
+              <a:buFont typeface="Wingdings 3" charset="2"/>
+              <a:buNone/>
+              <a:defRPr sz="1200" kern="1200">
+                <a:solidFill>
+                  <a:schemeClr val="tx1">
+                    <a:tint val="75000"/>
+                  </a:schemeClr>
+                </a:solidFill>
+                <a:latin typeface="+mn-lt"/>
+                <a:ea typeface="+mn-ea"/>
+                <a:cs typeface="+mn-cs"/>
+              </a:defRPr>
+            </a:lvl7pPr>
+            <a:lvl8pPr marL="3200400" indent="0" algn="ctr" defTabSz="457200" rtl="0" eaLnBrk="1" latinLnBrk="0" hangingPunct="1">
+              <a:spcBef>
+                <a:spcPts val="1000"/>
+              </a:spcBef>
+              <a:spcAft>
+                <a:spcPts val="0"/>
+              </a:spcAft>
+              <a:buClr>
+                <a:schemeClr val="accent1"/>
+              </a:buClr>
+              <a:buFont typeface="Wingdings 3" charset="2"/>
+              <a:buNone/>
+              <a:defRPr sz="1200" kern="1200">
+                <a:solidFill>
+                  <a:schemeClr val="tx1">
+                    <a:tint val="75000"/>
+                  </a:schemeClr>
+                </a:solidFill>
+                <a:latin typeface="+mn-lt"/>
+                <a:ea typeface="+mn-ea"/>
+                <a:cs typeface="+mn-cs"/>
+              </a:defRPr>
+            </a:lvl8pPr>
+            <a:lvl9pPr marL="3657600" indent="0" algn="ctr" defTabSz="457200" rtl="0" eaLnBrk="1" latinLnBrk="0" hangingPunct="1">
+              <a:spcBef>
+                <a:spcPts val="1000"/>
+              </a:spcBef>
+              <a:spcAft>
+                <a:spcPts val="0"/>
+              </a:spcAft>
+              <a:buClr>
+                <a:schemeClr val="accent1"/>
+              </a:buClr>
+              <a:buFont typeface="Wingdings 3" charset="2"/>
+              <a:buNone/>
+              <a:defRPr sz="1200" kern="1200">
+                <a:solidFill>
+                  <a:schemeClr val="tx1">
+                    <a:tint val="75000"/>
+                  </a:schemeClr>
+                </a:solidFill>
+                <a:latin typeface="+mn-lt"/>
+                <a:ea typeface="+mn-ea"/>
+                <a:cs typeface="+mn-cs"/>
+              </a:defRPr>
+            </a:lvl9pPr>
+          </a:lstStyle>
+          <a:p>
+            <a:r>
+              <a:rPr lang="en-US" sz="1400" dirty="0"/>
+              <a:t>📌</a:t>
+            </a:r>
+            <a:r>
+              <a:rPr lang="en-US" sz="1400" b="1" dirty="0"/>
+              <a:t>Sangareddy:</a:t>
+            </a:r>
+          </a:p>
+          <a:p>
+            <a:r>
+              <a:rPr lang="en-US" sz="1400" b="1" dirty="0"/>
+              <a:t>1). </a:t>
+            </a:r>
+            <a:r>
+              <a:rPr lang="en-US" sz="1400" dirty="0"/>
+              <a:t>Sangareddy offers something for everyone, from ancient monuments to modern shopping malls.</a:t>
+            </a:r>
+          </a:p>
+          <a:p>
+            <a:r>
+              <a:rPr lang="en-US" sz="1400" b="1" dirty="0"/>
+              <a:t>2). </a:t>
+            </a:r>
+            <a:r>
+              <a:rPr lang="en-US" sz="1400" dirty="0"/>
+              <a:t>Government can plan to educate tourist about </a:t>
+            </a:r>
+            <a:r>
+              <a:rPr lang="en-US" sz="1400" b="1" dirty="0"/>
+              <a:t>Singoor Project Dam</a:t>
+            </a:r>
+            <a:r>
+              <a:rPr lang="en-US" sz="1400" dirty="0"/>
+              <a:t>, which was built in 1989. They educate tourist that how this dam helps farmer in their </a:t>
+            </a:r>
+            <a:r>
+              <a:rPr lang="en-US" sz="1400" b="1" dirty="0"/>
+              <a:t>agriculture</a:t>
+            </a:r>
+            <a:r>
+              <a:rPr lang="en-US" sz="1400" dirty="0"/>
+              <a:t> and also how this dam </a:t>
+            </a:r>
+            <a:r>
+              <a:rPr lang="en-US" sz="1400" b="1" dirty="0"/>
+              <a:t>generates electricity</a:t>
+            </a:r>
+            <a:r>
+              <a:rPr lang="en-US" sz="1400" dirty="0"/>
+              <a:t>.</a:t>
+            </a:r>
           </a:p>
         </p:txBody>
       </p:sp>
@@ -17686,8 +19436,8 @@
           </a:p>
         </p:txBody>
       </p:sp>
-      <mc:AlternateContent xmlns:mc="http://schemas.openxmlformats.org/markup-compatibility/2006" xmlns:we="http://schemas.microsoft.com/office/webextensions/webextension/2010/11" xmlns:pca="http://schemas.microsoft.com/office/powerpoint/2013/contentapp">
-        <mc:Choice Requires="we pca">
+      <mc:AlternateContent xmlns:mc="http://schemas.openxmlformats.org/markup-compatibility/2006">
+        <mc:Choice xmlns:we="http://schemas.microsoft.com/office/webextensions/webextension/2010/11" xmlns:pca="http://schemas.microsoft.com/office/powerpoint/2013/contentapp" Requires="we pca">
           <p:graphicFrame>
             <p:nvGraphicFramePr>
               <p:cNvPr id="6" name="Add-in 5" title="Microsoft Power BI">
@@ -17719,7 +19469,7 @@
             </a:graphic>
           </p:graphicFrame>
         </mc:Choice>
-        <mc:Fallback xmlns="">
+        <mc:Fallback>
           <p:pic>
             <p:nvPicPr>
               <p:cNvPr id="6" name="Add-in 5" title="Microsoft Power BI">
@@ -17796,8 +19546,8 @@
           </a:p>
         </p:txBody>
       </p:sp>
-      <mc:AlternateContent xmlns:mc="http://schemas.openxmlformats.org/markup-compatibility/2006" xmlns:we="http://schemas.microsoft.com/office/webextensions/webextension/2010/11" xmlns:pca="http://schemas.microsoft.com/office/powerpoint/2013/contentapp">
-        <mc:Choice Requires="we pca">
+      <mc:AlternateContent xmlns:mc="http://schemas.openxmlformats.org/markup-compatibility/2006">
+        <mc:Choice xmlns:we="http://schemas.microsoft.com/office/webextensions/webextension/2010/11" xmlns:pca="http://schemas.microsoft.com/office/powerpoint/2013/contentapp" Requires="we pca">
           <p:graphicFrame>
             <p:nvGraphicFramePr>
               <p:cNvPr id="5" name="Add-in 4" title="Microsoft Power BI">
@@ -17829,7 +19579,7 @@
             </a:graphic>
           </p:graphicFrame>
         </mc:Choice>
-        <mc:Fallback xmlns="">
+        <mc:Fallback>
           <p:pic>
             <p:nvPicPr>
               <p:cNvPr id="5" name="Add-in 4" title="Microsoft Power BI">
@@ -17862,8 +19612,8 @@
           </p:pic>
         </mc:Fallback>
       </mc:AlternateContent>
-      <mc:AlternateContent xmlns:mc="http://schemas.openxmlformats.org/markup-compatibility/2006" xmlns:we="http://schemas.microsoft.com/office/webextensions/webextension/2010/11" xmlns:pca="http://schemas.microsoft.com/office/powerpoint/2013/contentapp">
-        <mc:Choice Requires="we pca">
+      <mc:AlternateContent xmlns:mc="http://schemas.openxmlformats.org/markup-compatibility/2006">
+        <mc:Choice xmlns:we="http://schemas.microsoft.com/office/webextensions/webextension/2010/11" xmlns:pca="http://schemas.microsoft.com/office/powerpoint/2013/contentapp" Requires="we pca">
           <p:graphicFrame>
             <p:nvGraphicFramePr>
               <p:cNvPr id="7" name="Add-in 6" title="Microsoft Power BI">
@@ -17895,7 +19645,7 @@
             </a:graphic>
           </p:graphicFrame>
         </mc:Choice>
-        <mc:Fallback xmlns="">
+        <mc:Fallback>
           <p:pic>
             <p:nvPicPr>
               <p:cNvPr id="7" name="Add-in 6" title="Microsoft Power BI">
@@ -17972,8 +19722,8 @@
           </a:p>
         </p:txBody>
       </p:sp>
-      <mc:AlternateContent xmlns:mc="http://schemas.openxmlformats.org/markup-compatibility/2006" xmlns:we="http://schemas.microsoft.com/office/webextensions/webextension/2010/11" xmlns:pca="http://schemas.microsoft.com/office/powerpoint/2013/contentapp">
-        <mc:Choice Requires="we pca">
+      <mc:AlternateContent xmlns:mc="http://schemas.openxmlformats.org/markup-compatibility/2006">
+        <mc:Choice xmlns:we="http://schemas.microsoft.com/office/webextensions/webextension/2010/11" xmlns:pca="http://schemas.microsoft.com/office/powerpoint/2013/contentapp" Requires="we pca">
           <p:graphicFrame>
             <p:nvGraphicFramePr>
               <p:cNvPr id="15" name="Add-in 14" title="Microsoft Power BI">
@@ -18005,7 +19755,7 @@
             </a:graphic>
           </p:graphicFrame>
         </mc:Choice>
-        <mc:Fallback xmlns="">
+        <mc:Fallback>
           <p:pic>
             <p:nvPicPr>
               <p:cNvPr id="15" name="Add-in 14" title="Microsoft Power BI">
@@ -19266,8 +21016,8 @@
           </a:p>
         </p:txBody>
       </p:sp>
-      <mc:AlternateContent xmlns:mc="http://schemas.openxmlformats.org/markup-compatibility/2006" xmlns:we="http://schemas.microsoft.com/office/webextensions/webextension/2010/11" xmlns:pca="http://schemas.microsoft.com/office/powerpoint/2013/contentapp">
-        <mc:Choice Requires="we pca">
+      <mc:AlternateContent xmlns:mc="http://schemas.openxmlformats.org/markup-compatibility/2006">
+        <mc:Choice xmlns:we="http://schemas.microsoft.com/office/webextensions/webextension/2010/11" xmlns:pca="http://schemas.microsoft.com/office/powerpoint/2013/contentapp" Requires="we pca">
           <p:graphicFrame>
             <p:nvGraphicFramePr>
               <p:cNvPr id="5" name="Add-in 4" title="Microsoft Power BI">
@@ -19293,7 +21043,7 @@
             </a:graphic>
           </p:graphicFrame>
         </mc:Choice>
-        <mc:Fallback xmlns="">
+        <mc:Fallback>
           <p:pic>
             <p:nvPicPr>
               <p:cNvPr id="5" name="Add-in 4" title="Microsoft Power BI">
@@ -19326,8 +21076,8 @@
           </p:pic>
         </mc:Fallback>
       </mc:AlternateContent>
-      <mc:AlternateContent xmlns:mc="http://schemas.openxmlformats.org/markup-compatibility/2006" xmlns:we="http://schemas.microsoft.com/office/webextensions/webextension/2010/11" xmlns:pca="http://schemas.microsoft.com/office/powerpoint/2013/contentapp">
-        <mc:Choice Requires="we pca">
+      <mc:AlternateContent xmlns:mc="http://schemas.openxmlformats.org/markup-compatibility/2006">
+        <mc:Choice xmlns:we="http://schemas.microsoft.com/office/webextensions/webextension/2010/11" xmlns:pca="http://schemas.microsoft.com/office/powerpoint/2013/contentapp" Requires="we pca">
           <p:graphicFrame>
             <p:nvGraphicFramePr>
               <p:cNvPr id="7" name="Add-in 6" title="Microsoft Power BI">
@@ -19359,7 +21109,7 @@
             </a:graphic>
           </p:graphicFrame>
         </mc:Choice>
-        <mc:Fallback xmlns="">
+        <mc:Fallback>
           <p:pic>
             <p:nvPicPr>
               <p:cNvPr id="7" name="Add-in 6" title="Microsoft Power BI">
@@ -19436,8 +21186,8 @@
           </a:p>
         </p:txBody>
       </p:sp>
-      <mc:AlternateContent xmlns:mc="http://schemas.openxmlformats.org/markup-compatibility/2006" xmlns:we="http://schemas.microsoft.com/office/webextensions/webextension/2010/11" xmlns:pca="http://schemas.microsoft.com/office/powerpoint/2013/contentapp">
-        <mc:Choice Requires="we pca">
+      <mc:AlternateContent xmlns:mc="http://schemas.openxmlformats.org/markup-compatibility/2006">
+        <mc:Choice xmlns:we="http://schemas.microsoft.com/office/webextensions/webextension/2010/11" xmlns:pca="http://schemas.microsoft.com/office/powerpoint/2013/contentapp" Requires="we pca">
           <p:graphicFrame>
             <p:nvGraphicFramePr>
               <p:cNvPr id="15" name="Add-in 14" title="Microsoft Power BI">
@@ -19463,7 +21213,7 @@
             </a:graphic>
           </p:graphicFrame>
         </mc:Choice>
-        <mc:Fallback xmlns="">
+        <mc:Fallback>
           <p:pic>
             <p:nvPicPr>
               <p:cNvPr id="15" name="Add-in 14" title="Microsoft Power BI">
@@ -20341,8 +22091,8 @@
           </a:prstGeom>
         </p:spPr>
       </p:pic>
-      <mc:AlternateContent xmlns:mc="http://schemas.openxmlformats.org/markup-compatibility/2006" xmlns:we="http://schemas.microsoft.com/office/webextensions/webextension/2010/11" xmlns:pca="http://schemas.microsoft.com/office/powerpoint/2013/contentapp">
-        <mc:Choice Requires="we pca">
+      <mc:AlternateContent xmlns:mc="http://schemas.openxmlformats.org/markup-compatibility/2006">
+        <mc:Choice xmlns:we="http://schemas.microsoft.com/office/webextensions/webextension/2010/11" xmlns:pca="http://schemas.microsoft.com/office/powerpoint/2013/contentapp" Requires="we pca">
           <p:graphicFrame>
             <p:nvGraphicFramePr>
               <p:cNvPr id="17" name="Add-in 16" title="Microsoft Power BI">
@@ -20374,7 +22124,7 @@
             </a:graphic>
           </p:graphicFrame>
         </mc:Choice>
-        <mc:Fallback xmlns="">
+        <mc:Fallback>
           <p:pic>
             <p:nvPicPr>
               <p:cNvPr id="17" name="Add-in 16" title="Microsoft Power BI">
@@ -20832,8 +22582,8 @@
           </a:prstGeom>
         </p:spPr>
       </p:pic>
-      <mc:AlternateContent xmlns:mc="http://schemas.openxmlformats.org/markup-compatibility/2006" xmlns:we="http://schemas.microsoft.com/office/webextensions/webextension/2010/11" xmlns:pca="http://schemas.microsoft.com/office/powerpoint/2013/contentapp">
-        <mc:Choice Requires="we pca">
+      <mc:AlternateContent xmlns:mc="http://schemas.openxmlformats.org/markup-compatibility/2006">
+        <mc:Choice xmlns:we="http://schemas.microsoft.com/office/webextensions/webextension/2010/11" xmlns:pca="http://schemas.microsoft.com/office/powerpoint/2013/contentapp" Requires="we pca">
           <p:graphicFrame>
             <p:nvGraphicFramePr>
               <p:cNvPr id="17" name="Add-in 16" title="Microsoft Power BI">
@@ -20865,7 +22615,7 @@
             </a:graphic>
           </p:graphicFrame>
         </mc:Choice>
-        <mc:Fallback xmlns="">
+        <mc:Fallback>
           <p:pic>
             <p:nvPicPr>
               <p:cNvPr id="17" name="Add-in 16" title="Microsoft Power BI">
@@ -21173,8 +22923,8 @@
           </a:p>
         </p:txBody>
       </p:sp>
-      <mc:AlternateContent xmlns:mc="http://schemas.openxmlformats.org/markup-compatibility/2006" xmlns:we="http://schemas.microsoft.com/office/webextensions/webextension/2010/11" xmlns:pca="http://schemas.microsoft.com/office/powerpoint/2013/contentapp">
-        <mc:Choice Requires="we pca">
+      <mc:AlternateContent xmlns:mc="http://schemas.openxmlformats.org/markup-compatibility/2006">
+        <mc:Choice xmlns:we="http://schemas.microsoft.com/office/webextensions/webextension/2010/11" xmlns:pca="http://schemas.microsoft.com/office/powerpoint/2013/contentapp" Requires="we pca">
           <p:graphicFrame>
             <p:nvGraphicFramePr>
               <p:cNvPr id="18" name="Add-in 17" title="Microsoft Power BI">
@@ -21206,7 +22956,7 @@
             </a:graphic>
           </p:graphicFrame>
         </mc:Choice>
-        <mc:Fallback xmlns="">
+        <mc:Fallback>
           <p:pic>
             <p:nvPicPr>
               <p:cNvPr id="18" name="Add-in 17" title="Microsoft Power BI">
@@ -21514,8 +23264,8 @@
           </a:p>
         </p:txBody>
       </p:sp>
-      <mc:AlternateContent xmlns:mc="http://schemas.openxmlformats.org/markup-compatibility/2006" xmlns:we="http://schemas.microsoft.com/office/webextensions/webextension/2010/11" xmlns:pca="http://schemas.microsoft.com/office/powerpoint/2013/contentapp">
-        <mc:Choice Requires="we pca">
+      <mc:AlternateContent xmlns:mc="http://schemas.openxmlformats.org/markup-compatibility/2006">
+        <mc:Choice xmlns:we="http://schemas.microsoft.com/office/webextensions/webextension/2010/11" xmlns:pca="http://schemas.microsoft.com/office/powerpoint/2013/contentapp" Requires="we pca">
           <p:graphicFrame>
             <p:nvGraphicFramePr>
               <p:cNvPr id="20" name="Add-in 19" title="Microsoft Power BI">
@@ -21547,7 +23297,7 @@
             </a:graphic>
           </p:graphicFrame>
         </mc:Choice>
-        <mc:Fallback xmlns="">
+        <mc:Fallback>
           <p:pic>
             <p:nvPicPr>
               <p:cNvPr id="20" name="Add-in 19" title="Microsoft Power BI">
@@ -21855,8 +23605,8 @@
           </a:p>
         </p:txBody>
       </p:sp>
-      <mc:AlternateContent xmlns:mc="http://schemas.openxmlformats.org/markup-compatibility/2006" xmlns:we="http://schemas.microsoft.com/office/webextensions/webextension/2010/11" xmlns:pca="http://schemas.microsoft.com/office/powerpoint/2013/contentapp">
-        <mc:Choice Requires="we pca">
+      <mc:AlternateContent xmlns:mc="http://schemas.openxmlformats.org/markup-compatibility/2006">
+        <mc:Choice xmlns:we="http://schemas.microsoft.com/office/webextensions/webextension/2010/11" xmlns:pca="http://schemas.microsoft.com/office/powerpoint/2013/contentapp" Requires="we pca">
           <p:graphicFrame>
             <p:nvGraphicFramePr>
               <p:cNvPr id="21" name="Add-in 20" title="Microsoft Power BI">
@@ -21888,7 +23638,7 @@
             </a:graphic>
           </p:graphicFrame>
         </mc:Choice>
-        <mc:Fallback xmlns="">
+        <mc:Fallback>
           <p:pic>
             <p:nvPicPr>
               <p:cNvPr id="21" name="Add-in 20" title="Microsoft Power BI">
@@ -22364,8 +24114,8 @@
           </a:prstGeom>
         </p:spPr>
       </p:pic>
-      <mc:AlternateContent xmlns:mc="http://schemas.openxmlformats.org/markup-compatibility/2006" xmlns:we="http://schemas.microsoft.com/office/webextensions/webextension/2010/11" xmlns:pca="http://schemas.microsoft.com/office/powerpoint/2013/contentapp">
-        <mc:Choice Requires="we pca">
+      <mc:AlternateContent xmlns:mc="http://schemas.openxmlformats.org/markup-compatibility/2006">
+        <mc:Choice xmlns:we="http://schemas.microsoft.com/office/webextensions/webextension/2010/11" xmlns:pca="http://schemas.microsoft.com/office/powerpoint/2013/contentapp" Requires="we pca">
           <p:graphicFrame>
             <p:nvGraphicFramePr>
               <p:cNvPr id="17" name="Add-in 16" title="Microsoft Power BI">
@@ -22391,7 +24141,7 @@
             </a:graphic>
           </p:graphicFrame>
         </mc:Choice>
-        <mc:Fallback xmlns="">
+        <mc:Fallback>
           <p:pic>
             <p:nvPicPr>
               <p:cNvPr id="17" name="Add-in 16" title="Microsoft Power BI">
@@ -22699,8 +24449,8 @@
           </a:p>
         </p:txBody>
       </p:sp>
-      <mc:AlternateContent xmlns:mc="http://schemas.openxmlformats.org/markup-compatibility/2006" xmlns:we="http://schemas.microsoft.com/office/webextensions/webextension/2010/11" xmlns:pca="http://schemas.microsoft.com/office/powerpoint/2013/contentapp">
-        <mc:Choice Requires="we pca">
+      <mc:AlternateContent xmlns:mc="http://schemas.openxmlformats.org/markup-compatibility/2006">
+        <mc:Choice xmlns:we="http://schemas.microsoft.com/office/webextensions/webextension/2010/11" xmlns:pca="http://schemas.microsoft.com/office/powerpoint/2013/contentapp" Requires="we pca">
           <p:graphicFrame>
             <p:nvGraphicFramePr>
               <p:cNvPr id="18" name="Add-in 17" title="Microsoft Power BI">
@@ -22732,7 +24482,7 @@
             </a:graphic>
           </p:graphicFrame>
         </mc:Choice>
-        <mc:Fallback xmlns="">
+        <mc:Fallback>
           <p:pic>
             <p:nvPicPr>
               <p:cNvPr id="18" name="Add-in 17" title="Microsoft Power BI">
@@ -23040,8 +24790,8 @@
           </a:p>
         </p:txBody>
       </p:sp>
-      <mc:AlternateContent xmlns:mc="http://schemas.openxmlformats.org/markup-compatibility/2006" xmlns:we="http://schemas.microsoft.com/office/webextensions/webextension/2010/11" xmlns:pca="http://schemas.microsoft.com/office/powerpoint/2013/contentapp">
-        <mc:Choice Requires="we pca">
+      <mc:AlternateContent xmlns:mc="http://schemas.openxmlformats.org/markup-compatibility/2006">
+        <mc:Choice xmlns:we="http://schemas.microsoft.com/office/webextensions/webextension/2010/11" xmlns:pca="http://schemas.microsoft.com/office/powerpoint/2013/contentapp" Requires="we pca">
           <p:graphicFrame>
             <p:nvGraphicFramePr>
               <p:cNvPr id="20" name="Add-in 19" title="Microsoft Power BI">
@@ -23067,7 +24817,7 @@
             </a:graphic>
           </p:graphicFrame>
         </mc:Choice>
-        <mc:Fallback xmlns="">
+        <mc:Fallback>
           <p:pic>
             <p:nvPicPr>
               <p:cNvPr id="20" name="Add-in 19" title="Microsoft Power BI">
@@ -23375,8 +25125,8 @@
           </a:p>
         </p:txBody>
       </p:sp>
-      <mc:AlternateContent xmlns:mc="http://schemas.openxmlformats.org/markup-compatibility/2006" xmlns:we="http://schemas.microsoft.com/office/webextensions/webextension/2010/11" xmlns:pca="http://schemas.microsoft.com/office/powerpoint/2013/contentapp">
-        <mc:Choice Requires="we pca">
+      <mc:AlternateContent xmlns:mc="http://schemas.openxmlformats.org/markup-compatibility/2006">
+        <mc:Choice xmlns:we="http://schemas.microsoft.com/office/webextensions/webextension/2010/11" xmlns:pca="http://schemas.microsoft.com/office/powerpoint/2013/contentapp" Requires="we pca">
           <p:graphicFrame>
             <p:nvGraphicFramePr>
               <p:cNvPr id="5" name="Add-in 4" title="Microsoft Power BI">
@@ -23408,7 +25158,7 @@
             </a:graphic>
           </p:graphicFrame>
         </mc:Choice>
-        <mc:Fallback xmlns="">
+        <mc:Fallback>
           <p:pic>
             <p:nvPicPr>
               <p:cNvPr id="5" name="Add-in 4" title="Microsoft Power BI">
@@ -23738,8 +25488,8 @@
           </a:prstGeom>
         </p:spPr>
       </p:pic>
-      <mc:AlternateContent xmlns:mc="http://schemas.openxmlformats.org/markup-compatibility/2006" xmlns:we="http://schemas.microsoft.com/office/webextensions/webextension/2010/11" xmlns:pca="http://schemas.microsoft.com/office/powerpoint/2013/contentapp">
-        <mc:Choice Requires="we pca">
+      <mc:AlternateContent xmlns:mc="http://schemas.openxmlformats.org/markup-compatibility/2006">
+        <mc:Choice xmlns:we="http://schemas.microsoft.com/office/webextensions/webextension/2010/11" xmlns:pca="http://schemas.microsoft.com/office/powerpoint/2013/contentapp" Requires="we pca">
           <p:graphicFrame>
             <p:nvGraphicFramePr>
               <p:cNvPr id="6" name="Add-in 5" title="Microsoft Power BI">
@@ -23771,7 +25521,7 @@
             </a:graphic>
           </p:graphicFrame>
         </mc:Choice>
-        <mc:Fallback xmlns="">
+        <mc:Fallback>
           <p:pic>
             <p:nvPicPr>
               <p:cNvPr id="6" name="Add-in 5" title="Microsoft Power BI">
@@ -24063,8 +25813,8 @@
           </a:p>
         </p:txBody>
       </p:sp>
-      <mc:AlternateContent xmlns:mc="http://schemas.openxmlformats.org/markup-compatibility/2006" xmlns:we="http://schemas.microsoft.com/office/webextensions/webextension/2010/11" xmlns:pca="http://schemas.microsoft.com/office/powerpoint/2013/contentapp">
-        <mc:Choice Requires="we pca">
+      <mc:AlternateContent xmlns:mc="http://schemas.openxmlformats.org/markup-compatibility/2006">
+        <mc:Choice xmlns:we="http://schemas.microsoft.com/office/webextensions/webextension/2010/11" xmlns:pca="http://schemas.microsoft.com/office/powerpoint/2013/contentapp" Requires="we pca">
           <p:graphicFrame>
             <p:nvGraphicFramePr>
               <p:cNvPr id="7" name="Add-in 6" title="Microsoft Power BI">
@@ -24096,7 +25846,7 @@
             </a:graphic>
           </p:graphicFrame>
         </mc:Choice>
-        <mc:Fallback xmlns="">
+        <mc:Fallback>
           <p:pic>
             <p:nvPicPr>
               <p:cNvPr id="7" name="Add-in 6" title="Microsoft Power BI">
@@ -24388,8 +26138,8 @@
           </a:p>
         </p:txBody>
       </p:sp>
-      <mc:AlternateContent xmlns:mc="http://schemas.openxmlformats.org/markup-compatibility/2006" xmlns:we="http://schemas.microsoft.com/office/webextensions/webextension/2010/11" xmlns:pca="http://schemas.microsoft.com/office/powerpoint/2013/contentapp">
-        <mc:Choice Requires="we pca">
+      <mc:AlternateContent xmlns:mc="http://schemas.openxmlformats.org/markup-compatibility/2006">
+        <mc:Choice xmlns:we="http://schemas.microsoft.com/office/webextensions/webextension/2010/11" xmlns:pca="http://schemas.microsoft.com/office/powerpoint/2013/contentapp" Requires="we pca">
           <p:graphicFrame>
             <p:nvGraphicFramePr>
               <p:cNvPr id="15" name="Add-in 14" title="Microsoft Power BI">
@@ -24421,7 +26171,7 @@
             </a:graphic>
           </p:graphicFrame>
         </mc:Choice>
-        <mc:Fallback xmlns="">
+        <mc:Fallback>
           <p:pic>
             <p:nvPicPr>
               <p:cNvPr id="15" name="Add-in 14" title="Microsoft Power BI">
@@ -24829,8 +26579,8 @@
           </a:p>
         </p:txBody>
       </p:sp>
-      <mc:AlternateContent xmlns:mc="http://schemas.openxmlformats.org/markup-compatibility/2006" xmlns:we="http://schemas.microsoft.com/office/webextensions/webextension/2010/11" xmlns:pca="http://schemas.microsoft.com/office/powerpoint/2013/contentapp">
-        <mc:Choice Requires="we pca">
+      <mc:AlternateContent xmlns:mc="http://schemas.openxmlformats.org/markup-compatibility/2006">
+        <mc:Choice xmlns:we="http://schemas.microsoft.com/office/webextensions/webextension/2010/11" xmlns:pca="http://schemas.microsoft.com/office/powerpoint/2013/contentapp" Requires="we pca">
           <p:graphicFrame>
             <p:nvGraphicFramePr>
               <p:cNvPr id="25" name="Add-in 24" title="Microsoft Power BI">
@@ -24862,7 +26612,7 @@
             </a:graphic>
           </p:graphicFrame>
         </mc:Choice>
-        <mc:Fallback xmlns="">
+        <mc:Fallback>
           <p:pic>
             <p:nvPicPr>
               <p:cNvPr id="25" name="Add-in 24" title="Microsoft Power BI">
@@ -25182,8 +26932,8 @@
           </a:prstGeom>
         </p:spPr>
       </p:pic>
-      <mc:AlternateContent xmlns:mc="http://schemas.openxmlformats.org/markup-compatibility/2006" xmlns:we="http://schemas.microsoft.com/office/webextensions/webextension/2010/11" xmlns:pca="http://schemas.microsoft.com/office/powerpoint/2013/contentapp">
-        <mc:Choice Requires="we pca">
+      <mc:AlternateContent xmlns:mc="http://schemas.openxmlformats.org/markup-compatibility/2006">
+        <mc:Choice xmlns:we="http://schemas.microsoft.com/office/webextensions/webextension/2010/11" xmlns:pca="http://schemas.microsoft.com/office/powerpoint/2013/contentapp" Requires="we pca">
           <p:graphicFrame>
             <p:nvGraphicFramePr>
               <p:cNvPr id="7" name="Add-in 6" title="Microsoft Power BI">
@@ -25215,7 +26965,7 @@
             </a:graphic>
           </p:graphicFrame>
         </mc:Choice>
-        <mc:Fallback xmlns="">
+        <mc:Fallback>
           <p:pic>
             <p:nvPicPr>
               <p:cNvPr id="7" name="Add-in 6" title="Microsoft Power BI">
@@ -25299,8 +27049,8 @@
           </a:p>
         </p:txBody>
       </p:sp>
-      <mc:AlternateContent xmlns:mc="http://schemas.openxmlformats.org/markup-compatibility/2006" xmlns:we="http://schemas.microsoft.com/office/webextensions/webextension/2010/11" xmlns:pca="http://schemas.microsoft.com/office/powerpoint/2013/contentapp">
-        <mc:Choice Requires="we pca">
+      <mc:AlternateContent xmlns:mc="http://schemas.openxmlformats.org/markup-compatibility/2006">
+        <mc:Choice xmlns:we="http://schemas.microsoft.com/office/webextensions/webextension/2010/11" xmlns:pca="http://schemas.microsoft.com/office/powerpoint/2013/contentapp" Requires="we pca">
           <p:graphicFrame>
             <p:nvGraphicFramePr>
               <p:cNvPr id="22" name="Add-in 21" title="Microsoft Power BI">
@@ -25332,7 +27082,7 @@
             </a:graphic>
           </p:graphicFrame>
         </mc:Choice>
-        <mc:Fallback xmlns="">
+        <mc:Fallback>
           <p:pic>
             <p:nvPicPr>
               <p:cNvPr id="22" name="Add-in 21" title="Microsoft Power BI">
@@ -26354,8 +28104,8 @@
           </a:p>
         </p:txBody>
       </p:sp>
-      <mc:AlternateContent xmlns:mc="http://schemas.openxmlformats.org/markup-compatibility/2006" xmlns:we="http://schemas.microsoft.com/office/webextensions/webextension/2010/11" xmlns:pca="http://schemas.microsoft.com/office/powerpoint/2013/contentapp">
-        <mc:Choice Requires="we pca">
+      <mc:AlternateContent xmlns:mc="http://schemas.openxmlformats.org/markup-compatibility/2006">
+        <mc:Choice xmlns:we="http://schemas.microsoft.com/office/webextensions/webextension/2010/11" xmlns:pca="http://schemas.microsoft.com/office/powerpoint/2013/contentapp" Requires="we pca">
           <p:graphicFrame>
             <p:nvGraphicFramePr>
               <p:cNvPr id="4" name="Add-in 3" title="Microsoft Power BI">
@@ -26387,7 +28137,7 @@
             </a:graphic>
           </p:graphicFrame>
         </mc:Choice>
-        <mc:Fallback xmlns="">
+        <mc:Fallback>
           <p:pic>
             <p:nvPicPr>
               <p:cNvPr id="4" name="Add-in 3" title="Microsoft Power BI">
@@ -26420,8 +28170,8 @@
           </p:pic>
         </mc:Fallback>
       </mc:AlternateContent>
-      <mc:AlternateContent xmlns:mc="http://schemas.openxmlformats.org/markup-compatibility/2006" xmlns:we="http://schemas.microsoft.com/office/webextensions/webextension/2010/11" xmlns:pca="http://schemas.microsoft.com/office/powerpoint/2013/contentapp">
-        <mc:Choice Requires="we pca">
+      <mc:AlternateContent xmlns:mc="http://schemas.openxmlformats.org/markup-compatibility/2006">
+        <mc:Choice xmlns:we="http://schemas.microsoft.com/office/webextensions/webextension/2010/11" xmlns:pca="http://schemas.microsoft.com/office/powerpoint/2013/contentapp" Requires="we pca">
           <p:graphicFrame>
             <p:nvGraphicFramePr>
               <p:cNvPr id="6" name="Add-in 5" title="Microsoft Power BI">
@@ -26453,7 +28203,7 @@
             </a:graphic>
           </p:graphicFrame>
         </mc:Choice>
-        <mc:Fallback xmlns="">
+        <mc:Fallback>
           <p:pic>
             <p:nvPicPr>
               <p:cNvPr id="6" name="Add-in 5" title="Microsoft Power BI">
@@ -28126,6 +29876,37 @@
 </we:webextension>
 </file>
 
+<file path=ppt/webextensions/webextension33.xml><?xml version="1.0" encoding="utf-8"?>
+<we:webextension xmlns:we="http://schemas.microsoft.com/office/webextensions/webextension/2010/11" id="{3BF4ABC1-C896-4C6F-9091-C4B2935C5BA5}">
+  <we:reference id="wa200003233" version="2.0.0.3" store="en-US" storeType="OMEX"/>
+  <we:alternateReferences>
+    <we:reference id="WA200003233" version="2.0.0.3" store="WA200003233" storeType="OMEX"/>
+  </we:alternateReferences>
+  <we:properties>
+    <we:property name="pptInsertionSessionID" value="&quot;22AE5732-23BE-41D2-BC1E-147A5291F598&quot;"/>
+    <we:property name="reportUrl" value="&quot;/groups/me/reports/e70feea7-9ed8-4355-bed3-d5381d601e01/ReportSection5c803e94c95124aa6ef4?ctid=ebec9c67-55a5-439b-bb63-b3091205e550&amp;pbi_source=shareVisual&amp;visual=04d1ff783ad33b014ef1&amp;height=542.53&amp;width=351.59&amp;bookmarkGuid=3c3526b7-872b-4a19-ad9b-2ad392b6b3c5&amp;fromEntryPoint=sharevisual&quot;"/>
+    <we:property name="artifactName" value="&quot;Highest Potential Districts&quot;"/>
+    <we:property name="reportName" value="&quot;Telangana_Tourism_ResumeChallenge&quot;"/>
+    <we:property name="reportState" value="&quot;CONNECTED&quot;"/>
+    <we:property name="embedUrl" value="&quot;/reportEmbed?reportId=e70feea7-9ed8-4355-bed3-d5381d601e01&amp;config=eyJjbHVzdGVyVXJsIjoiaHR0cHM6Ly9XQUJJLUlORElBLUNFTlRSQUwtQS1QUklNQVJZLXJlZGlyZWN0LmFuYWx5c2lzLndpbmRvd3MubmV0IiwiZW1iZWRGZWF0dXJlcyI6eyJtb2Rlcm5FbWJlZCI6dHJ1ZSwidXNhZ2VNZXRyaWNzVk5leHQiOnRydWV9fQ%3D%3D&amp;disableSensitivityBanner=true&quot;"/>
+    <we:property name="pageName" value="&quot;ReportSection5c803e94c95124aa6ef4&quot;"/>
+    <we:property name="pageDisplayName" value="&quot;Districts with Highest Potential&quot;"/>
+    <we:property name="datasetId" value="&quot;b140e74d-f57c-4169-9277-6930aac3a6e2&quot;"/>
+    <we:property name="backgroundColor" value="&quot;#FFF&quot;"/>
+    <we:property name="bookmark" value="&quot;H4sIAAAAAAAAA7VW23LTMBD9lY6eM4xvieW+0RQGBiiFdMoD02FW8jpR61hGlktDJ//OSnbaNECTdNq8RJejPWcvWvmW5aqpS1icwBzZITvS+moO5uogZANWPVzLh0ERyITnGcQyyGUgeUwoXVulq4Yd3jILZor2XDUtlM4gLX6/GDAoy1OYulkBZYMDVqNpdAWl+o0dmLasaXE5YHhTl9qAMzmxYNGZvSY4zUlK+MoxgrTqGicobbf6FWttbD8fSh7EmCUyG4ZRAjDCIqEzTbfrZW7HO1IvbKwrC6oiAW4tFmmKMaGGMspwBMOAR269UdW07F25P3u2qF34mhnQP8VJXBKjs0Nu9lF34LnOHWym8hwrtlzSrhAiiYoixTQVIU8g45ncymPxxgp9sx9TkOQhEfEY8jgWQZhgETpooUrbOy0Wb25qQ5mk/HZMZ7o+IZoO4yDnqwRFA/bW6LkH9xXVtOJni2ZBB5wdbDrkLZusNmj8ZTV4zFLuTFRWWUKyY9VYo6Sltc7/YDm4Q16tIz/g4uATQtMS9xqa6nKCJcXJU4x12c69rA2RujUSv2JxP/FKXOxOjaZCfqCmYbTeiygUlgQkns8mR3O08ETHyqzqNtqMSK9yVxVXmyreqekMG/vjVFsk76lGKMfET/lih0Of7877aC1W26JK57/N0KnyYapyZXtV7zfi1TxzJL10ECX+//hdcS3d76LrH2ukO4n52/tHNA3YTP8aG6TWlPdF19+K1/k1VBJdPPEJaf13ve6Q4U1FLgqPNgrpgzKegbGbzUI/a6U+2SWX+a7JE/ByrXOPycmpNovdK22v5F74OyJHSRyGPIykTCMRJyFA8hJdHmOZC17EUTYsOE+jNMnCl+nyI55yet+ykB6wEAIQQSJewiMe8BCjIC4w4wUGI1mE6VYeNadvg/14IM0iKQpAeq+GgeACk+2R25vHU92j2Rzp68YNdGubGiSeQtW1xborJ4UeR7cfqtxdRj/2L+RHRU9lJ+ocyta/D+5bqPOHdKq+z+1yoCvU5R/mcA90vAkAAA==&quot;"/>
+    <we:property name="initialStateBookmark" value="&quot;H4sIAAAAAAAAA7VWXU/bMBT9K8jP1ZSvNglvUJg2MaADxB4mhK6dm9Y0jTPHYXSo/33XTgpdt9EWQV8aXx/7nPvhaz+yTNZVAfMzmCHbZ4dKTWegp3s+67Gys52fn5weXJzcnh2cHpNZVUaqsmb7j8yAHqO5lnUDhd2BjN9vegyKYgRjO8qhqLHHKtS1KqGQv7AF05TRDS56DB+qQmmwW14aMGi3vSc4jYnb/xASIwgj7/EShWmtF1gpbbpxXyReiGkk0r4fRAADzCNaU7ezTuZmvCV1woaqNCBLEmBtIY9jDAnVF0GKA+h7SWDttSzHRefK89qreWXjVU+A/ilO/I4Y7T7kZhdmC56pzMImMsuwZIsFzXLOoyDPY4xj7icRpEkqNvIYfDBcPezG5EWZT0RJCFkYcs+PMPctNJeF6Zzm8+OHSlMmKb8t05WqzoimxVjI9TJBQY991GrmwF0J1Q3/0aCe0wK7D9Yt8pFdLifo++vy46WdMrtFaaQhJDuStdFSGLK1/nuL3hNyuoo8wfneKULdEPcKmuryEguKk6MYqqKZOVlrIlWjBV5g/jxwSmzsRlpRIf+hpmZk70TkEgsCEs+5zlAfzh3RkdTLug3WI9Kp3FbFdF3FJzmeYG1uR8ogeU81QjkmfsoX2++7fLfeByux2hRVWv9tglaVC1OZSdOp+rwWr/qNI+mkAy/w/8ufimthfzdt/1gh3UrM396/oKnHJurnUCO1pqwruu5UHGT3UAq08cRXpPXf9bpFhtcV2Si82CiEC8pwAtqsNwv1ppX6apds5tsmT8C7lc49JCfHSs+3r7SdknvjzogYRKHvJ34gRBzwMPIBovfo8hiKjCd5GKT9PEniII5S/326/CCJE7rfUp8uMB884F7E38OjxEt8DLwwxzTJ0RuI3I838sgZvQ1244E4DQTPAem+6ns84RhtjtzOPI7qGc1mSK8b+6EaU1cgcARl2xartpwkOhydfigzexjdt7shv0i6KltR11A07n6wb6HWH9Ipuz73wgL7Qlo2Ovr9BnF7qP6sCQAA&quot;"/>
+    <we:property name="isFooterCollapsed" value="true"/>
+    <we:property name="isFiltersActionButtonVisible" value="true"/>
+    <we:property name="reportEmbeddedTime" value="&quot;2023-05-18T18:14:09.557Z&quot;"/>
+    <we:property name="creatorTenantId" value="&quot;ebec9c67-55a5-439b-bb63-b3091205e550&quot;"/>
+    <we:property name="creatorUserId" value="&quot;100320028783E496&quot;"/>
+    <we:property name="creatorSessionId" value="&quot;78aeef5c-1484-48d5-b251-097e2152e7b8&quot;"/>
+  </we:properties>
+  <we:bindings/>
+  <we:snapshot xmlns:r="http://schemas.openxmlformats.org/officeDocument/2006/relationships" r:embed="rId1"/>
+</we:webextension>
+</file>
+
 <file path=ppt/webextensions/webextension4.xml><?xml version="1.0" encoding="utf-8"?>
 <we:webextension xmlns:we="http://schemas.microsoft.com/office/webextensions/webextension/2010/11" id="{90B5CA70-4D73-4455-B551-F3175D6345C6}">
   <we:reference id="wa200003233" version="2.0.0.3" store="en-US" storeType="OMEX"/>

</xml_diff>

<commit_message>
Added Dubai Vs Hyderabad slides
</commit_message>
<xml_diff>
--- a/Tourism Challenge by Codebasics.pptx
+++ b/Tourism Challenge by Codebasics.pptx
@@ -5,7 +5,7 @@
     <p:sldMasterId id="2147483672" r:id="rId1"/>
   </p:sldMasterIdLst>
   <p:notesMasterIdLst>
-    <p:notesMasterId r:id="rId16"/>
+    <p:notesMasterId r:id="rId18"/>
   </p:notesMasterIdLst>
   <p:sldIdLst>
     <p:sldId id="257" r:id="rId2"/>
@@ -22,6 +22,8 @@
     <p:sldId id="269" r:id="rId13"/>
     <p:sldId id="270" r:id="rId14"/>
     <p:sldId id="260" r:id="rId15"/>
+    <p:sldId id="271" r:id="rId16"/>
+    <p:sldId id="272" r:id="rId17"/>
   </p:sldIdLst>
   <p:sldSz cx="12192000" cy="6858000"/>
   <p:notesSz cx="6858000" cy="9144000"/>
@@ -210,7 +212,7 @@
           <a:p>
             <a:fld id="{F01155BC-68E8-4E70-AA51-66102542D7A4}" type="datetimeFigureOut">
               <a:rPr lang="en-GB" smtClean="0"/>
-              <a:t>18/05/2023</a:t>
+              <a:t>19/05/2023</a:t>
             </a:fld>
             <a:endParaRPr lang="en-GB"/>
           </a:p>
@@ -666,7 +668,7 @@
           <a:p>
             <a:fld id="{8B57F4E9-D63C-491B-9CDB-487106511475}" type="datetime1">
               <a:rPr lang="en-GB" smtClean="0"/>
-              <a:t>18/05/2023</a:t>
+              <a:t>19/05/2023</a:t>
             </a:fld>
             <a:endParaRPr lang="en-GB"/>
           </a:p>
@@ -1004,7 +1006,7 @@
           <a:p>
             <a:fld id="{C7464D9F-93E2-4825-BE27-3A747728D631}" type="datetime1">
               <a:rPr lang="en-GB" smtClean="0"/>
-              <a:t>18/05/2023</a:t>
+              <a:t>19/05/2023</a:t>
             </a:fld>
             <a:endParaRPr lang="en-GB"/>
           </a:p>
@@ -1405,7 +1407,7 @@
           <a:p>
             <a:fld id="{2353CC10-07CF-4DC9-B0AD-B4C4305DAB63}" type="datetime1">
               <a:rPr lang="en-GB" smtClean="0"/>
-              <a:t>18/05/2023</a:t>
+              <a:t>19/05/2023</a:t>
             </a:fld>
             <a:endParaRPr lang="en-GB"/>
           </a:p>
@@ -1741,7 +1743,7 @@
           <a:p>
             <a:fld id="{8507E47A-BCB5-4509-8C26-5BF03D08F653}" type="datetime1">
               <a:rPr lang="en-GB" smtClean="0"/>
-              <a:t>18/05/2023</a:t>
+              <a:t>19/05/2023</a:t>
             </a:fld>
             <a:endParaRPr lang="en-GB"/>
           </a:p>
@@ -2061,7 +2063,7 @@
           <a:p>
             <a:fld id="{78080A8A-2862-4371-A015-3B70ABD235E8}" type="datetime1">
               <a:rPr lang="en-GB" smtClean="0"/>
-              <a:t>18/05/2023</a:t>
+              <a:t>19/05/2023</a:t>
             </a:fld>
             <a:endParaRPr lang="en-GB"/>
           </a:p>
@@ -2457,7 +2459,7 @@
           <a:p>
             <a:fld id="{95620053-143D-48AF-B577-60A89844B83D}" type="datetime1">
               <a:rPr lang="en-GB" smtClean="0"/>
-              <a:t>18/05/2023</a:t>
+              <a:t>19/05/2023</a:t>
             </a:fld>
             <a:endParaRPr lang="en-GB"/>
           </a:p>
@@ -2714,7 +2716,7 @@
           <a:p>
             <a:fld id="{D0CA173A-7A42-476A-A4A3-CBF1D0B01D0C}" type="datetime1">
               <a:rPr lang="en-GB" smtClean="0"/>
-              <a:t>18/05/2023</a:t>
+              <a:t>19/05/2023</a:t>
             </a:fld>
             <a:endParaRPr lang="en-GB"/>
           </a:p>
@@ -2976,7 +2978,7 @@
           <a:p>
             <a:fld id="{AC413055-D8FF-4B18-B168-52849FB3C36A}" type="datetime1">
               <a:rPr lang="en-GB" smtClean="0"/>
-              <a:t>18/05/2023</a:t>
+              <a:t>19/05/2023</a:t>
             </a:fld>
             <a:endParaRPr lang="en-GB"/>
           </a:p>
@@ -3238,7 +3240,7 @@
           <a:p>
             <a:fld id="{568D091B-AD2D-4723-BE73-38D61683AB2B}" type="datetime1">
               <a:rPr lang="en-GB" smtClean="0"/>
-              <a:t>18/05/2023</a:t>
+              <a:t>19/05/2023</a:t>
             </a:fld>
             <a:endParaRPr lang="en-GB"/>
           </a:p>
@@ -3567,7 +3569,7 @@
           <a:p>
             <a:fld id="{DC16961F-C154-45F4-834A-F8C50D956FDE}" type="datetime1">
               <a:rPr lang="en-GB" smtClean="0"/>
-              <a:t>18/05/2023</a:t>
+              <a:t>19/05/2023</a:t>
             </a:fld>
             <a:endParaRPr lang="en-GB"/>
           </a:p>
@@ -3890,7 +3892,7 @@
           <a:p>
             <a:fld id="{CB47A651-964E-43A9-A83E-8DD2BC558739}" type="datetime1">
               <a:rPr lang="en-GB" smtClean="0"/>
-              <a:t>18/05/2023</a:t>
+              <a:t>19/05/2023</a:t>
             </a:fld>
             <a:endParaRPr lang="en-GB"/>
           </a:p>
@@ -4347,7 +4349,7 @@
           <a:p>
             <a:fld id="{0EFE42C3-13DA-4EA7-B545-3275A0CE6940}" type="datetime1">
               <a:rPr lang="en-GB" smtClean="0"/>
-              <a:t>18/05/2023</a:t>
+              <a:t>19/05/2023</a:t>
             </a:fld>
             <a:endParaRPr lang="en-GB"/>
           </a:p>
@@ -4552,7 +4554,7 @@
           <a:p>
             <a:fld id="{7B78A956-C1E2-4E01-B903-153997590213}" type="datetime1">
               <a:rPr lang="en-GB" smtClean="0"/>
-              <a:t>18/05/2023</a:t>
+              <a:t>19/05/2023</a:t>
             </a:fld>
             <a:endParaRPr lang="en-GB"/>
           </a:p>
@@ -4729,7 +4731,7 @@
           <a:p>
             <a:fld id="{A1C823BD-0D6D-486C-A323-43F017C1F6ED}" type="datetime1">
               <a:rPr lang="en-GB" smtClean="0"/>
-              <a:t>18/05/2023</a:t>
+              <a:t>19/05/2023</a:t>
             </a:fld>
             <a:endParaRPr lang="en-GB"/>
           </a:p>
@@ -5062,7 +5064,7 @@
           <a:p>
             <a:fld id="{51D9B9EF-9BB6-4B89-88A1-C88222172CA7}" type="datetime1">
               <a:rPr lang="en-GB" smtClean="0"/>
-              <a:t>18/05/2023</a:t>
+              <a:t>19/05/2023</a:t>
             </a:fld>
             <a:endParaRPr lang="en-GB"/>
           </a:p>
@@ -5407,7 +5409,7 @@
           <a:p>
             <a:fld id="{2D96C3ED-9CE7-4DF4-B93D-591A49E1B1CD}" type="datetime1">
               <a:rPr lang="en-GB" smtClean="0"/>
-              <a:t>18/05/2023</a:t>
+              <a:t>19/05/2023</a:t>
             </a:fld>
             <a:endParaRPr lang="en-GB"/>
           </a:p>
@@ -7524,7 +7526,7 @@
           <a:p>
             <a:fld id="{3C755816-C22F-4A12-A506-DD7B7874D7E9}" type="datetime1">
               <a:rPr lang="en-GB" smtClean="0"/>
-              <a:t>18/05/2023</a:t>
+              <a:t>19/05/2023</a:t>
             </a:fld>
             <a:endParaRPr lang="en-GB"/>
           </a:p>
@@ -8176,8 +8178,8 @@
         </p:nvSpPr>
         <p:spPr>
           <a:xfrm>
-            <a:off x="1961873" y="4837044"/>
-            <a:ext cx="8262131" cy="1046922"/>
+            <a:off x="1454127" y="5015949"/>
+            <a:ext cx="9515061" cy="1046922"/>
           </a:xfrm>
           <a:noFill/>
         </p:spPr>
@@ -18729,6 +18731,2940 @@
     <p:extLst>
       <p:ext uri="{BB962C8B-B14F-4D97-AF65-F5344CB8AC3E}">
         <p14:creationId xmlns:p14="http://schemas.microsoft.com/office/powerpoint/2010/main" val="1694899925"/>
+      </p:ext>
+    </p:extLst>
+  </p:cSld>
+  <p:clrMapOvr>
+    <a:masterClrMapping/>
+  </p:clrMapOvr>
+</p:sld>
+</file>
+
+<file path=ppt/slides/slide15.xml><?xml version="1.0" encoding="utf-8"?>
+<p:sld xmlns:a="http://schemas.openxmlformats.org/drawingml/2006/main" xmlns:r="http://schemas.openxmlformats.org/officeDocument/2006/relationships" xmlns:p="http://schemas.openxmlformats.org/presentationml/2006/main">
+  <p:cSld>
+    <p:spTree>
+      <p:nvGrpSpPr>
+        <p:cNvPr id="1" name=""/>
+        <p:cNvGrpSpPr/>
+        <p:nvPr/>
+      </p:nvGrpSpPr>
+      <p:grpSpPr>
+        <a:xfrm>
+          <a:off x="0" y="0"/>
+          <a:ext cx="0" cy="0"/>
+          <a:chOff x="0" y="0"/>
+          <a:chExt cx="0" cy="0"/>
+        </a:xfrm>
+      </p:grpSpPr>
+      <p:sp>
+        <p:nvSpPr>
+          <p:cNvPr id="4" name="Title 1">
+            <a:extLst>
+              <a:ext uri="{FF2B5EF4-FFF2-40B4-BE49-F238E27FC236}">
+                <a16:creationId xmlns:a16="http://schemas.microsoft.com/office/drawing/2014/main" id="{C6EC006E-EC7E-B586-58C8-0B9A78BD44C2}"/>
+              </a:ext>
+            </a:extLst>
+          </p:cNvPr>
+          <p:cNvSpPr txBox="1">
+            <a:spLocks/>
+          </p:cNvSpPr>
+          <p:nvPr/>
+        </p:nvSpPr>
+        <p:spPr>
+          <a:xfrm>
+            <a:off x="1456858" y="53332"/>
+            <a:ext cx="9278283" cy="515798"/>
+          </a:xfrm>
+          <a:prstGeom prst="snipRoundRect">
+            <a:avLst/>
+          </a:prstGeom>
+          <a:solidFill>
+            <a:schemeClr val="bg1">
+              <a:lumMod val="85000"/>
+            </a:schemeClr>
+          </a:solidFill>
+        </p:spPr>
+        <p:style>
+          <a:lnRef idx="2">
+            <a:schemeClr val="accent6"/>
+          </a:lnRef>
+          <a:fillRef idx="1">
+            <a:schemeClr val="lt1"/>
+          </a:fillRef>
+          <a:effectRef idx="0">
+            <a:schemeClr val="accent6"/>
+          </a:effectRef>
+          <a:fontRef idx="minor">
+            <a:schemeClr val="dk1"/>
+          </a:fontRef>
+        </p:style>
+        <p:txBody>
+          <a:bodyPr vert="horz" lIns="91440" tIns="45720" rIns="91440" bIns="45720" rtlCol="0" anchor="b">
+            <a:noAutofit/>
+          </a:bodyPr>
+          <a:lstStyle>
+            <a:lvl1pPr algn="l" defTabSz="457200" rtl="0" eaLnBrk="1" latinLnBrk="0" hangingPunct="1">
+              <a:spcBef>
+                <a:spcPct val="0"/>
+              </a:spcBef>
+              <a:buNone/>
+              <a:defRPr sz="5400" kern="1200">
+                <a:solidFill>
+                  <a:schemeClr val="dk1"/>
+                </a:solidFill>
+                <a:latin typeface="+mn-lt"/>
+                <a:ea typeface="+mn-ea"/>
+                <a:cs typeface="+mn-cs"/>
+              </a:defRPr>
+            </a:lvl1pPr>
+            <a:lvl2pPr eaLnBrk="1" hangingPunct="1">
+              <a:defRPr>
+                <a:solidFill>
+                  <a:schemeClr val="dk1"/>
+                </a:solidFill>
+                <a:latin typeface="+mn-lt"/>
+                <a:ea typeface="+mn-ea"/>
+                <a:cs typeface="+mn-cs"/>
+              </a:defRPr>
+            </a:lvl2pPr>
+            <a:lvl3pPr eaLnBrk="1" hangingPunct="1">
+              <a:defRPr>
+                <a:solidFill>
+                  <a:schemeClr val="dk1"/>
+                </a:solidFill>
+                <a:latin typeface="+mn-lt"/>
+                <a:ea typeface="+mn-ea"/>
+                <a:cs typeface="+mn-cs"/>
+              </a:defRPr>
+            </a:lvl3pPr>
+            <a:lvl4pPr eaLnBrk="1" hangingPunct="1">
+              <a:defRPr>
+                <a:solidFill>
+                  <a:schemeClr val="dk1"/>
+                </a:solidFill>
+                <a:latin typeface="+mn-lt"/>
+                <a:ea typeface="+mn-ea"/>
+                <a:cs typeface="+mn-cs"/>
+              </a:defRPr>
+            </a:lvl4pPr>
+            <a:lvl5pPr eaLnBrk="1" hangingPunct="1">
+              <a:defRPr>
+                <a:solidFill>
+                  <a:schemeClr val="dk1"/>
+                </a:solidFill>
+                <a:latin typeface="+mn-lt"/>
+                <a:ea typeface="+mn-ea"/>
+                <a:cs typeface="+mn-cs"/>
+              </a:defRPr>
+            </a:lvl5pPr>
+            <a:lvl6pPr eaLnBrk="1" hangingPunct="1">
+              <a:defRPr>
+                <a:solidFill>
+                  <a:schemeClr val="dk1"/>
+                </a:solidFill>
+                <a:latin typeface="+mn-lt"/>
+                <a:ea typeface="+mn-ea"/>
+                <a:cs typeface="+mn-cs"/>
+              </a:defRPr>
+            </a:lvl6pPr>
+            <a:lvl7pPr eaLnBrk="1" hangingPunct="1">
+              <a:defRPr>
+                <a:solidFill>
+                  <a:schemeClr val="dk1"/>
+                </a:solidFill>
+                <a:latin typeface="+mn-lt"/>
+                <a:ea typeface="+mn-ea"/>
+                <a:cs typeface="+mn-cs"/>
+              </a:defRPr>
+            </a:lvl7pPr>
+            <a:lvl8pPr eaLnBrk="1" hangingPunct="1">
+              <a:defRPr>
+                <a:solidFill>
+                  <a:schemeClr val="dk1"/>
+                </a:solidFill>
+                <a:latin typeface="+mn-lt"/>
+                <a:ea typeface="+mn-ea"/>
+                <a:cs typeface="+mn-cs"/>
+              </a:defRPr>
+            </a:lvl8pPr>
+            <a:lvl9pPr eaLnBrk="1" hangingPunct="1">
+              <a:defRPr>
+                <a:solidFill>
+                  <a:schemeClr val="dk1"/>
+                </a:solidFill>
+                <a:latin typeface="+mn-lt"/>
+                <a:ea typeface="+mn-ea"/>
+                <a:cs typeface="+mn-cs"/>
+              </a:defRPr>
+            </a:lvl9pPr>
+          </a:lstStyle>
+          <a:p>
+            <a:pPr algn="ctr"/>
+            <a:r>
+              <a:rPr lang="en-US" sz="3200" dirty="0"/>
+              <a:t>Cultural / Corporate Events to Boost Tourism</a:t>
+            </a:r>
+            <a:endParaRPr lang="en-GB" sz="3200" dirty="0"/>
+          </a:p>
+        </p:txBody>
+      </p:sp>
+      <p:sp>
+        <p:nvSpPr>
+          <p:cNvPr id="6" name="Subtitle 2">
+            <a:extLst>
+              <a:ext uri="{FF2B5EF4-FFF2-40B4-BE49-F238E27FC236}">
+                <a16:creationId xmlns:a16="http://schemas.microsoft.com/office/drawing/2014/main" id="{4DE28FAB-0E9E-1BDF-7B8C-2E3764807F78}"/>
+              </a:ext>
+            </a:extLst>
+          </p:cNvPr>
+          <p:cNvSpPr txBox="1">
+            <a:spLocks/>
+          </p:cNvSpPr>
+          <p:nvPr/>
+        </p:nvSpPr>
+        <p:spPr>
+          <a:xfrm>
+            <a:off x="4595813" y="748035"/>
+            <a:ext cx="3679918" cy="2883061"/>
+          </a:xfrm>
+          <a:prstGeom prst="roundRect">
+            <a:avLst/>
+          </a:prstGeom>
+        </p:spPr>
+        <p:style>
+          <a:lnRef idx="2">
+            <a:schemeClr val="accent5"/>
+          </a:lnRef>
+          <a:fillRef idx="1">
+            <a:schemeClr val="lt1"/>
+          </a:fillRef>
+          <a:effectRef idx="0">
+            <a:schemeClr val="accent5"/>
+          </a:effectRef>
+          <a:fontRef idx="minor">
+            <a:schemeClr val="dk1"/>
+          </a:fontRef>
+        </p:style>
+        <p:txBody>
+          <a:bodyPr vert="horz" lIns="91440" tIns="45720" rIns="91440" bIns="45720" rtlCol="0" anchor="t">
+            <a:normAutofit fontScale="62500" lnSpcReduction="20000"/>
+          </a:bodyPr>
+          <a:lstStyle>
+            <a:lvl1pPr marL="0" indent="0" algn="l" defTabSz="457200" rtl="0" eaLnBrk="1" latinLnBrk="0" hangingPunct="1">
+              <a:spcBef>
+                <a:spcPts val="1000"/>
+              </a:spcBef>
+              <a:spcAft>
+                <a:spcPts val="0"/>
+              </a:spcAft>
+              <a:buClr>
+                <a:schemeClr val="accent1"/>
+              </a:buClr>
+              <a:buFont typeface="Wingdings 3" charset="2"/>
+              <a:buNone/>
+              <a:defRPr sz="1800" kern="1200">
+                <a:solidFill>
+                  <a:schemeClr val="tx1">
+                    <a:lumMod val="65000"/>
+                    <a:lumOff val="35000"/>
+                  </a:schemeClr>
+                </a:solidFill>
+                <a:latin typeface="+mn-lt"/>
+                <a:ea typeface="+mn-ea"/>
+                <a:cs typeface="+mn-cs"/>
+              </a:defRPr>
+            </a:lvl1pPr>
+            <a:lvl2pPr marL="457200" indent="0" algn="ctr" defTabSz="457200" rtl="0" eaLnBrk="1" latinLnBrk="0" hangingPunct="1">
+              <a:spcBef>
+                <a:spcPts val="1000"/>
+              </a:spcBef>
+              <a:spcAft>
+                <a:spcPts val="0"/>
+              </a:spcAft>
+              <a:buClr>
+                <a:schemeClr val="accent1"/>
+              </a:buClr>
+              <a:buFont typeface="Wingdings 3" charset="2"/>
+              <a:buNone/>
+              <a:defRPr sz="1600" kern="1200">
+                <a:solidFill>
+                  <a:schemeClr val="tx1">
+                    <a:tint val="75000"/>
+                  </a:schemeClr>
+                </a:solidFill>
+                <a:latin typeface="+mn-lt"/>
+                <a:ea typeface="+mn-ea"/>
+                <a:cs typeface="+mn-cs"/>
+              </a:defRPr>
+            </a:lvl2pPr>
+            <a:lvl3pPr marL="914400" indent="0" algn="ctr" defTabSz="457200" rtl="0" eaLnBrk="1" latinLnBrk="0" hangingPunct="1">
+              <a:spcBef>
+                <a:spcPts val="1000"/>
+              </a:spcBef>
+              <a:spcAft>
+                <a:spcPts val="0"/>
+              </a:spcAft>
+              <a:buClr>
+                <a:schemeClr val="accent1"/>
+              </a:buClr>
+              <a:buFont typeface="Wingdings 3" charset="2"/>
+              <a:buNone/>
+              <a:defRPr sz="1400" kern="1200">
+                <a:solidFill>
+                  <a:schemeClr val="tx1">
+                    <a:tint val="75000"/>
+                  </a:schemeClr>
+                </a:solidFill>
+                <a:latin typeface="+mn-lt"/>
+                <a:ea typeface="+mn-ea"/>
+                <a:cs typeface="+mn-cs"/>
+              </a:defRPr>
+            </a:lvl3pPr>
+            <a:lvl4pPr marL="1371600" indent="0" algn="ctr" defTabSz="457200" rtl="0" eaLnBrk="1" latinLnBrk="0" hangingPunct="1">
+              <a:spcBef>
+                <a:spcPts val="1000"/>
+              </a:spcBef>
+              <a:spcAft>
+                <a:spcPts val="0"/>
+              </a:spcAft>
+              <a:buClr>
+                <a:schemeClr val="accent1"/>
+              </a:buClr>
+              <a:buFont typeface="Wingdings 3" charset="2"/>
+              <a:buNone/>
+              <a:defRPr sz="1200" kern="1200">
+                <a:solidFill>
+                  <a:schemeClr val="tx1">
+                    <a:tint val="75000"/>
+                  </a:schemeClr>
+                </a:solidFill>
+                <a:latin typeface="+mn-lt"/>
+                <a:ea typeface="+mn-ea"/>
+                <a:cs typeface="+mn-cs"/>
+              </a:defRPr>
+            </a:lvl4pPr>
+            <a:lvl5pPr marL="1828800" indent="0" algn="ctr" defTabSz="457200" rtl="0" eaLnBrk="1" latinLnBrk="0" hangingPunct="1">
+              <a:spcBef>
+                <a:spcPts val="1000"/>
+              </a:spcBef>
+              <a:spcAft>
+                <a:spcPts val="0"/>
+              </a:spcAft>
+              <a:buClr>
+                <a:schemeClr val="accent1"/>
+              </a:buClr>
+              <a:buFont typeface="Wingdings 3" charset="2"/>
+              <a:buNone/>
+              <a:defRPr sz="1200" kern="1200">
+                <a:solidFill>
+                  <a:schemeClr val="tx1">
+                    <a:tint val="75000"/>
+                  </a:schemeClr>
+                </a:solidFill>
+                <a:latin typeface="+mn-lt"/>
+                <a:ea typeface="+mn-ea"/>
+                <a:cs typeface="+mn-cs"/>
+              </a:defRPr>
+            </a:lvl5pPr>
+            <a:lvl6pPr marL="2286000" indent="0" algn="ctr" defTabSz="457200" rtl="0" eaLnBrk="1" latinLnBrk="0" hangingPunct="1">
+              <a:spcBef>
+                <a:spcPts val="1000"/>
+              </a:spcBef>
+              <a:spcAft>
+                <a:spcPts val="0"/>
+              </a:spcAft>
+              <a:buClr>
+                <a:schemeClr val="accent1"/>
+              </a:buClr>
+              <a:buFont typeface="Wingdings 3" charset="2"/>
+              <a:buNone/>
+              <a:defRPr sz="1200" kern="1200">
+                <a:solidFill>
+                  <a:schemeClr val="tx1">
+                    <a:tint val="75000"/>
+                  </a:schemeClr>
+                </a:solidFill>
+                <a:latin typeface="+mn-lt"/>
+                <a:ea typeface="+mn-ea"/>
+                <a:cs typeface="+mn-cs"/>
+              </a:defRPr>
+            </a:lvl6pPr>
+            <a:lvl7pPr marL="2743200" indent="0" algn="ctr" defTabSz="457200" rtl="0" eaLnBrk="1" latinLnBrk="0" hangingPunct="1">
+              <a:spcBef>
+                <a:spcPts val="1000"/>
+              </a:spcBef>
+              <a:spcAft>
+                <a:spcPts val="0"/>
+              </a:spcAft>
+              <a:buClr>
+                <a:schemeClr val="accent1"/>
+              </a:buClr>
+              <a:buFont typeface="Wingdings 3" charset="2"/>
+              <a:buNone/>
+              <a:defRPr sz="1200" kern="1200">
+                <a:solidFill>
+                  <a:schemeClr val="tx1">
+                    <a:tint val="75000"/>
+                  </a:schemeClr>
+                </a:solidFill>
+                <a:latin typeface="+mn-lt"/>
+                <a:ea typeface="+mn-ea"/>
+                <a:cs typeface="+mn-cs"/>
+              </a:defRPr>
+            </a:lvl7pPr>
+            <a:lvl8pPr marL="3200400" indent="0" algn="ctr" defTabSz="457200" rtl="0" eaLnBrk="1" latinLnBrk="0" hangingPunct="1">
+              <a:spcBef>
+                <a:spcPts val="1000"/>
+              </a:spcBef>
+              <a:spcAft>
+                <a:spcPts val="0"/>
+              </a:spcAft>
+              <a:buClr>
+                <a:schemeClr val="accent1"/>
+              </a:buClr>
+              <a:buFont typeface="Wingdings 3" charset="2"/>
+              <a:buNone/>
+              <a:defRPr sz="1200" kern="1200">
+                <a:solidFill>
+                  <a:schemeClr val="tx1">
+                    <a:tint val="75000"/>
+                  </a:schemeClr>
+                </a:solidFill>
+                <a:latin typeface="+mn-lt"/>
+                <a:ea typeface="+mn-ea"/>
+                <a:cs typeface="+mn-cs"/>
+              </a:defRPr>
+            </a:lvl8pPr>
+            <a:lvl9pPr marL="3657600" indent="0" algn="ctr" defTabSz="457200" rtl="0" eaLnBrk="1" latinLnBrk="0" hangingPunct="1">
+              <a:spcBef>
+                <a:spcPts val="1000"/>
+              </a:spcBef>
+              <a:spcAft>
+                <a:spcPts val="0"/>
+              </a:spcAft>
+              <a:buClr>
+                <a:schemeClr val="accent1"/>
+              </a:buClr>
+              <a:buFont typeface="Wingdings 3" charset="2"/>
+              <a:buNone/>
+              <a:defRPr sz="1200" kern="1200">
+                <a:solidFill>
+                  <a:schemeClr val="tx1">
+                    <a:tint val="75000"/>
+                  </a:schemeClr>
+                </a:solidFill>
+                <a:latin typeface="+mn-lt"/>
+                <a:ea typeface="+mn-ea"/>
+                <a:cs typeface="+mn-cs"/>
+              </a:defRPr>
+            </a:lvl9pPr>
+          </a:lstStyle>
+          <a:p>
+            <a:r>
+              <a:rPr lang="en-US" sz="1400" dirty="0"/>
+              <a:t>✨ </a:t>
+            </a:r>
+            <a:r>
+              <a:rPr lang="en-US" sz="1400" b="1" dirty="0"/>
+              <a:t>Kind of Events :</a:t>
+            </a:r>
+          </a:p>
+          <a:p>
+            <a:r>
+              <a:rPr lang="en-US" sz="1400" dirty="0"/>
+              <a:t>📌</a:t>
+            </a:r>
+            <a:r>
+              <a:rPr lang="en-US" sz="1400" b="1" dirty="0"/>
+              <a:t> Dramatic Folks and Cultural Events:</a:t>
+            </a:r>
+          </a:p>
+          <a:p>
+            <a:r>
+              <a:rPr lang="en-US" sz="1400" b="1" dirty="0"/>
+              <a:t>1). </a:t>
+            </a:r>
+            <a:r>
+              <a:rPr lang="en-US" sz="1400" dirty="0"/>
+              <a:t>Government can organize different dramatic folks, which includes </a:t>
+            </a:r>
+            <a:r>
+              <a:rPr lang="en-US" sz="1400" b="1" dirty="0"/>
+              <a:t>history of temples, Places, Forts</a:t>
+            </a:r>
+            <a:r>
+              <a:rPr lang="en-US" sz="1400" dirty="0"/>
+              <a:t> etc.</a:t>
+            </a:r>
+          </a:p>
+          <a:p>
+            <a:r>
+              <a:rPr lang="en-US" sz="1400" b="1" dirty="0"/>
+              <a:t>2). </a:t>
+            </a:r>
+            <a:r>
+              <a:rPr lang="en-US" sz="1400" dirty="0"/>
+              <a:t>Government can plan to organize different </a:t>
+            </a:r>
+            <a:r>
+              <a:rPr lang="en-US" sz="1400" b="1" dirty="0"/>
+              <a:t>dance forms, musical events </a:t>
+            </a:r>
+            <a:r>
+              <a:rPr lang="en-US" sz="1400" dirty="0"/>
+              <a:t>which are famous in that area.</a:t>
+            </a:r>
+          </a:p>
+          <a:p>
+            <a:r>
+              <a:rPr lang="en-US" sz="1400" dirty="0"/>
+              <a:t>📌</a:t>
+            </a:r>
+            <a:r>
+              <a:rPr lang="en-US" sz="1400" b="1" dirty="0"/>
+              <a:t>Exhibitions:</a:t>
+            </a:r>
+          </a:p>
+          <a:p>
+            <a:r>
+              <a:rPr lang="en-US" sz="1400" b="1" dirty="0"/>
+              <a:t>1). </a:t>
+            </a:r>
+            <a:r>
+              <a:rPr lang="en-US" sz="1400" dirty="0"/>
+              <a:t>Local corporation can introduce different exhibitions of </a:t>
+            </a:r>
+            <a:r>
+              <a:rPr lang="en-US" sz="1400" b="1" dirty="0"/>
+              <a:t>famous things</a:t>
+            </a:r>
+            <a:r>
+              <a:rPr lang="en-US" sz="1400" dirty="0"/>
+              <a:t> of that area.</a:t>
+            </a:r>
+          </a:p>
+          <a:p>
+            <a:r>
+              <a:rPr lang="en-US" sz="1400" b="1" dirty="0"/>
+              <a:t>2). </a:t>
+            </a:r>
+            <a:r>
+              <a:rPr lang="en-US" sz="1400" dirty="0"/>
+              <a:t>They also organize </a:t>
+            </a:r>
+            <a:r>
+              <a:rPr lang="en-US" sz="1400" b="1" dirty="0"/>
+              <a:t>small competitions</a:t>
+            </a:r>
+            <a:r>
+              <a:rPr lang="en-US" sz="1400" dirty="0"/>
+              <a:t> for that things and the winners will get that things as a </a:t>
+            </a:r>
+            <a:r>
+              <a:rPr lang="en-US" sz="1400" b="1" dirty="0"/>
+              <a:t>prizes</a:t>
+            </a:r>
+            <a:r>
+              <a:rPr lang="en-US" sz="1400" dirty="0"/>
+              <a:t>, so that tourist will also </a:t>
+            </a:r>
+            <a:r>
+              <a:rPr lang="en-US" sz="1400" b="1" dirty="0"/>
+              <a:t>enjoy </a:t>
+            </a:r>
+            <a:r>
+              <a:rPr lang="en-US" sz="1400" dirty="0"/>
+              <a:t>that competitions.</a:t>
+            </a:r>
+          </a:p>
+        </p:txBody>
+      </p:sp>
+      <p:sp>
+        <p:nvSpPr>
+          <p:cNvPr id="7" name="Rectangle: Rounded Corners 6">
+            <a:extLst>
+              <a:ext uri="{FF2B5EF4-FFF2-40B4-BE49-F238E27FC236}">
+                <a16:creationId xmlns:a16="http://schemas.microsoft.com/office/drawing/2014/main" id="{7E6C13AF-66E1-8687-FC23-90624FBEAF02}"/>
+              </a:ext>
+            </a:extLst>
+          </p:cNvPr>
+          <p:cNvSpPr>
+            <a:spLocks/>
+          </p:cNvSpPr>
+          <p:nvPr/>
+        </p:nvSpPr>
+        <p:spPr>
+          <a:xfrm>
+            <a:off x="520434" y="748036"/>
+            <a:ext cx="3910934" cy="2883060"/>
+          </a:xfrm>
+          <a:prstGeom prst="roundRect">
+            <a:avLst/>
+          </a:prstGeom>
+          <a:solidFill>
+            <a:schemeClr val="bg1"/>
+          </a:solidFill>
+        </p:spPr>
+        <p:style>
+          <a:lnRef idx="2">
+            <a:schemeClr val="accent1">
+              <a:shade val="50000"/>
+            </a:schemeClr>
+          </a:lnRef>
+          <a:fillRef idx="1">
+            <a:schemeClr val="accent1"/>
+          </a:fillRef>
+          <a:effectRef idx="0">
+            <a:schemeClr val="accent1"/>
+          </a:effectRef>
+          <a:fontRef idx="minor">
+            <a:schemeClr val="lt1"/>
+          </a:fontRef>
+        </p:style>
+        <p:txBody>
+          <a:bodyPr rtlCol="0" anchor="ctr"/>
+          <a:lstStyle/>
+          <a:p>
+            <a:pPr algn="ctr"/>
+            <a:endParaRPr lang="en-GB" dirty="0"/>
+          </a:p>
+        </p:txBody>
+      </p:sp>
+      <mc:AlternateContent xmlns:mc="http://schemas.openxmlformats.org/markup-compatibility/2006">
+        <mc:Choice xmlns:we="http://schemas.microsoft.com/office/webextensions/webextension/2010/11" xmlns:pca="http://schemas.microsoft.com/office/powerpoint/2013/contentapp" Requires="we pca">
+          <p:graphicFrame>
+            <p:nvGraphicFramePr>
+              <p:cNvPr id="2" name="Add-in 1" title="Microsoft Power BI">
+                <a:extLst>
+                  <a:ext uri="{FF2B5EF4-FFF2-40B4-BE49-F238E27FC236}">
+                    <a16:creationId xmlns:a16="http://schemas.microsoft.com/office/drawing/2014/main" id="{73DD9770-97F5-526D-9409-21DF8D235B35}"/>
+                  </a:ext>
+                </a:extLst>
+              </p:cNvPr>
+              <p:cNvGraphicFramePr>
+                <a:graphicFrameLocks noGrp="1"/>
+              </p:cNvGraphicFramePr>
+              <p:nvPr>
+                <p:extLst>
+                  <p:ext uri="{D42A27DB-BD31-4B8C-83A1-F6EECF244321}">
+                    <p14:modId xmlns:p14="http://schemas.microsoft.com/office/powerpoint/2010/main" val="3661636264"/>
+                  </p:ext>
+                </p:extLst>
+              </p:nvPr>
+            </p:nvGraphicFramePr>
+            <p:xfrm>
+              <a:off x="662608" y="993913"/>
+              <a:ext cx="3591339" cy="2435088"/>
+            </p:xfrm>
+            <a:graphic>
+              <a:graphicData uri="http://schemas.microsoft.com/office/webextensions/webextension/2010/11">
+                <we:webextensionref xmlns:we="http://schemas.microsoft.com/office/webextensions/webextension/2010/11" xmlns:r="http://schemas.openxmlformats.org/officeDocument/2006/relationships" r:id="rId2"/>
+              </a:graphicData>
+            </a:graphic>
+          </p:graphicFrame>
+        </mc:Choice>
+        <mc:Fallback>
+          <p:pic>
+            <p:nvPicPr>
+              <p:cNvPr id="2" name="Add-in 1" title="Microsoft Power BI">
+                <a:extLst>
+                  <a:ext uri="{FF2B5EF4-FFF2-40B4-BE49-F238E27FC236}">
+                    <a16:creationId xmlns:a16="http://schemas.microsoft.com/office/drawing/2014/main" id="{73DD9770-97F5-526D-9409-21DF8D235B35}"/>
+                  </a:ext>
+                </a:extLst>
+              </p:cNvPr>
+              <p:cNvPicPr>
+                <a:picLocks noGrp="1" noRot="1" noChangeAspect="1" noMove="1" noResize="1" noEditPoints="1" noAdjustHandles="1" noChangeArrowheads="1" noChangeShapeType="1"/>
+              </p:cNvPicPr>
+              <p:nvPr/>
+            </p:nvPicPr>
+            <p:blipFill>
+              <a:blip r:embed="rId3"/>
+              <a:stretch>
+                <a:fillRect/>
+              </a:stretch>
+            </p:blipFill>
+            <p:spPr>
+              <a:xfrm>
+                <a:off x="662608" y="993913"/>
+                <a:ext cx="3591339" cy="2435088"/>
+              </a:xfrm>
+              <a:prstGeom prst="rect">
+                <a:avLst/>
+              </a:prstGeom>
+            </p:spPr>
+          </p:pic>
+        </mc:Fallback>
+      </mc:AlternateContent>
+      <p:sp>
+        <p:nvSpPr>
+          <p:cNvPr id="3" name="Rectangle: Rounded Corners 2">
+            <a:extLst>
+              <a:ext uri="{FF2B5EF4-FFF2-40B4-BE49-F238E27FC236}">
+                <a16:creationId xmlns:a16="http://schemas.microsoft.com/office/drawing/2014/main" id="{636E65B2-25A1-52C7-F142-E75591267306}"/>
+              </a:ext>
+            </a:extLst>
+          </p:cNvPr>
+          <p:cNvSpPr>
+            <a:spLocks/>
+          </p:cNvSpPr>
+          <p:nvPr/>
+        </p:nvSpPr>
+        <p:spPr>
+          <a:xfrm>
+            <a:off x="502810" y="3809289"/>
+            <a:ext cx="3910934" cy="2883060"/>
+          </a:xfrm>
+          <a:prstGeom prst="roundRect">
+            <a:avLst/>
+          </a:prstGeom>
+          <a:solidFill>
+            <a:schemeClr val="bg1"/>
+          </a:solidFill>
+        </p:spPr>
+        <p:style>
+          <a:lnRef idx="2">
+            <a:schemeClr val="accent1">
+              <a:shade val="50000"/>
+            </a:schemeClr>
+          </a:lnRef>
+          <a:fillRef idx="1">
+            <a:schemeClr val="accent1"/>
+          </a:fillRef>
+          <a:effectRef idx="0">
+            <a:schemeClr val="accent1"/>
+          </a:effectRef>
+          <a:fontRef idx="minor">
+            <a:schemeClr val="lt1"/>
+          </a:fontRef>
+        </p:style>
+        <p:txBody>
+          <a:bodyPr rtlCol="0" anchor="ctr"/>
+          <a:lstStyle/>
+          <a:p>
+            <a:pPr algn="ctr"/>
+            <a:endParaRPr lang="en-GB" dirty="0"/>
+          </a:p>
+        </p:txBody>
+      </p:sp>
+      <mc:AlternateContent xmlns:mc="http://schemas.openxmlformats.org/markup-compatibility/2006">
+        <mc:Choice xmlns:we="http://schemas.microsoft.com/office/webextensions/webextension/2010/11" xmlns:pca="http://schemas.microsoft.com/office/powerpoint/2013/contentapp" Requires="we pca">
+          <p:graphicFrame>
+            <p:nvGraphicFramePr>
+              <p:cNvPr id="5" name="Add-in 4" title="Microsoft Power BI">
+                <a:extLst>
+                  <a:ext uri="{FF2B5EF4-FFF2-40B4-BE49-F238E27FC236}">
+                    <a16:creationId xmlns:a16="http://schemas.microsoft.com/office/drawing/2014/main" id="{4BE05B16-6F95-010B-047B-193BF29492F2}"/>
+                  </a:ext>
+                </a:extLst>
+              </p:cNvPr>
+              <p:cNvGraphicFramePr>
+                <a:graphicFrameLocks noGrp="1"/>
+              </p:cNvGraphicFramePr>
+              <p:nvPr>
+                <p:extLst>
+                  <p:ext uri="{D42A27DB-BD31-4B8C-83A1-F6EECF244321}">
+                    <p14:modId xmlns:p14="http://schemas.microsoft.com/office/powerpoint/2010/main" val="1132740830"/>
+                  </p:ext>
+                </p:extLst>
+              </p:nvPr>
+            </p:nvGraphicFramePr>
+            <p:xfrm>
+              <a:off x="680232" y="4013042"/>
+              <a:ext cx="3573716" cy="2546784"/>
+            </p:xfrm>
+            <a:graphic>
+              <a:graphicData uri="http://schemas.microsoft.com/office/webextensions/webextension/2010/11">
+                <we:webextensionref xmlns:we="http://schemas.microsoft.com/office/webextensions/webextension/2010/11" xmlns:r="http://schemas.openxmlformats.org/officeDocument/2006/relationships" r:id="rId4"/>
+              </a:graphicData>
+            </a:graphic>
+          </p:graphicFrame>
+        </mc:Choice>
+        <mc:Fallback>
+          <p:pic>
+            <p:nvPicPr>
+              <p:cNvPr id="5" name="Add-in 4" title="Microsoft Power BI">
+                <a:extLst>
+                  <a:ext uri="{FF2B5EF4-FFF2-40B4-BE49-F238E27FC236}">
+                    <a16:creationId xmlns:a16="http://schemas.microsoft.com/office/drawing/2014/main" id="{4BE05B16-6F95-010B-047B-193BF29492F2}"/>
+                  </a:ext>
+                </a:extLst>
+              </p:cNvPr>
+              <p:cNvPicPr>
+                <a:picLocks noGrp="1" noRot="1" noChangeAspect="1" noMove="1" noResize="1" noEditPoints="1" noAdjustHandles="1" noChangeArrowheads="1" noChangeShapeType="1"/>
+              </p:cNvPicPr>
+              <p:nvPr/>
+            </p:nvPicPr>
+            <p:blipFill>
+              <a:blip r:embed="rId5"/>
+              <a:stretch>
+                <a:fillRect/>
+              </a:stretch>
+            </p:blipFill>
+            <p:spPr>
+              <a:xfrm>
+                <a:off x="680232" y="4013042"/>
+                <a:ext cx="3573716" cy="2546784"/>
+              </a:xfrm>
+              <a:prstGeom prst="rect">
+                <a:avLst/>
+              </a:prstGeom>
+            </p:spPr>
+          </p:pic>
+        </mc:Fallback>
+      </mc:AlternateContent>
+      <p:sp>
+        <p:nvSpPr>
+          <p:cNvPr id="8" name="Subtitle 2">
+            <a:extLst>
+              <a:ext uri="{FF2B5EF4-FFF2-40B4-BE49-F238E27FC236}">
+                <a16:creationId xmlns:a16="http://schemas.microsoft.com/office/drawing/2014/main" id="{0861A01E-E235-6585-9DAC-BD247393EBFE}"/>
+              </a:ext>
+            </a:extLst>
+          </p:cNvPr>
+          <p:cNvSpPr txBox="1">
+            <a:spLocks/>
+          </p:cNvSpPr>
+          <p:nvPr/>
+        </p:nvSpPr>
+        <p:spPr>
+          <a:xfrm>
+            <a:off x="8440176" y="748034"/>
+            <a:ext cx="3679918" cy="2883061"/>
+          </a:xfrm>
+          <a:prstGeom prst="roundRect">
+            <a:avLst/>
+          </a:prstGeom>
+        </p:spPr>
+        <p:style>
+          <a:lnRef idx="2">
+            <a:schemeClr val="accent5"/>
+          </a:lnRef>
+          <a:fillRef idx="1">
+            <a:schemeClr val="lt1"/>
+          </a:fillRef>
+          <a:effectRef idx="0">
+            <a:schemeClr val="accent5"/>
+          </a:effectRef>
+          <a:fontRef idx="minor">
+            <a:schemeClr val="dk1"/>
+          </a:fontRef>
+        </p:style>
+        <p:txBody>
+          <a:bodyPr vert="horz" lIns="91440" tIns="45720" rIns="91440" bIns="45720" rtlCol="0" anchor="t">
+            <a:normAutofit fontScale="70000" lnSpcReduction="20000"/>
+          </a:bodyPr>
+          <a:lstStyle>
+            <a:lvl1pPr marL="0" indent="0" algn="l" defTabSz="457200" rtl="0" eaLnBrk="1" latinLnBrk="0" hangingPunct="1">
+              <a:spcBef>
+                <a:spcPts val="1000"/>
+              </a:spcBef>
+              <a:spcAft>
+                <a:spcPts val="0"/>
+              </a:spcAft>
+              <a:buClr>
+                <a:schemeClr val="accent1"/>
+              </a:buClr>
+              <a:buFont typeface="Wingdings 3" charset="2"/>
+              <a:buNone/>
+              <a:defRPr sz="1800" kern="1200">
+                <a:solidFill>
+                  <a:schemeClr val="tx1">
+                    <a:lumMod val="65000"/>
+                    <a:lumOff val="35000"/>
+                  </a:schemeClr>
+                </a:solidFill>
+                <a:latin typeface="+mn-lt"/>
+                <a:ea typeface="+mn-ea"/>
+                <a:cs typeface="+mn-cs"/>
+              </a:defRPr>
+            </a:lvl1pPr>
+            <a:lvl2pPr marL="457200" indent="0" algn="ctr" defTabSz="457200" rtl="0" eaLnBrk="1" latinLnBrk="0" hangingPunct="1">
+              <a:spcBef>
+                <a:spcPts val="1000"/>
+              </a:spcBef>
+              <a:spcAft>
+                <a:spcPts val="0"/>
+              </a:spcAft>
+              <a:buClr>
+                <a:schemeClr val="accent1"/>
+              </a:buClr>
+              <a:buFont typeface="Wingdings 3" charset="2"/>
+              <a:buNone/>
+              <a:defRPr sz="1600" kern="1200">
+                <a:solidFill>
+                  <a:schemeClr val="tx1">
+                    <a:tint val="75000"/>
+                  </a:schemeClr>
+                </a:solidFill>
+                <a:latin typeface="+mn-lt"/>
+                <a:ea typeface="+mn-ea"/>
+                <a:cs typeface="+mn-cs"/>
+              </a:defRPr>
+            </a:lvl2pPr>
+            <a:lvl3pPr marL="914400" indent="0" algn="ctr" defTabSz="457200" rtl="0" eaLnBrk="1" latinLnBrk="0" hangingPunct="1">
+              <a:spcBef>
+                <a:spcPts val="1000"/>
+              </a:spcBef>
+              <a:spcAft>
+                <a:spcPts val="0"/>
+              </a:spcAft>
+              <a:buClr>
+                <a:schemeClr val="accent1"/>
+              </a:buClr>
+              <a:buFont typeface="Wingdings 3" charset="2"/>
+              <a:buNone/>
+              <a:defRPr sz="1400" kern="1200">
+                <a:solidFill>
+                  <a:schemeClr val="tx1">
+                    <a:tint val="75000"/>
+                  </a:schemeClr>
+                </a:solidFill>
+                <a:latin typeface="+mn-lt"/>
+                <a:ea typeface="+mn-ea"/>
+                <a:cs typeface="+mn-cs"/>
+              </a:defRPr>
+            </a:lvl3pPr>
+            <a:lvl4pPr marL="1371600" indent="0" algn="ctr" defTabSz="457200" rtl="0" eaLnBrk="1" latinLnBrk="0" hangingPunct="1">
+              <a:spcBef>
+                <a:spcPts val="1000"/>
+              </a:spcBef>
+              <a:spcAft>
+                <a:spcPts val="0"/>
+              </a:spcAft>
+              <a:buClr>
+                <a:schemeClr val="accent1"/>
+              </a:buClr>
+              <a:buFont typeface="Wingdings 3" charset="2"/>
+              <a:buNone/>
+              <a:defRPr sz="1200" kern="1200">
+                <a:solidFill>
+                  <a:schemeClr val="tx1">
+                    <a:tint val="75000"/>
+                  </a:schemeClr>
+                </a:solidFill>
+                <a:latin typeface="+mn-lt"/>
+                <a:ea typeface="+mn-ea"/>
+                <a:cs typeface="+mn-cs"/>
+              </a:defRPr>
+            </a:lvl4pPr>
+            <a:lvl5pPr marL="1828800" indent="0" algn="ctr" defTabSz="457200" rtl="0" eaLnBrk="1" latinLnBrk="0" hangingPunct="1">
+              <a:spcBef>
+                <a:spcPts val="1000"/>
+              </a:spcBef>
+              <a:spcAft>
+                <a:spcPts val="0"/>
+              </a:spcAft>
+              <a:buClr>
+                <a:schemeClr val="accent1"/>
+              </a:buClr>
+              <a:buFont typeface="Wingdings 3" charset="2"/>
+              <a:buNone/>
+              <a:defRPr sz="1200" kern="1200">
+                <a:solidFill>
+                  <a:schemeClr val="tx1">
+                    <a:tint val="75000"/>
+                  </a:schemeClr>
+                </a:solidFill>
+                <a:latin typeface="+mn-lt"/>
+                <a:ea typeface="+mn-ea"/>
+                <a:cs typeface="+mn-cs"/>
+              </a:defRPr>
+            </a:lvl5pPr>
+            <a:lvl6pPr marL="2286000" indent="0" algn="ctr" defTabSz="457200" rtl="0" eaLnBrk="1" latinLnBrk="0" hangingPunct="1">
+              <a:spcBef>
+                <a:spcPts val="1000"/>
+              </a:spcBef>
+              <a:spcAft>
+                <a:spcPts val="0"/>
+              </a:spcAft>
+              <a:buClr>
+                <a:schemeClr val="accent1"/>
+              </a:buClr>
+              <a:buFont typeface="Wingdings 3" charset="2"/>
+              <a:buNone/>
+              <a:defRPr sz="1200" kern="1200">
+                <a:solidFill>
+                  <a:schemeClr val="tx1">
+                    <a:tint val="75000"/>
+                  </a:schemeClr>
+                </a:solidFill>
+                <a:latin typeface="+mn-lt"/>
+                <a:ea typeface="+mn-ea"/>
+                <a:cs typeface="+mn-cs"/>
+              </a:defRPr>
+            </a:lvl6pPr>
+            <a:lvl7pPr marL="2743200" indent="0" algn="ctr" defTabSz="457200" rtl="0" eaLnBrk="1" latinLnBrk="0" hangingPunct="1">
+              <a:spcBef>
+                <a:spcPts val="1000"/>
+              </a:spcBef>
+              <a:spcAft>
+                <a:spcPts val="0"/>
+              </a:spcAft>
+              <a:buClr>
+                <a:schemeClr val="accent1"/>
+              </a:buClr>
+              <a:buFont typeface="Wingdings 3" charset="2"/>
+              <a:buNone/>
+              <a:defRPr sz="1200" kern="1200">
+                <a:solidFill>
+                  <a:schemeClr val="tx1">
+                    <a:tint val="75000"/>
+                  </a:schemeClr>
+                </a:solidFill>
+                <a:latin typeface="+mn-lt"/>
+                <a:ea typeface="+mn-ea"/>
+                <a:cs typeface="+mn-cs"/>
+              </a:defRPr>
+            </a:lvl7pPr>
+            <a:lvl8pPr marL="3200400" indent="0" algn="ctr" defTabSz="457200" rtl="0" eaLnBrk="1" latinLnBrk="0" hangingPunct="1">
+              <a:spcBef>
+                <a:spcPts val="1000"/>
+              </a:spcBef>
+              <a:spcAft>
+                <a:spcPts val="0"/>
+              </a:spcAft>
+              <a:buClr>
+                <a:schemeClr val="accent1"/>
+              </a:buClr>
+              <a:buFont typeface="Wingdings 3" charset="2"/>
+              <a:buNone/>
+              <a:defRPr sz="1200" kern="1200">
+                <a:solidFill>
+                  <a:schemeClr val="tx1">
+                    <a:tint val="75000"/>
+                  </a:schemeClr>
+                </a:solidFill>
+                <a:latin typeface="+mn-lt"/>
+                <a:ea typeface="+mn-ea"/>
+                <a:cs typeface="+mn-cs"/>
+              </a:defRPr>
+            </a:lvl8pPr>
+            <a:lvl9pPr marL="3657600" indent="0" algn="ctr" defTabSz="457200" rtl="0" eaLnBrk="1" latinLnBrk="0" hangingPunct="1">
+              <a:spcBef>
+                <a:spcPts val="1000"/>
+              </a:spcBef>
+              <a:spcAft>
+                <a:spcPts val="0"/>
+              </a:spcAft>
+              <a:buClr>
+                <a:schemeClr val="accent1"/>
+              </a:buClr>
+              <a:buFont typeface="Wingdings 3" charset="2"/>
+              <a:buNone/>
+              <a:defRPr sz="1200" kern="1200">
+                <a:solidFill>
+                  <a:schemeClr val="tx1">
+                    <a:tint val="75000"/>
+                  </a:schemeClr>
+                </a:solidFill>
+                <a:latin typeface="+mn-lt"/>
+                <a:ea typeface="+mn-ea"/>
+                <a:cs typeface="+mn-cs"/>
+              </a:defRPr>
+            </a:lvl9pPr>
+          </a:lstStyle>
+          <a:p>
+            <a:r>
+              <a:rPr lang="en-US" sz="1400" dirty="0"/>
+              <a:t>✨ </a:t>
+            </a:r>
+            <a:r>
+              <a:rPr lang="en-US" sz="1400" b="1" dirty="0"/>
+              <a:t>Months:</a:t>
+            </a:r>
+          </a:p>
+          <a:p>
+            <a:r>
+              <a:rPr lang="en-US" sz="1400" dirty="0"/>
+              <a:t>📌</a:t>
+            </a:r>
+            <a:r>
+              <a:rPr lang="en-US" sz="1400" b="1" dirty="0"/>
+              <a:t> Peak Time:</a:t>
+            </a:r>
+          </a:p>
+          <a:p>
+            <a:r>
+              <a:rPr lang="en-US" sz="1400" b="1" dirty="0"/>
+              <a:t>1). </a:t>
+            </a:r>
+            <a:r>
+              <a:rPr lang="en-US" sz="1400" dirty="0"/>
+              <a:t>According to our analysis, we found that </a:t>
+            </a:r>
+            <a:r>
+              <a:rPr lang="en-US" sz="1400" b="1" dirty="0"/>
+              <a:t>January, February, June</a:t>
+            </a:r>
+            <a:r>
+              <a:rPr lang="en-US" sz="1400" dirty="0"/>
+              <a:t> are the most peak months of visitors.</a:t>
+            </a:r>
+          </a:p>
+          <a:p>
+            <a:r>
+              <a:rPr lang="en-US" sz="1400" b="1" dirty="0"/>
+              <a:t>2). </a:t>
+            </a:r>
+            <a:r>
+              <a:rPr lang="en-US" sz="1400" dirty="0"/>
+              <a:t>Mainly June is the month of summer holidays, in which government can organize </a:t>
+            </a:r>
+            <a:r>
+              <a:rPr lang="en-US" sz="1400" b="1" dirty="0"/>
+              <a:t>summer markets</a:t>
+            </a:r>
+            <a:r>
+              <a:rPr lang="en-US" sz="1400" dirty="0"/>
+              <a:t> which contains promotions of local products also </a:t>
+            </a:r>
+            <a:r>
+              <a:rPr lang="en-US" sz="1400" b="1" dirty="0"/>
+              <a:t>outdoor music concerts.</a:t>
+            </a:r>
+          </a:p>
+          <a:p>
+            <a:r>
+              <a:rPr lang="en-US" sz="1400" b="1" dirty="0"/>
+              <a:t>3). </a:t>
+            </a:r>
+            <a:r>
+              <a:rPr lang="en-US" sz="1400" dirty="0"/>
+              <a:t>Mainly January and February have the </a:t>
+            </a:r>
+            <a:r>
+              <a:rPr lang="en-US" sz="1400" b="1" dirty="0"/>
+              <a:t>Pongal festival</a:t>
+            </a:r>
+            <a:r>
+              <a:rPr lang="en-US" sz="1400" dirty="0"/>
+              <a:t> which is used to celebrate the </a:t>
+            </a:r>
+            <a:r>
+              <a:rPr lang="en-US" sz="1400" b="1" dirty="0"/>
+              <a:t>harvesting of crops</a:t>
+            </a:r>
+            <a:r>
+              <a:rPr lang="en-US" sz="1400" dirty="0"/>
+              <a:t> in farms, so that time the tourist appearance is at peak, it is good time for organizing many </a:t>
+            </a:r>
+            <a:r>
+              <a:rPr lang="en-US" sz="1400" b="1" dirty="0"/>
+              <a:t>cultural events</a:t>
+            </a:r>
+            <a:r>
+              <a:rPr lang="en-US" sz="1400" dirty="0"/>
+              <a:t> dedicated to Pongal.</a:t>
+            </a:r>
+          </a:p>
+        </p:txBody>
+      </p:sp>
+      <p:sp>
+        <p:nvSpPr>
+          <p:cNvPr id="10" name="Subtitle 2">
+            <a:extLst>
+              <a:ext uri="{FF2B5EF4-FFF2-40B4-BE49-F238E27FC236}">
+                <a16:creationId xmlns:a16="http://schemas.microsoft.com/office/drawing/2014/main" id="{5A5E5428-1CF4-28C7-7B10-D4A1BABD0636}"/>
+              </a:ext>
+            </a:extLst>
+          </p:cNvPr>
+          <p:cNvSpPr txBox="1">
+            <a:spLocks/>
+          </p:cNvSpPr>
+          <p:nvPr/>
+        </p:nvSpPr>
+        <p:spPr>
+          <a:xfrm>
+            <a:off x="6435772" y="3768818"/>
+            <a:ext cx="3679918" cy="2883061"/>
+          </a:xfrm>
+          <a:prstGeom prst="roundRect">
+            <a:avLst/>
+          </a:prstGeom>
+        </p:spPr>
+        <p:style>
+          <a:lnRef idx="2">
+            <a:schemeClr val="accent5"/>
+          </a:lnRef>
+          <a:fillRef idx="1">
+            <a:schemeClr val="lt1"/>
+          </a:fillRef>
+          <a:effectRef idx="0">
+            <a:schemeClr val="accent5"/>
+          </a:effectRef>
+          <a:fontRef idx="minor">
+            <a:schemeClr val="dk1"/>
+          </a:fontRef>
+        </p:style>
+        <p:txBody>
+          <a:bodyPr vert="horz" lIns="91440" tIns="45720" rIns="91440" bIns="45720" rtlCol="0" anchor="t">
+            <a:normAutofit fontScale="85000" lnSpcReduction="20000"/>
+          </a:bodyPr>
+          <a:lstStyle>
+            <a:lvl1pPr marL="0" indent="0" algn="l" defTabSz="457200" rtl="0" eaLnBrk="1" latinLnBrk="0" hangingPunct="1">
+              <a:spcBef>
+                <a:spcPts val="1000"/>
+              </a:spcBef>
+              <a:spcAft>
+                <a:spcPts val="0"/>
+              </a:spcAft>
+              <a:buClr>
+                <a:schemeClr val="accent1"/>
+              </a:buClr>
+              <a:buFont typeface="Wingdings 3" charset="2"/>
+              <a:buNone/>
+              <a:defRPr sz="1800" kern="1200">
+                <a:solidFill>
+                  <a:schemeClr val="tx1">
+                    <a:lumMod val="65000"/>
+                    <a:lumOff val="35000"/>
+                  </a:schemeClr>
+                </a:solidFill>
+                <a:latin typeface="+mn-lt"/>
+                <a:ea typeface="+mn-ea"/>
+                <a:cs typeface="+mn-cs"/>
+              </a:defRPr>
+            </a:lvl1pPr>
+            <a:lvl2pPr marL="457200" indent="0" algn="ctr" defTabSz="457200" rtl="0" eaLnBrk="1" latinLnBrk="0" hangingPunct="1">
+              <a:spcBef>
+                <a:spcPts val="1000"/>
+              </a:spcBef>
+              <a:spcAft>
+                <a:spcPts val="0"/>
+              </a:spcAft>
+              <a:buClr>
+                <a:schemeClr val="accent1"/>
+              </a:buClr>
+              <a:buFont typeface="Wingdings 3" charset="2"/>
+              <a:buNone/>
+              <a:defRPr sz="1600" kern="1200">
+                <a:solidFill>
+                  <a:schemeClr val="tx1">
+                    <a:tint val="75000"/>
+                  </a:schemeClr>
+                </a:solidFill>
+                <a:latin typeface="+mn-lt"/>
+                <a:ea typeface="+mn-ea"/>
+                <a:cs typeface="+mn-cs"/>
+              </a:defRPr>
+            </a:lvl2pPr>
+            <a:lvl3pPr marL="914400" indent="0" algn="ctr" defTabSz="457200" rtl="0" eaLnBrk="1" latinLnBrk="0" hangingPunct="1">
+              <a:spcBef>
+                <a:spcPts val="1000"/>
+              </a:spcBef>
+              <a:spcAft>
+                <a:spcPts val="0"/>
+              </a:spcAft>
+              <a:buClr>
+                <a:schemeClr val="accent1"/>
+              </a:buClr>
+              <a:buFont typeface="Wingdings 3" charset="2"/>
+              <a:buNone/>
+              <a:defRPr sz="1400" kern="1200">
+                <a:solidFill>
+                  <a:schemeClr val="tx1">
+                    <a:tint val="75000"/>
+                  </a:schemeClr>
+                </a:solidFill>
+                <a:latin typeface="+mn-lt"/>
+                <a:ea typeface="+mn-ea"/>
+                <a:cs typeface="+mn-cs"/>
+              </a:defRPr>
+            </a:lvl3pPr>
+            <a:lvl4pPr marL="1371600" indent="0" algn="ctr" defTabSz="457200" rtl="0" eaLnBrk="1" latinLnBrk="0" hangingPunct="1">
+              <a:spcBef>
+                <a:spcPts val="1000"/>
+              </a:spcBef>
+              <a:spcAft>
+                <a:spcPts val="0"/>
+              </a:spcAft>
+              <a:buClr>
+                <a:schemeClr val="accent1"/>
+              </a:buClr>
+              <a:buFont typeface="Wingdings 3" charset="2"/>
+              <a:buNone/>
+              <a:defRPr sz="1200" kern="1200">
+                <a:solidFill>
+                  <a:schemeClr val="tx1">
+                    <a:tint val="75000"/>
+                  </a:schemeClr>
+                </a:solidFill>
+                <a:latin typeface="+mn-lt"/>
+                <a:ea typeface="+mn-ea"/>
+                <a:cs typeface="+mn-cs"/>
+              </a:defRPr>
+            </a:lvl4pPr>
+            <a:lvl5pPr marL="1828800" indent="0" algn="ctr" defTabSz="457200" rtl="0" eaLnBrk="1" latinLnBrk="0" hangingPunct="1">
+              <a:spcBef>
+                <a:spcPts val="1000"/>
+              </a:spcBef>
+              <a:spcAft>
+                <a:spcPts val="0"/>
+              </a:spcAft>
+              <a:buClr>
+                <a:schemeClr val="accent1"/>
+              </a:buClr>
+              <a:buFont typeface="Wingdings 3" charset="2"/>
+              <a:buNone/>
+              <a:defRPr sz="1200" kern="1200">
+                <a:solidFill>
+                  <a:schemeClr val="tx1">
+                    <a:tint val="75000"/>
+                  </a:schemeClr>
+                </a:solidFill>
+                <a:latin typeface="+mn-lt"/>
+                <a:ea typeface="+mn-ea"/>
+                <a:cs typeface="+mn-cs"/>
+              </a:defRPr>
+            </a:lvl5pPr>
+            <a:lvl6pPr marL="2286000" indent="0" algn="ctr" defTabSz="457200" rtl="0" eaLnBrk="1" latinLnBrk="0" hangingPunct="1">
+              <a:spcBef>
+                <a:spcPts val="1000"/>
+              </a:spcBef>
+              <a:spcAft>
+                <a:spcPts val="0"/>
+              </a:spcAft>
+              <a:buClr>
+                <a:schemeClr val="accent1"/>
+              </a:buClr>
+              <a:buFont typeface="Wingdings 3" charset="2"/>
+              <a:buNone/>
+              <a:defRPr sz="1200" kern="1200">
+                <a:solidFill>
+                  <a:schemeClr val="tx1">
+                    <a:tint val="75000"/>
+                  </a:schemeClr>
+                </a:solidFill>
+                <a:latin typeface="+mn-lt"/>
+                <a:ea typeface="+mn-ea"/>
+                <a:cs typeface="+mn-cs"/>
+              </a:defRPr>
+            </a:lvl6pPr>
+            <a:lvl7pPr marL="2743200" indent="0" algn="ctr" defTabSz="457200" rtl="0" eaLnBrk="1" latinLnBrk="0" hangingPunct="1">
+              <a:spcBef>
+                <a:spcPts val="1000"/>
+              </a:spcBef>
+              <a:spcAft>
+                <a:spcPts val="0"/>
+              </a:spcAft>
+              <a:buClr>
+                <a:schemeClr val="accent1"/>
+              </a:buClr>
+              <a:buFont typeface="Wingdings 3" charset="2"/>
+              <a:buNone/>
+              <a:defRPr sz="1200" kern="1200">
+                <a:solidFill>
+                  <a:schemeClr val="tx1">
+                    <a:tint val="75000"/>
+                  </a:schemeClr>
+                </a:solidFill>
+                <a:latin typeface="+mn-lt"/>
+                <a:ea typeface="+mn-ea"/>
+                <a:cs typeface="+mn-cs"/>
+              </a:defRPr>
+            </a:lvl7pPr>
+            <a:lvl8pPr marL="3200400" indent="0" algn="ctr" defTabSz="457200" rtl="0" eaLnBrk="1" latinLnBrk="0" hangingPunct="1">
+              <a:spcBef>
+                <a:spcPts val="1000"/>
+              </a:spcBef>
+              <a:spcAft>
+                <a:spcPts val="0"/>
+              </a:spcAft>
+              <a:buClr>
+                <a:schemeClr val="accent1"/>
+              </a:buClr>
+              <a:buFont typeface="Wingdings 3" charset="2"/>
+              <a:buNone/>
+              <a:defRPr sz="1200" kern="1200">
+                <a:solidFill>
+                  <a:schemeClr val="tx1">
+                    <a:tint val="75000"/>
+                  </a:schemeClr>
+                </a:solidFill>
+                <a:latin typeface="+mn-lt"/>
+                <a:ea typeface="+mn-ea"/>
+                <a:cs typeface="+mn-cs"/>
+              </a:defRPr>
+            </a:lvl8pPr>
+            <a:lvl9pPr marL="3657600" indent="0" algn="ctr" defTabSz="457200" rtl="0" eaLnBrk="1" latinLnBrk="0" hangingPunct="1">
+              <a:spcBef>
+                <a:spcPts val="1000"/>
+              </a:spcBef>
+              <a:spcAft>
+                <a:spcPts val="0"/>
+              </a:spcAft>
+              <a:buClr>
+                <a:schemeClr val="accent1"/>
+              </a:buClr>
+              <a:buFont typeface="Wingdings 3" charset="2"/>
+              <a:buNone/>
+              <a:defRPr sz="1200" kern="1200">
+                <a:solidFill>
+                  <a:schemeClr val="tx1">
+                    <a:tint val="75000"/>
+                  </a:schemeClr>
+                </a:solidFill>
+                <a:latin typeface="+mn-lt"/>
+                <a:ea typeface="+mn-ea"/>
+                <a:cs typeface="+mn-cs"/>
+              </a:defRPr>
+            </a:lvl9pPr>
+          </a:lstStyle>
+          <a:p>
+            <a:r>
+              <a:rPr lang="en-US" sz="1400" dirty="0"/>
+              <a:t>✨ </a:t>
+            </a:r>
+            <a:r>
+              <a:rPr lang="en-US" sz="1400" b="1" dirty="0"/>
+              <a:t>Districts:</a:t>
+            </a:r>
+          </a:p>
+          <a:p>
+            <a:r>
+              <a:rPr lang="en-US" sz="1400" b="1" dirty="0"/>
+              <a:t>1). </a:t>
+            </a:r>
+            <a:r>
+              <a:rPr lang="en-US" sz="1400" dirty="0"/>
+              <a:t>Mainly there are 3 districts which have most of visitors which are </a:t>
+            </a:r>
+            <a:r>
+              <a:rPr lang="en-US" sz="1400" b="1" dirty="0"/>
+              <a:t>Hyderabad, Rajanna Sircilla, Warangal (Urban)</a:t>
+            </a:r>
+            <a:r>
+              <a:rPr lang="en-US" sz="1400" dirty="0"/>
+              <a:t>.</a:t>
+            </a:r>
+          </a:p>
+          <a:p>
+            <a:r>
+              <a:rPr lang="en-US" sz="1400" b="1" dirty="0"/>
+              <a:t>2). Hyderabad </a:t>
+            </a:r>
+            <a:r>
+              <a:rPr lang="en-US" sz="1400" dirty="0"/>
+              <a:t>is the capital of Telangana, and it has lots of tourist places including </a:t>
+            </a:r>
+            <a:r>
+              <a:rPr lang="en-US" sz="1400" b="1" dirty="0"/>
+              <a:t>ancient monuments, temples, markets</a:t>
+            </a:r>
+            <a:r>
+              <a:rPr lang="en-US" sz="1400" dirty="0"/>
+              <a:t> etc., because of that it has high number of tourist.</a:t>
+            </a:r>
+          </a:p>
+          <a:p>
+            <a:r>
+              <a:rPr lang="en-US" sz="1400" b="1" dirty="0"/>
+              <a:t>3). Rajanna Sircilla</a:t>
+            </a:r>
+            <a:r>
+              <a:rPr lang="en-US" sz="1400" dirty="0"/>
+              <a:t> has a famous temple </a:t>
+            </a:r>
+            <a:r>
+              <a:rPr lang="en-US" sz="1400" b="1" dirty="0"/>
+              <a:t>Vemulwada</a:t>
+            </a:r>
+            <a:r>
+              <a:rPr lang="en-US" sz="1400" dirty="0"/>
+              <a:t> which was dedicated to </a:t>
+            </a:r>
+            <a:r>
+              <a:rPr lang="en-US" sz="1400" b="1" dirty="0"/>
+              <a:t>Lord Shiva</a:t>
+            </a:r>
+            <a:r>
+              <a:rPr lang="en-US" sz="1400" dirty="0"/>
+              <a:t>, thousands of worshippers come at the time of </a:t>
+            </a:r>
+            <a:r>
+              <a:rPr lang="en-US" sz="1400" b="1" dirty="0"/>
+              <a:t>Shivaratri</a:t>
+            </a:r>
+            <a:r>
+              <a:rPr lang="en-US" sz="1400" dirty="0"/>
+              <a:t> which the month of </a:t>
+            </a:r>
+            <a:r>
+              <a:rPr lang="en-US" sz="1400" b="1" dirty="0"/>
+              <a:t>February</a:t>
+            </a:r>
+            <a:r>
+              <a:rPr lang="en-US" sz="1400" dirty="0"/>
+              <a:t> for worshipping Lord Shiva.</a:t>
+            </a:r>
+          </a:p>
+        </p:txBody>
+      </p:sp>
+    </p:spTree>
+    <p:extLst>
+      <p:ext uri="{BB962C8B-B14F-4D97-AF65-F5344CB8AC3E}">
+        <p14:creationId xmlns:p14="http://schemas.microsoft.com/office/powerpoint/2010/main" val="2072000408"/>
+      </p:ext>
+    </p:extLst>
+  </p:cSld>
+  <p:clrMapOvr>
+    <a:masterClrMapping/>
+  </p:clrMapOvr>
+</p:sld>
+</file>
+
+<file path=ppt/slides/slide16.xml><?xml version="1.0" encoding="utf-8"?>
+<p:sld xmlns:a="http://schemas.openxmlformats.org/drawingml/2006/main" xmlns:r="http://schemas.openxmlformats.org/officeDocument/2006/relationships" xmlns:p="http://schemas.openxmlformats.org/presentationml/2006/main">
+  <p:cSld>
+    <p:spTree>
+      <p:nvGrpSpPr>
+        <p:cNvPr id="1" name=""/>
+        <p:cNvGrpSpPr/>
+        <p:nvPr/>
+      </p:nvGrpSpPr>
+      <p:grpSpPr>
+        <a:xfrm>
+          <a:off x="0" y="0"/>
+          <a:ext cx="0" cy="0"/>
+          <a:chOff x="0" y="0"/>
+          <a:chExt cx="0" cy="0"/>
+        </a:xfrm>
+      </p:grpSpPr>
+      <p:sp>
+        <p:nvSpPr>
+          <p:cNvPr id="4" name="Title 1">
+            <a:extLst>
+              <a:ext uri="{FF2B5EF4-FFF2-40B4-BE49-F238E27FC236}">
+                <a16:creationId xmlns:a16="http://schemas.microsoft.com/office/drawing/2014/main" id="{C6EC006E-EC7E-B586-58C8-0B9A78BD44C2}"/>
+              </a:ext>
+            </a:extLst>
+          </p:cNvPr>
+          <p:cNvSpPr txBox="1">
+            <a:spLocks/>
+          </p:cNvSpPr>
+          <p:nvPr/>
+        </p:nvSpPr>
+        <p:spPr>
+          <a:xfrm>
+            <a:off x="1456858" y="53332"/>
+            <a:ext cx="9278283" cy="515798"/>
+          </a:xfrm>
+          <a:prstGeom prst="snipRoundRect">
+            <a:avLst/>
+          </a:prstGeom>
+          <a:solidFill>
+            <a:schemeClr val="bg1">
+              <a:lumMod val="85000"/>
+            </a:schemeClr>
+          </a:solidFill>
+        </p:spPr>
+        <p:style>
+          <a:lnRef idx="2">
+            <a:schemeClr val="accent6"/>
+          </a:lnRef>
+          <a:fillRef idx="1">
+            <a:schemeClr val="lt1"/>
+          </a:fillRef>
+          <a:effectRef idx="0">
+            <a:schemeClr val="accent6"/>
+          </a:effectRef>
+          <a:fontRef idx="minor">
+            <a:schemeClr val="dk1"/>
+          </a:fontRef>
+        </p:style>
+        <p:txBody>
+          <a:bodyPr vert="horz" lIns="91440" tIns="45720" rIns="91440" bIns="45720" rtlCol="0" anchor="b">
+            <a:noAutofit/>
+          </a:bodyPr>
+          <a:lstStyle>
+            <a:lvl1pPr algn="l" defTabSz="457200" rtl="0" eaLnBrk="1" latinLnBrk="0" hangingPunct="1">
+              <a:spcBef>
+                <a:spcPct val="0"/>
+              </a:spcBef>
+              <a:buNone/>
+              <a:defRPr sz="5400" kern="1200">
+                <a:solidFill>
+                  <a:schemeClr val="dk1"/>
+                </a:solidFill>
+                <a:latin typeface="+mn-lt"/>
+                <a:ea typeface="+mn-ea"/>
+                <a:cs typeface="+mn-cs"/>
+              </a:defRPr>
+            </a:lvl1pPr>
+            <a:lvl2pPr eaLnBrk="1" hangingPunct="1">
+              <a:defRPr>
+                <a:solidFill>
+                  <a:schemeClr val="dk1"/>
+                </a:solidFill>
+                <a:latin typeface="+mn-lt"/>
+                <a:ea typeface="+mn-ea"/>
+                <a:cs typeface="+mn-cs"/>
+              </a:defRPr>
+            </a:lvl2pPr>
+            <a:lvl3pPr eaLnBrk="1" hangingPunct="1">
+              <a:defRPr>
+                <a:solidFill>
+                  <a:schemeClr val="dk1"/>
+                </a:solidFill>
+                <a:latin typeface="+mn-lt"/>
+                <a:ea typeface="+mn-ea"/>
+                <a:cs typeface="+mn-cs"/>
+              </a:defRPr>
+            </a:lvl3pPr>
+            <a:lvl4pPr eaLnBrk="1" hangingPunct="1">
+              <a:defRPr>
+                <a:solidFill>
+                  <a:schemeClr val="dk1"/>
+                </a:solidFill>
+                <a:latin typeface="+mn-lt"/>
+                <a:ea typeface="+mn-ea"/>
+                <a:cs typeface="+mn-cs"/>
+              </a:defRPr>
+            </a:lvl4pPr>
+            <a:lvl5pPr eaLnBrk="1" hangingPunct="1">
+              <a:defRPr>
+                <a:solidFill>
+                  <a:schemeClr val="dk1"/>
+                </a:solidFill>
+                <a:latin typeface="+mn-lt"/>
+                <a:ea typeface="+mn-ea"/>
+                <a:cs typeface="+mn-cs"/>
+              </a:defRPr>
+            </a:lvl5pPr>
+            <a:lvl6pPr eaLnBrk="1" hangingPunct="1">
+              <a:defRPr>
+                <a:solidFill>
+                  <a:schemeClr val="dk1"/>
+                </a:solidFill>
+                <a:latin typeface="+mn-lt"/>
+                <a:ea typeface="+mn-ea"/>
+                <a:cs typeface="+mn-cs"/>
+              </a:defRPr>
+            </a:lvl6pPr>
+            <a:lvl7pPr eaLnBrk="1" hangingPunct="1">
+              <a:defRPr>
+                <a:solidFill>
+                  <a:schemeClr val="dk1"/>
+                </a:solidFill>
+                <a:latin typeface="+mn-lt"/>
+                <a:ea typeface="+mn-ea"/>
+                <a:cs typeface="+mn-cs"/>
+              </a:defRPr>
+            </a:lvl7pPr>
+            <a:lvl8pPr eaLnBrk="1" hangingPunct="1">
+              <a:defRPr>
+                <a:solidFill>
+                  <a:schemeClr val="dk1"/>
+                </a:solidFill>
+                <a:latin typeface="+mn-lt"/>
+                <a:ea typeface="+mn-ea"/>
+                <a:cs typeface="+mn-cs"/>
+              </a:defRPr>
+            </a:lvl8pPr>
+            <a:lvl9pPr eaLnBrk="1" hangingPunct="1">
+              <a:defRPr>
+                <a:solidFill>
+                  <a:schemeClr val="dk1"/>
+                </a:solidFill>
+                <a:latin typeface="+mn-lt"/>
+                <a:ea typeface="+mn-ea"/>
+                <a:cs typeface="+mn-cs"/>
+              </a:defRPr>
+            </a:lvl9pPr>
+          </a:lstStyle>
+          <a:p>
+            <a:pPr algn="ctr"/>
+            <a:r>
+              <a:rPr lang="en-US" sz="3200" dirty="0"/>
+              <a:t>Dubai Vs Hyderabad</a:t>
+            </a:r>
+            <a:endParaRPr lang="en-GB" sz="3200" dirty="0"/>
+          </a:p>
+        </p:txBody>
+      </p:sp>
+      <p:sp>
+        <p:nvSpPr>
+          <p:cNvPr id="6" name="Subtitle 2">
+            <a:extLst>
+              <a:ext uri="{FF2B5EF4-FFF2-40B4-BE49-F238E27FC236}">
+                <a16:creationId xmlns:a16="http://schemas.microsoft.com/office/drawing/2014/main" id="{4DE28FAB-0E9E-1BDF-7B8C-2E3764807F78}"/>
+              </a:ext>
+            </a:extLst>
+          </p:cNvPr>
+          <p:cNvSpPr txBox="1">
+            <a:spLocks/>
+          </p:cNvSpPr>
+          <p:nvPr/>
+        </p:nvSpPr>
+        <p:spPr>
+          <a:xfrm>
+            <a:off x="4595813" y="748035"/>
+            <a:ext cx="3679918" cy="2883061"/>
+          </a:xfrm>
+          <a:prstGeom prst="roundRect">
+            <a:avLst/>
+          </a:prstGeom>
+        </p:spPr>
+        <p:style>
+          <a:lnRef idx="2">
+            <a:schemeClr val="accent5"/>
+          </a:lnRef>
+          <a:fillRef idx="1">
+            <a:schemeClr val="lt1"/>
+          </a:fillRef>
+          <a:effectRef idx="0">
+            <a:schemeClr val="accent5"/>
+          </a:effectRef>
+          <a:fontRef idx="minor">
+            <a:schemeClr val="dk1"/>
+          </a:fontRef>
+        </p:style>
+        <p:txBody>
+          <a:bodyPr vert="horz" lIns="91440" tIns="45720" rIns="91440" bIns="45720" rtlCol="0" anchor="t">
+            <a:normAutofit fontScale="77500" lnSpcReduction="20000"/>
+          </a:bodyPr>
+          <a:lstStyle>
+            <a:lvl1pPr marL="0" indent="0" algn="l" defTabSz="457200" rtl="0" eaLnBrk="1" latinLnBrk="0" hangingPunct="1">
+              <a:spcBef>
+                <a:spcPts val="1000"/>
+              </a:spcBef>
+              <a:spcAft>
+                <a:spcPts val="0"/>
+              </a:spcAft>
+              <a:buClr>
+                <a:schemeClr val="accent1"/>
+              </a:buClr>
+              <a:buFont typeface="Wingdings 3" charset="2"/>
+              <a:buNone/>
+              <a:defRPr sz="1800" kern="1200">
+                <a:solidFill>
+                  <a:schemeClr val="tx1">
+                    <a:lumMod val="65000"/>
+                    <a:lumOff val="35000"/>
+                  </a:schemeClr>
+                </a:solidFill>
+                <a:latin typeface="+mn-lt"/>
+                <a:ea typeface="+mn-ea"/>
+                <a:cs typeface="+mn-cs"/>
+              </a:defRPr>
+            </a:lvl1pPr>
+            <a:lvl2pPr marL="457200" indent="0" algn="ctr" defTabSz="457200" rtl="0" eaLnBrk="1" latinLnBrk="0" hangingPunct="1">
+              <a:spcBef>
+                <a:spcPts val="1000"/>
+              </a:spcBef>
+              <a:spcAft>
+                <a:spcPts val="0"/>
+              </a:spcAft>
+              <a:buClr>
+                <a:schemeClr val="accent1"/>
+              </a:buClr>
+              <a:buFont typeface="Wingdings 3" charset="2"/>
+              <a:buNone/>
+              <a:defRPr sz="1600" kern="1200">
+                <a:solidFill>
+                  <a:schemeClr val="tx1">
+                    <a:tint val="75000"/>
+                  </a:schemeClr>
+                </a:solidFill>
+                <a:latin typeface="+mn-lt"/>
+                <a:ea typeface="+mn-ea"/>
+                <a:cs typeface="+mn-cs"/>
+              </a:defRPr>
+            </a:lvl2pPr>
+            <a:lvl3pPr marL="914400" indent="0" algn="ctr" defTabSz="457200" rtl="0" eaLnBrk="1" latinLnBrk="0" hangingPunct="1">
+              <a:spcBef>
+                <a:spcPts val="1000"/>
+              </a:spcBef>
+              <a:spcAft>
+                <a:spcPts val="0"/>
+              </a:spcAft>
+              <a:buClr>
+                <a:schemeClr val="accent1"/>
+              </a:buClr>
+              <a:buFont typeface="Wingdings 3" charset="2"/>
+              <a:buNone/>
+              <a:defRPr sz="1400" kern="1200">
+                <a:solidFill>
+                  <a:schemeClr val="tx1">
+                    <a:tint val="75000"/>
+                  </a:schemeClr>
+                </a:solidFill>
+                <a:latin typeface="+mn-lt"/>
+                <a:ea typeface="+mn-ea"/>
+                <a:cs typeface="+mn-cs"/>
+              </a:defRPr>
+            </a:lvl3pPr>
+            <a:lvl4pPr marL="1371600" indent="0" algn="ctr" defTabSz="457200" rtl="0" eaLnBrk="1" latinLnBrk="0" hangingPunct="1">
+              <a:spcBef>
+                <a:spcPts val="1000"/>
+              </a:spcBef>
+              <a:spcAft>
+                <a:spcPts val="0"/>
+              </a:spcAft>
+              <a:buClr>
+                <a:schemeClr val="accent1"/>
+              </a:buClr>
+              <a:buFont typeface="Wingdings 3" charset="2"/>
+              <a:buNone/>
+              <a:defRPr sz="1200" kern="1200">
+                <a:solidFill>
+                  <a:schemeClr val="tx1">
+                    <a:tint val="75000"/>
+                  </a:schemeClr>
+                </a:solidFill>
+                <a:latin typeface="+mn-lt"/>
+                <a:ea typeface="+mn-ea"/>
+                <a:cs typeface="+mn-cs"/>
+              </a:defRPr>
+            </a:lvl4pPr>
+            <a:lvl5pPr marL="1828800" indent="0" algn="ctr" defTabSz="457200" rtl="0" eaLnBrk="1" latinLnBrk="0" hangingPunct="1">
+              <a:spcBef>
+                <a:spcPts val="1000"/>
+              </a:spcBef>
+              <a:spcAft>
+                <a:spcPts val="0"/>
+              </a:spcAft>
+              <a:buClr>
+                <a:schemeClr val="accent1"/>
+              </a:buClr>
+              <a:buFont typeface="Wingdings 3" charset="2"/>
+              <a:buNone/>
+              <a:defRPr sz="1200" kern="1200">
+                <a:solidFill>
+                  <a:schemeClr val="tx1">
+                    <a:tint val="75000"/>
+                  </a:schemeClr>
+                </a:solidFill>
+                <a:latin typeface="+mn-lt"/>
+                <a:ea typeface="+mn-ea"/>
+                <a:cs typeface="+mn-cs"/>
+              </a:defRPr>
+            </a:lvl5pPr>
+            <a:lvl6pPr marL="2286000" indent="0" algn="ctr" defTabSz="457200" rtl="0" eaLnBrk="1" latinLnBrk="0" hangingPunct="1">
+              <a:spcBef>
+                <a:spcPts val="1000"/>
+              </a:spcBef>
+              <a:spcAft>
+                <a:spcPts val="0"/>
+              </a:spcAft>
+              <a:buClr>
+                <a:schemeClr val="accent1"/>
+              </a:buClr>
+              <a:buFont typeface="Wingdings 3" charset="2"/>
+              <a:buNone/>
+              <a:defRPr sz="1200" kern="1200">
+                <a:solidFill>
+                  <a:schemeClr val="tx1">
+                    <a:tint val="75000"/>
+                  </a:schemeClr>
+                </a:solidFill>
+                <a:latin typeface="+mn-lt"/>
+                <a:ea typeface="+mn-ea"/>
+                <a:cs typeface="+mn-cs"/>
+              </a:defRPr>
+            </a:lvl6pPr>
+            <a:lvl7pPr marL="2743200" indent="0" algn="ctr" defTabSz="457200" rtl="0" eaLnBrk="1" latinLnBrk="0" hangingPunct="1">
+              <a:spcBef>
+                <a:spcPts val="1000"/>
+              </a:spcBef>
+              <a:spcAft>
+                <a:spcPts val="0"/>
+              </a:spcAft>
+              <a:buClr>
+                <a:schemeClr val="accent1"/>
+              </a:buClr>
+              <a:buFont typeface="Wingdings 3" charset="2"/>
+              <a:buNone/>
+              <a:defRPr sz="1200" kern="1200">
+                <a:solidFill>
+                  <a:schemeClr val="tx1">
+                    <a:tint val="75000"/>
+                  </a:schemeClr>
+                </a:solidFill>
+                <a:latin typeface="+mn-lt"/>
+                <a:ea typeface="+mn-ea"/>
+                <a:cs typeface="+mn-cs"/>
+              </a:defRPr>
+            </a:lvl7pPr>
+            <a:lvl8pPr marL="3200400" indent="0" algn="ctr" defTabSz="457200" rtl="0" eaLnBrk="1" latinLnBrk="0" hangingPunct="1">
+              <a:spcBef>
+                <a:spcPts val="1000"/>
+              </a:spcBef>
+              <a:spcAft>
+                <a:spcPts val="0"/>
+              </a:spcAft>
+              <a:buClr>
+                <a:schemeClr val="accent1"/>
+              </a:buClr>
+              <a:buFont typeface="Wingdings 3" charset="2"/>
+              <a:buNone/>
+              <a:defRPr sz="1200" kern="1200">
+                <a:solidFill>
+                  <a:schemeClr val="tx1">
+                    <a:tint val="75000"/>
+                  </a:schemeClr>
+                </a:solidFill>
+                <a:latin typeface="+mn-lt"/>
+                <a:ea typeface="+mn-ea"/>
+                <a:cs typeface="+mn-cs"/>
+              </a:defRPr>
+            </a:lvl8pPr>
+            <a:lvl9pPr marL="3657600" indent="0" algn="ctr" defTabSz="457200" rtl="0" eaLnBrk="1" latinLnBrk="0" hangingPunct="1">
+              <a:spcBef>
+                <a:spcPts val="1000"/>
+              </a:spcBef>
+              <a:spcAft>
+                <a:spcPts val="0"/>
+              </a:spcAft>
+              <a:buClr>
+                <a:schemeClr val="accent1"/>
+              </a:buClr>
+              <a:buFont typeface="Wingdings 3" charset="2"/>
+              <a:buNone/>
+              <a:defRPr sz="1200" kern="1200">
+                <a:solidFill>
+                  <a:schemeClr val="tx1">
+                    <a:tint val="75000"/>
+                  </a:schemeClr>
+                </a:solidFill>
+                <a:latin typeface="+mn-lt"/>
+                <a:ea typeface="+mn-ea"/>
+                <a:cs typeface="+mn-cs"/>
+              </a:defRPr>
+            </a:lvl9pPr>
+          </a:lstStyle>
+          <a:p>
+            <a:r>
+              <a:rPr lang="en-US" sz="1400" dirty="0"/>
+              <a:t>✨ </a:t>
+            </a:r>
+            <a:r>
+              <a:rPr lang="en-US" sz="1400" b="1" dirty="0"/>
+              <a:t>Dubai :</a:t>
+            </a:r>
+          </a:p>
+          <a:p>
+            <a:r>
+              <a:rPr lang="en-US" sz="1400" dirty="0"/>
+              <a:t>📌</a:t>
+            </a:r>
+            <a:r>
+              <a:rPr lang="en-US" sz="1400" b="1" dirty="0"/>
+              <a:t> Infrastructure:</a:t>
+            </a:r>
+          </a:p>
+          <a:p>
+            <a:r>
+              <a:rPr lang="en-US" sz="1400" b="1" dirty="0"/>
+              <a:t>1). </a:t>
+            </a:r>
+            <a:r>
+              <a:rPr lang="en-US" sz="1400" dirty="0"/>
+              <a:t>Dubai has world – class infrastructure with </a:t>
+            </a:r>
+            <a:r>
+              <a:rPr lang="en-US" sz="1400" b="1" dirty="0"/>
+              <a:t>moder airports, powerful transportation network, Luxurious Hotels.</a:t>
+            </a:r>
+          </a:p>
+          <a:p>
+            <a:r>
+              <a:rPr lang="en-US" sz="1400" b="1" dirty="0"/>
+              <a:t>2). </a:t>
+            </a:r>
+            <a:r>
+              <a:rPr lang="en-US" sz="1400" dirty="0"/>
+              <a:t>Dubai has invested heavily in infrastructure this has made it a </a:t>
+            </a:r>
+            <a:r>
+              <a:rPr lang="en-US" sz="1400" b="1" dirty="0"/>
+              <a:t>transportation hub </a:t>
+            </a:r>
+            <a:r>
+              <a:rPr lang="en-US" sz="1400" dirty="0"/>
+              <a:t>and a more</a:t>
+            </a:r>
+            <a:r>
+              <a:rPr lang="en-US" sz="1400" b="1" dirty="0"/>
+              <a:t> attractive destinations for tourists.</a:t>
+            </a:r>
+            <a:endParaRPr lang="en-US" sz="1400" dirty="0"/>
+          </a:p>
+          <a:p>
+            <a:r>
+              <a:rPr lang="en-US" sz="1400" dirty="0"/>
+              <a:t>📌</a:t>
+            </a:r>
+            <a:r>
+              <a:rPr lang="en-US" sz="1400" b="1" dirty="0"/>
+              <a:t>Business:</a:t>
+            </a:r>
+          </a:p>
+          <a:p>
+            <a:r>
+              <a:rPr lang="en-US" sz="1400" b="1" dirty="0"/>
+              <a:t>1). </a:t>
+            </a:r>
+            <a:r>
+              <a:rPr lang="en-US" sz="1400" dirty="0"/>
+              <a:t>Dubai has made so many </a:t>
+            </a:r>
+            <a:r>
+              <a:rPr lang="en-US" sz="1400" b="1" dirty="0"/>
+              <a:t>business-friendly policies</a:t>
+            </a:r>
+            <a:r>
+              <a:rPr lang="en-US" sz="1400" dirty="0"/>
+              <a:t> and </a:t>
+            </a:r>
+            <a:r>
+              <a:rPr lang="en-US" sz="1400" b="1" dirty="0"/>
+              <a:t>offering tax breaks</a:t>
+            </a:r>
+            <a:r>
+              <a:rPr lang="en-US" sz="1400" dirty="0"/>
+              <a:t> which made it a </a:t>
+            </a:r>
+            <a:r>
+              <a:rPr lang="en-US" sz="1400" b="1" dirty="0"/>
+              <a:t>global business hub</a:t>
+            </a:r>
+            <a:r>
+              <a:rPr lang="en-US" sz="1400" dirty="0"/>
+              <a:t> and a destination for </a:t>
+            </a:r>
+            <a:r>
+              <a:rPr lang="en-US" sz="1400" b="1" dirty="0"/>
+              <a:t>business tourism</a:t>
+            </a:r>
+            <a:r>
+              <a:rPr lang="en-US" sz="1400" dirty="0"/>
+              <a:t>.</a:t>
+            </a:r>
+          </a:p>
+        </p:txBody>
+      </p:sp>
+      <p:sp>
+        <p:nvSpPr>
+          <p:cNvPr id="7" name="Rectangle: Rounded Corners 6">
+            <a:extLst>
+              <a:ext uri="{FF2B5EF4-FFF2-40B4-BE49-F238E27FC236}">
+                <a16:creationId xmlns:a16="http://schemas.microsoft.com/office/drawing/2014/main" id="{7E6C13AF-66E1-8687-FC23-90624FBEAF02}"/>
+              </a:ext>
+            </a:extLst>
+          </p:cNvPr>
+          <p:cNvSpPr>
+            <a:spLocks/>
+          </p:cNvSpPr>
+          <p:nvPr/>
+        </p:nvSpPr>
+        <p:spPr>
+          <a:xfrm>
+            <a:off x="520434" y="748036"/>
+            <a:ext cx="3910934" cy="2883060"/>
+          </a:xfrm>
+          <a:prstGeom prst="roundRect">
+            <a:avLst/>
+          </a:prstGeom>
+          <a:noFill/>
+          <a:effectLst>
+            <a:glow rad="101600">
+              <a:schemeClr val="bg1">
+                <a:lumMod val="65000"/>
+                <a:alpha val="60000"/>
+              </a:schemeClr>
+            </a:glow>
+            <a:innerShdw blurRad="114300">
+              <a:prstClr val="black"/>
+            </a:innerShdw>
+          </a:effectLst>
+        </p:spPr>
+        <p:style>
+          <a:lnRef idx="2">
+            <a:schemeClr val="accent1">
+              <a:shade val="50000"/>
+            </a:schemeClr>
+          </a:lnRef>
+          <a:fillRef idx="1">
+            <a:schemeClr val="accent1"/>
+          </a:fillRef>
+          <a:effectRef idx="0">
+            <a:schemeClr val="accent1"/>
+          </a:effectRef>
+          <a:fontRef idx="minor">
+            <a:schemeClr val="lt1"/>
+          </a:fontRef>
+        </p:style>
+        <p:txBody>
+          <a:bodyPr rtlCol="0" anchor="ctr"/>
+          <a:lstStyle/>
+          <a:p>
+            <a:pPr algn="ctr"/>
+            <a:endParaRPr lang="en-GB" dirty="0"/>
+          </a:p>
+        </p:txBody>
+      </p:sp>
+      <p:sp>
+        <p:nvSpPr>
+          <p:cNvPr id="8" name="Subtitle 2">
+            <a:extLst>
+              <a:ext uri="{FF2B5EF4-FFF2-40B4-BE49-F238E27FC236}">
+                <a16:creationId xmlns:a16="http://schemas.microsoft.com/office/drawing/2014/main" id="{0861A01E-E235-6585-9DAC-BD247393EBFE}"/>
+              </a:ext>
+            </a:extLst>
+          </p:cNvPr>
+          <p:cNvSpPr txBox="1">
+            <a:spLocks/>
+          </p:cNvSpPr>
+          <p:nvPr/>
+        </p:nvSpPr>
+        <p:spPr>
+          <a:xfrm>
+            <a:off x="8440176" y="748034"/>
+            <a:ext cx="3679918" cy="2883061"/>
+          </a:xfrm>
+          <a:prstGeom prst="roundRect">
+            <a:avLst/>
+          </a:prstGeom>
+        </p:spPr>
+        <p:style>
+          <a:lnRef idx="2">
+            <a:schemeClr val="accent5"/>
+          </a:lnRef>
+          <a:fillRef idx="1">
+            <a:schemeClr val="lt1"/>
+          </a:fillRef>
+          <a:effectRef idx="0">
+            <a:schemeClr val="accent5"/>
+          </a:effectRef>
+          <a:fontRef idx="minor">
+            <a:schemeClr val="dk1"/>
+          </a:fontRef>
+        </p:style>
+        <p:txBody>
+          <a:bodyPr vert="horz" lIns="91440" tIns="45720" rIns="91440" bIns="45720" rtlCol="0" anchor="t">
+            <a:normAutofit fontScale="77500" lnSpcReduction="20000"/>
+          </a:bodyPr>
+          <a:lstStyle>
+            <a:lvl1pPr marL="0" indent="0" algn="l" defTabSz="457200" rtl="0" eaLnBrk="1" latinLnBrk="0" hangingPunct="1">
+              <a:spcBef>
+                <a:spcPts val="1000"/>
+              </a:spcBef>
+              <a:spcAft>
+                <a:spcPts val="0"/>
+              </a:spcAft>
+              <a:buClr>
+                <a:schemeClr val="accent1"/>
+              </a:buClr>
+              <a:buFont typeface="Wingdings 3" charset="2"/>
+              <a:buNone/>
+              <a:defRPr sz="1800" kern="1200">
+                <a:solidFill>
+                  <a:schemeClr val="tx1">
+                    <a:lumMod val="65000"/>
+                    <a:lumOff val="35000"/>
+                  </a:schemeClr>
+                </a:solidFill>
+                <a:latin typeface="+mn-lt"/>
+                <a:ea typeface="+mn-ea"/>
+                <a:cs typeface="+mn-cs"/>
+              </a:defRPr>
+            </a:lvl1pPr>
+            <a:lvl2pPr marL="457200" indent="0" algn="ctr" defTabSz="457200" rtl="0" eaLnBrk="1" latinLnBrk="0" hangingPunct="1">
+              <a:spcBef>
+                <a:spcPts val="1000"/>
+              </a:spcBef>
+              <a:spcAft>
+                <a:spcPts val="0"/>
+              </a:spcAft>
+              <a:buClr>
+                <a:schemeClr val="accent1"/>
+              </a:buClr>
+              <a:buFont typeface="Wingdings 3" charset="2"/>
+              <a:buNone/>
+              <a:defRPr sz="1600" kern="1200">
+                <a:solidFill>
+                  <a:schemeClr val="tx1">
+                    <a:tint val="75000"/>
+                  </a:schemeClr>
+                </a:solidFill>
+                <a:latin typeface="+mn-lt"/>
+                <a:ea typeface="+mn-ea"/>
+                <a:cs typeface="+mn-cs"/>
+              </a:defRPr>
+            </a:lvl2pPr>
+            <a:lvl3pPr marL="914400" indent="0" algn="ctr" defTabSz="457200" rtl="0" eaLnBrk="1" latinLnBrk="0" hangingPunct="1">
+              <a:spcBef>
+                <a:spcPts val="1000"/>
+              </a:spcBef>
+              <a:spcAft>
+                <a:spcPts val="0"/>
+              </a:spcAft>
+              <a:buClr>
+                <a:schemeClr val="accent1"/>
+              </a:buClr>
+              <a:buFont typeface="Wingdings 3" charset="2"/>
+              <a:buNone/>
+              <a:defRPr sz="1400" kern="1200">
+                <a:solidFill>
+                  <a:schemeClr val="tx1">
+                    <a:tint val="75000"/>
+                  </a:schemeClr>
+                </a:solidFill>
+                <a:latin typeface="+mn-lt"/>
+                <a:ea typeface="+mn-ea"/>
+                <a:cs typeface="+mn-cs"/>
+              </a:defRPr>
+            </a:lvl3pPr>
+            <a:lvl4pPr marL="1371600" indent="0" algn="ctr" defTabSz="457200" rtl="0" eaLnBrk="1" latinLnBrk="0" hangingPunct="1">
+              <a:spcBef>
+                <a:spcPts val="1000"/>
+              </a:spcBef>
+              <a:spcAft>
+                <a:spcPts val="0"/>
+              </a:spcAft>
+              <a:buClr>
+                <a:schemeClr val="accent1"/>
+              </a:buClr>
+              <a:buFont typeface="Wingdings 3" charset="2"/>
+              <a:buNone/>
+              <a:defRPr sz="1200" kern="1200">
+                <a:solidFill>
+                  <a:schemeClr val="tx1">
+                    <a:tint val="75000"/>
+                  </a:schemeClr>
+                </a:solidFill>
+                <a:latin typeface="+mn-lt"/>
+                <a:ea typeface="+mn-ea"/>
+                <a:cs typeface="+mn-cs"/>
+              </a:defRPr>
+            </a:lvl4pPr>
+            <a:lvl5pPr marL="1828800" indent="0" algn="ctr" defTabSz="457200" rtl="0" eaLnBrk="1" latinLnBrk="0" hangingPunct="1">
+              <a:spcBef>
+                <a:spcPts val="1000"/>
+              </a:spcBef>
+              <a:spcAft>
+                <a:spcPts val="0"/>
+              </a:spcAft>
+              <a:buClr>
+                <a:schemeClr val="accent1"/>
+              </a:buClr>
+              <a:buFont typeface="Wingdings 3" charset="2"/>
+              <a:buNone/>
+              <a:defRPr sz="1200" kern="1200">
+                <a:solidFill>
+                  <a:schemeClr val="tx1">
+                    <a:tint val="75000"/>
+                  </a:schemeClr>
+                </a:solidFill>
+                <a:latin typeface="+mn-lt"/>
+                <a:ea typeface="+mn-ea"/>
+                <a:cs typeface="+mn-cs"/>
+              </a:defRPr>
+            </a:lvl5pPr>
+            <a:lvl6pPr marL="2286000" indent="0" algn="ctr" defTabSz="457200" rtl="0" eaLnBrk="1" latinLnBrk="0" hangingPunct="1">
+              <a:spcBef>
+                <a:spcPts val="1000"/>
+              </a:spcBef>
+              <a:spcAft>
+                <a:spcPts val="0"/>
+              </a:spcAft>
+              <a:buClr>
+                <a:schemeClr val="accent1"/>
+              </a:buClr>
+              <a:buFont typeface="Wingdings 3" charset="2"/>
+              <a:buNone/>
+              <a:defRPr sz="1200" kern="1200">
+                <a:solidFill>
+                  <a:schemeClr val="tx1">
+                    <a:tint val="75000"/>
+                  </a:schemeClr>
+                </a:solidFill>
+                <a:latin typeface="+mn-lt"/>
+                <a:ea typeface="+mn-ea"/>
+                <a:cs typeface="+mn-cs"/>
+              </a:defRPr>
+            </a:lvl6pPr>
+            <a:lvl7pPr marL="2743200" indent="0" algn="ctr" defTabSz="457200" rtl="0" eaLnBrk="1" latinLnBrk="0" hangingPunct="1">
+              <a:spcBef>
+                <a:spcPts val="1000"/>
+              </a:spcBef>
+              <a:spcAft>
+                <a:spcPts val="0"/>
+              </a:spcAft>
+              <a:buClr>
+                <a:schemeClr val="accent1"/>
+              </a:buClr>
+              <a:buFont typeface="Wingdings 3" charset="2"/>
+              <a:buNone/>
+              <a:defRPr sz="1200" kern="1200">
+                <a:solidFill>
+                  <a:schemeClr val="tx1">
+                    <a:tint val="75000"/>
+                  </a:schemeClr>
+                </a:solidFill>
+                <a:latin typeface="+mn-lt"/>
+                <a:ea typeface="+mn-ea"/>
+                <a:cs typeface="+mn-cs"/>
+              </a:defRPr>
+            </a:lvl7pPr>
+            <a:lvl8pPr marL="3200400" indent="0" algn="ctr" defTabSz="457200" rtl="0" eaLnBrk="1" latinLnBrk="0" hangingPunct="1">
+              <a:spcBef>
+                <a:spcPts val="1000"/>
+              </a:spcBef>
+              <a:spcAft>
+                <a:spcPts val="0"/>
+              </a:spcAft>
+              <a:buClr>
+                <a:schemeClr val="accent1"/>
+              </a:buClr>
+              <a:buFont typeface="Wingdings 3" charset="2"/>
+              <a:buNone/>
+              <a:defRPr sz="1200" kern="1200">
+                <a:solidFill>
+                  <a:schemeClr val="tx1">
+                    <a:tint val="75000"/>
+                  </a:schemeClr>
+                </a:solidFill>
+                <a:latin typeface="+mn-lt"/>
+                <a:ea typeface="+mn-ea"/>
+                <a:cs typeface="+mn-cs"/>
+              </a:defRPr>
+            </a:lvl8pPr>
+            <a:lvl9pPr marL="3657600" indent="0" algn="ctr" defTabSz="457200" rtl="0" eaLnBrk="1" latinLnBrk="0" hangingPunct="1">
+              <a:spcBef>
+                <a:spcPts val="1000"/>
+              </a:spcBef>
+              <a:spcAft>
+                <a:spcPts val="0"/>
+              </a:spcAft>
+              <a:buClr>
+                <a:schemeClr val="accent1"/>
+              </a:buClr>
+              <a:buFont typeface="Wingdings 3" charset="2"/>
+              <a:buNone/>
+              <a:defRPr sz="1200" kern="1200">
+                <a:solidFill>
+                  <a:schemeClr val="tx1">
+                    <a:tint val="75000"/>
+                  </a:schemeClr>
+                </a:solidFill>
+                <a:latin typeface="+mn-lt"/>
+                <a:ea typeface="+mn-ea"/>
+                <a:cs typeface="+mn-cs"/>
+              </a:defRPr>
+            </a:lvl9pPr>
+          </a:lstStyle>
+          <a:p>
+            <a:r>
+              <a:rPr lang="en-US" sz="1400" dirty="0"/>
+              <a:t>✨ </a:t>
+            </a:r>
+            <a:r>
+              <a:rPr lang="en-US" sz="1400" b="1" dirty="0"/>
+              <a:t>Hyderabad:</a:t>
+            </a:r>
+          </a:p>
+          <a:p>
+            <a:r>
+              <a:rPr lang="en-US" sz="1400" dirty="0"/>
+              <a:t>📌</a:t>
+            </a:r>
+            <a:r>
+              <a:rPr lang="en-US" sz="1400" b="1" dirty="0"/>
+              <a:t> Infrastructure:</a:t>
+            </a:r>
+          </a:p>
+          <a:p>
+            <a:r>
+              <a:rPr lang="en-US" sz="1400" b="1" dirty="0"/>
+              <a:t>1). </a:t>
+            </a:r>
+            <a:r>
+              <a:rPr lang="en-US" sz="1400" dirty="0"/>
+              <a:t>Hyderabad made a significant progress in infrastructure development by </a:t>
+            </a:r>
+            <a:r>
+              <a:rPr lang="en-US" sz="1400" b="1" dirty="0"/>
+              <a:t>building airports</a:t>
+            </a:r>
+            <a:r>
+              <a:rPr lang="en-US" sz="1400" dirty="0"/>
+              <a:t> and </a:t>
+            </a:r>
+            <a:r>
+              <a:rPr lang="en-US" sz="1400" b="1" dirty="0"/>
+              <a:t>transportation systems</a:t>
+            </a:r>
+            <a:r>
+              <a:rPr lang="en-US" sz="1400" dirty="0"/>
+              <a:t>.</a:t>
+            </a:r>
+          </a:p>
+          <a:p>
+            <a:r>
+              <a:rPr lang="en-US" sz="1400" b="1" dirty="0"/>
+              <a:t>2). </a:t>
+            </a:r>
+            <a:r>
+              <a:rPr lang="en-US" sz="1400" dirty="0"/>
+              <a:t>The city </a:t>
+            </a:r>
+            <a:r>
+              <a:rPr lang="en-US" sz="1400" b="1" dirty="0"/>
+              <a:t>metro rail system</a:t>
+            </a:r>
+            <a:r>
+              <a:rPr lang="en-US" sz="1400" dirty="0"/>
+              <a:t> has improved the </a:t>
+            </a:r>
+            <a:r>
+              <a:rPr lang="en-US" sz="1400" b="1" dirty="0"/>
+              <a:t>connectivity</a:t>
+            </a:r>
+            <a:r>
+              <a:rPr lang="en-US" sz="1400" dirty="0"/>
+              <a:t> within the city</a:t>
+            </a:r>
+            <a:endParaRPr lang="en-US" sz="1400" b="1" dirty="0"/>
+          </a:p>
+          <a:p>
+            <a:r>
+              <a:rPr lang="en-US" sz="1400" dirty="0"/>
+              <a:t>📌 </a:t>
+            </a:r>
+            <a:r>
+              <a:rPr lang="en-US" sz="1400" b="1" dirty="0"/>
+              <a:t>Business:</a:t>
+            </a:r>
+          </a:p>
+          <a:p>
+            <a:r>
+              <a:rPr lang="en-US" sz="1400" b="1" dirty="0"/>
+              <a:t>1). </a:t>
+            </a:r>
+            <a:r>
+              <a:rPr lang="en-US" sz="1400" dirty="0"/>
+              <a:t> Hyderabad has just started to create a </a:t>
+            </a:r>
+            <a:r>
+              <a:rPr lang="en-US" sz="1400" b="1" dirty="0"/>
+              <a:t>business-friendly </a:t>
+            </a:r>
+            <a:r>
+              <a:rPr lang="en-US" sz="1400" dirty="0"/>
+              <a:t>environment by trying to promote business enthusiasts to invest in city so that Hyderabad can also become a </a:t>
+            </a:r>
+            <a:r>
+              <a:rPr lang="en-US" sz="1400" b="1" dirty="0"/>
+              <a:t>business hub</a:t>
+            </a:r>
+            <a:r>
+              <a:rPr lang="en-US" sz="1400" dirty="0"/>
+              <a:t>.</a:t>
+            </a:r>
+            <a:endParaRPr lang="en-US" sz="1400" b="1" dirty="0"/>
+          </a:p>
+        </p:txBody>
+      </p:sp>
+      <p:sp>
+        <p:nvSpPr>
+          <p:cNvPr id="10" name="Subtitle 2">
+            <a:extLst>
+              <a:ext uri="{FF2B5EF4-FFF2-40B4-BE49-F238E27FC236}">
+                <a16:creationId xmlns:a16="http://schemas.microsoft.com/office/drawing/2014/main" id="{5A5E5428-1CF4-28C7-7B10-D4A1BABD0636}"/>
+              </a:ext>
+            </a:extLst>
+          </p:cNvPr>
+          <p:cNvSpPr txBox="1">
+            <a:spLocks/>
+          </p:cNvSpPr>
+          <p:nvPr/>
+        </p:nvSpPr>
+        <p:spPr>
+          <a:xfrm>
+            <a:off x="6435772" y="3768818"/>
+            <a:ext cx="3679918" cy="2883061"/>
+          </a:xfrm>
+          <a:prstGeom prst="roundRect">
+            <a:avLst/>
+          </a:prstGeom>
+        </p:spPr>
+        <p:style>
+          <a:lnRef idx="2">
+            <a:schemeClr val="accent5"/>
+          </a:lnRef>
+          <a:fillRef idx="1">
+            <a:schemeClr val="lt1"/>
+          </a:fillRef>
+          <a:effectRef idx="0">
+            <a:schemeClr val="accent5"/>
+          </a:effectRef>
+          <a:fontRef idx="minor">
+            <a:schemeClr val="dk1"/>
+          </a:fontRef>
+        </p:style>
+        <p:txBody>
+          <a:bodyPr vert="horz" lIns="91440" tIns="45720" rIns="91440" bIns="45720" rtlCol="0" anchor="t">
+            <a:normAutofit fontScale="77500" lnSpcReduction="20000"/>
+          </a:bodyPr>
+          <a:lstStyle>
+            <a:lvl1pPr marL="0" indent="0" algn="l" defTabSz="457200" rtl="0" eaLnBrk="1" latinLnBrk="0" hangingPunct="1">
+              <a:spcBef>
+                <a:spcPts val="1000"/>
+              </a:spcBef>
+              <a:spcAft>
+                <a:spcPts val="0"/>
+              </a:spcAft>
+              <a:buClr>
+                <a:schemeClr val="accent1"/>
+              </a:buClr>
+              <a:buFont typeface="Wingdings 3" charset="2"/>
+              <a:buNone/>
+              <a:defRPr sz="1800" kern="1200">
+                <a:solidFill>
+                  <a:schemeClr val="tx1">
+                    <a:lumMod val="65000"/>
+                    <a:lumOff val="35000"/>
+                  </a:schemeClr>
+                </a:solidFill>
+                <a:latin typeface="+mn-lt"/>
+                <a:ea typeface="+mn-ea"/>
+                <a:cs typeface="+mn-cs"/>
+              </a:defRPr>
+            </a:lvl1pPr>
+            <a:lvl2pPr marL="457200" indent="0" algn="ctr" defTabSz="457200" rtl="0" eaLnBrk="1" latinLnBrk="0" hangingPunct="1">
+              <a:spcBef>
+                <a:spcPts val="1000"/>
+              </a:spcBef>
+              <a:spcAft>
+                <a:spcPts val="0"/>
+              </a:spcAft>
+              <a:buClr>
+                <a:schemeClr val="accent1"/>
+              </a:buClr>
+              <a:buFont typeface="Wingdings 3" charset="2"/>
+              <a:buNone/>
+              <a:defRPr sz="1600" kern="1200">
+                <a:solidFill>
+                  <a:schemeClr val="tx1">
+                    <a:tint val="75000"/>
+                  </a:schemeClr>
+                </a:solidFill>
+                <a:latin typeface="+mn-lt"/>
+                <a:ea typeface="+mn-ea"/>
+                <a:cs typeface="+mn-cs"/>
+              </a:defRPr>
+            </a:lvl2pPr>
+            <a:lvl3pPr marL="914400" indent="0" algn="ctr" defTabSz="457200" rtl="0" eaLnBrk="1" latinLnBrk="0" hangingPunct="1">
+              <a:spcBef>
+                <a:spcPts val="1000"/>
+              </a:spcBef>
+              <a:spcAft>
+                <a:spcPts val="0"/>
+              </a:spcAft>
+              <a:buClr>
+                <a:schemeClr val="accent1"/>
+              </a:buClr>
+              <a:buFont typeface="Wingdings 3" charset="2"/>
+              <a:buNone/>
+              <a:defRPr sz="1400" kern="1200">
+                <a:solidFill>
+                  <a:schemeClr val="tx1">
+                    <a:tint val="75000"/>
+                  </a:schemeClr>
+                </a:solidFill>
+                <a:latin typeface="+mn-lt"/>
+                <a:ea typeface="+mn-ea"/>
+                <a:cs typeface="+mn-cs"/>
+              </a:defRPr>
+            </a:lvl3pPr>
+            <a:lvl4pPr marL="1371600" indent="0" algn="ctr" defTabSz="457200" rtl="0" eaLnBrk="1" latinLnBrk="0" hangingPunct="1">
+              <a:spcBef>
+                <a:spcPts val="1000"/>
+              </a:spcBef>
+              <a:spcAft>
+                <a:spcPts val="0"/>
+              </a:spcAft>
+              <a:buClr>
+                <a:schemeClr val="accent1"/>
+              </a:buClr>
+              <a:buFont typeface="Wingdings 3" charset="2"/>
+              <a:buNone/>
+              <a:defRPr sz="1200" kern="1200">
+                <a:solidFill>
+                  <a:schemeClr val="tx1">
+                    <a:tint val="75000"/>
+                  </a:schemeClr>
+                </a:solidFill>
+                <a:latin typeface="+mn-lt"/>
+                <a:ea typeface="+mn-ea"/>
+                <a:cs typeface="+mn-cs"/>
+              </a:defRPr>
+            </a:lvl4pPr>
+            <a:lvl5pPr marL="1828800" indent="0" algn="ctr" defTabSz="457200" rtl="0" eaLnBrk="1" latinLnBrk="0" hangingPunct="1">
+              <a:spcBef>
+                <a:spcPts val="1000"/>
+              </a:spcBef>
+              <a:spcAft>
+                <a:spcPts val="0"/>
+              </a:spcAft>
+              <a:buClr>
+                <a:schemeClr val="accent1"/>
+              </a:buClr>
+              <a:buFont typeface="Wingdings 3" charset="2"/>
+              <a:buNone/>
+              <a:defRPr sz="1200" kern="1200">
+                <a:solidFill>
+                  <a:schemeClr val="tx1">
+                    <a:tint val="75000"/>
+                  </a:schemeClr>
+                </a:solidFill>
+                <a:latin typeface="+mn-lt"/>
+                <a:ea typeface="+mn-ea"/>
+                <a:cs typeface="+mn-cs"/>
+              </a:defRPr>
+            </a:lvl5pPr>
+            <a:lvl6pPr marL="2286000" indent="0" algn="ctr" defTabSz="457200" rtl="0" eaLnBrk="1" latinLnBrk="0" hangingPunct="1">
+              <a:spcBef>
+                <a:spcPts val="1000"/>
+              </a:spcBef>
+              <a:spcAft>
+                <a:spcPts val="0"/>
+              </a:spcAft>
+              <a:buClr>
+                <a:schemeClr val="accent1"/>
+              </a:buClr>
+              <a:buFont typeface="Wingdings 3" charset="2"/>
+              <a:buNone/>
+              <a:defRPr sz="1200" kern="1200">
+                <a:solidFill>
+                  <a:schemeClr val="tx1">
+                    <a:tint val="75000"/>
+                  </a:schemeClr>
+                </a:solidFill>
+                <a:latin typeface="+mn-lt"/>
+                <a:ea typeface="+mn-ea"/>
+                <a:cs typeface="+mn-cs"/>
+              </a:defRPr>
+            </a:lvl6pPr>
+            <a:lvl7pPr marL="2743200" indent="0" algn="ctr" defTabSz="457200" rtl="0" eaLnBrk="1" latinLnBrk="0" hangingPunct="1">
+              <a:spcBef>
+                <a:spcPts val="1000"/>
+              </a:spcBef>
+              <a:spcAft>
+                <a:spcPts val="0"/>
+              </a:spcAft>
+              <a:buClr>
+                <a:schemeClr val="accent1"/>
+              </a:buClr>
+              <a:buFont typeface="Wingdings 3" charset="2"/>
+              <a:buNone/>
+              <a:defRPr sz="1200" kern="1200">
+                <a:solidFill>
+                  <a:schemeClr val="tx1">
+                    <a:tint val="75000"/>
+                  </a:schemeClr>
+                </a:solidFill>
+                <a:latin typeface="+mn-lt"/>
+                <a:ea typeface="+mn-ea"/>
+                <a:cs typeface="+mn-cs"/>
+              </a:defRPr>
+            </a:lvl7pPr>
+            <a:lvl8pPr marL="3200400" indent="0" algn="ctr" defTabSz="457200" rtl="0" eaLnBrk="1" latinLnBrk="0" hangingPunct="1">
+              <a:spcBef>
+                <a:spcPts val="1000"/>
+              </a:spcBef>
+              <a:spcAft>
+                <a:spcPts val="0"/>
+              </a:spcAft>
+              <a:buClr>
+                <a:schemeClr val="accent1"/>
+              </a:buClr>
+              <a:buFont typeface="Wingdings 3" charset="2"/>
+              <a:buNone/>
+              <a:defRPr sz="1200" kern="1200">
+                <a:solidFill>
+                  <a:schemeClr val="tx1">
+                    <a:tint val="75000"/>
+                  </a:schemeClr>
+                </a:solidFill>
+                <a:latin typeface="+mn-lt"/>
+                <a:ea typeface="+mn-ea"/>
+                <a:cs typeface="+mn-cs"/>
+              </a:defRPr>
+            </a:lvl8pPr>
+            <a:lvl9pPr marL="3657600" indent="0" algn="ctr" defTabSz="457200" rtl="0" eaLnBrk="1" latinLnBrk="0" hangingPunct="1">
+              <a:spcBef>
+                <a:spcPts val="1000"/>
+              </a:spcBef>
+              <a:spcAft>
+                <a:spcPts val="0"/>
+              </a:spcAft>
+              <a:buClr>
+                <a:schemeClr val="accent1"/>
+              </a:buClr>
+              <a:buFont typeface="Wingdings 3" charset="2"/>
+              <a:buNone/>
+              <a:defRPr sz="1200" kern="1200">
+                <a:solidFill>
+                  <a:schemeClr val="tx1">
+                    <a:tint val="75000"/>
+                  </a:schemeClr>
+                </a:solidFill>
+                <a:latin typeface="+mn-lt"/>
+                <a:ea typeface="+mn-ea"/>
+                <a:cs typeface="+mn-cs"/>
+              </a:defRPr>
+            </a:lvl9pPr>
+          </a:lstStyle>
+          <a:p>
+            <a:r>
+              <a:rPr lang="en-US" sz="1400" dirty="0"/>
+              <a:t>✨ </a:t>
+            </a:r>
+            <a:r>
+              <a:rPr lang="en-US" sz="1400" b="1" dirty="0"/>
+              <a:t>Dubai Vs Hyderabad:</a:t>
+            </a:r>
+          </a:p>
+          <a:p>
+            <a:r>
+              <a:rPr lang="en-US" sz="1400" b="1" dirty="0"/>
+              <a:t>1). </a:t>
+            </a:r>
+            <a:r>
+              <a:rPr lang="en-US" sz="1400" dirty="0"/>
+              <a:t>Compared to Dubai, Hyderabad has a long way to go in infrastructure development, government needs to </a:t>
+            </a:r>
+            <a:r>
+              <a:rPr lang="en-US" sz="1400" b="1" dirty="0"/>
+              <a:t>invest </a:t>
+            </a:r>
+            <a:r>
+              <a:rPr lang="en-US" sz="1400" dirty="0"/>
+              <a:t>more in </a:t>
+            </a:r>
+            <a:r>
+              <a:rPr lang="en-US" sz="1400" b="1" dirty="0"/>
+              <a:t>infrastructure developments</a:t>
+            </a:r>
+            <a:r>
+              <a:rPr lang="en-US" sz="1400" dirty="0"/>
+              <a:t>.</a:t>
+            </a:r>
+          </a:p>
+          <a:p>
+            <a:r>
+              <a:rPr lang="en-US" sz="1400" b="1" dirty="0"/>
+              <a:t>2). </a:t>
+            </a:r>
+            <a:r>
+              <a:rPr lang="en-US" sz="1400" dirty="0"/>
+              <a:t>A business enthusiast will prefer Dubai as compared to Hyderabad because Dubai has more friendly policies for business and </a:t>
+            </a:r>
+            <a:r>
+              <a:rPr lang="en-US" sz="1400" b="1" dirty="0"/>
+              <a:t>low tax</a:t>
+            </a:r>
+            <a:r>
+              <a:rPr lang="en-US" sz="1400" dirty="0"/>
+              <a:t>, but in Hyderabad Taxes are </a:t>
+            </a:r>
+            <a:r>
+              <a:rPr lang="en-US" sz="1400" b="1" dirty="0"/>
+              <a:t>high</a:t>
+            </a:r>
+            <a:r>
+              <a:rPr lang="en-US" sz="1400" dirty="0"/>
+              <a:t> for a business.</a:t>
+            </a:r>
+          </a:p>
+          <a:p>
+            <a:r>
+              <a:rPr lang="en-US" sz="1400" b="1" dirty="0"/>
+              <a:t>3). </a:t>
+            </a:r>
+            <a:r>
+              <a:rPr lang="en-US" sz="1400" dirty="0"/>
+              <a:t>Hyderabad has a rich variety of </a:t>
+            </a:r>
+            <a:r>
+              <a:rPr lang="en-US" sz="1400" b="1" dirty="0"/>
+              <a:t>culture and diversity </a:t>
+            </a:r>
+            <a:r>
+              <a:rPr lang="en-US" sz="1400" dirty="0"/>
+              <a:t>as compared to Dubai, it has a </a:t>
+            </a:r>
+            <a:r>
+              <a:rPr lang="en-US" sz="1400" b="1" dirty="0"/>
+              <a:t>local festivals</a:t>
+            </a:r>
+            <a:r>
+              <a:rPr lang="en-US" sz="1400" dirty="0"/>
+              <a:t> and </a:t>
+            </a:r>
+            <a:r>
+              <a:rPr lang="en-US" sz="1400" b="1" dirty="0"/>
+              <a:t>ancient monuments</a:t>
+            </a:r>
+            <a:r>
+              <a:rPr lang="en-US" sz="1400" dirty="0"/>
+              <a:t> which </a:t>
+            </a:r>
+            <a:r>
+              <a:rPr lang="en-US" sz="1400" b="1" dirty="0"/>
+              <a:t>attracts tourist</a:t>
+            </a:r>
+            <a:r>
+              <a:rPr lang="en-US" sz="1400" dirty="0"/>
+              <a:t> to come to Hyderabad.</a:t>
+            </a:r>
+          </a:p>
+        </p:txBody>
+      </p:sp>
+      <p:pic>
+        <p:nvPicPr>
+          <p:cNvPr id="11" name="Picture 10" descr="A picture of Dubai containing building, cityscape, skyline, metropolitan area etc.">
+            <a:extLst>
+              <a:ext uri="{FF2B5EF4-FFF2-40B4-BE49-F238E27FC236}">
+                <a16:creationId xmlns:a16="http://schemas.microsoft.com/office/drawing/2014/main" id="{D4B633CA-9B52-C149-1F04-AF26004D6A3F}"/>
+              </a:ext>
+              <a:ext uri="{C183D7F6-B498-43B3-948B-1728B52AA6E4}">
+                <adec:decorative xmlns:adec="http://schemas.microsoft.com/office/drawing/2017/decorative" val="0"/>
+              </a:ext>
+            </a:extLst>
+          </p:cNvPr>
+          <p:cNvPicPr>
+            <a:picLocks noChangeAspect="1"/>
+          </p:cNvPicPr>
+          <p:nvPr/>
+        </p:nvPicPr>
+        <p:blipFill>
+          <a:blip r:embed="rId2">
+            <a:extLst>
+              <a:ext uri="{28A0092B-C50C-407E-A947-70E740481C1C}">
+                <a14:useLocalDpi xmlns:a14="http://schemas.microsoft.com/office/drawing/2010/main" val="0"/>
+              </a:ext>
+            </a:extLst>
+          </a:blip>
+          <a:stretch>
+            <a:fillRect/>
+          </a:stretch>
+        </p:blipFill>
+        <p:spPr>
+          <a:xfrm>
+            <a:off x="659061" y="1003852"/>
+            <a:ext cx="3633680" cy="2425148"/>
+          </a:xfrm>
+          <a:prstGeom prst="rect">
+            <a:avLst/>
+          </a:prstGeom>
+        </p:spPr>
+      </p:pic>
+      <p:sp>
+        <p:nvSpPr>
+          <p:cNvPr id="2" name="Rectangle: Rounded Corners 1">
+            <a:extLst>
+              <a:ext uri="{FF2B5EF4-FFF2-40B4-BE49-F238E27FC236}">
+                <a16:creationId xmlns:a16="http://schemas.microsoft.com/office/drawing/2014/main" id="{BCE05324-4962-8FA0-A36F-B76E041DDF6D}"/>
+              </a:ext>
+            </a:extLst>
+          </p:cNvPr>
+          <p:cNvSpPr>
+            <a:spLocks/>
+          </p:cNvSpPr>
+          <p:nvPr/>
+        </p:nvSpPr>
+        <p:spPr>
+          <a:xfrm>
+            <a:off x="520434" y="3810002"/>
+            <a:ext cx="3910934" cy="2883060"/>
+          </a:xfrm>
+          <a:prstGeom prst="roundRect">
+            <a:avLst/>
+          </a:prstGeom>
+          <a:noFill/>
+          <a:effectLst>
+            <a:glow rad="101600">
+              <a:schemeClr val="bg1">
+                <a:lumMod val="65000"/>
+                <a:alpha val="60000"/>
+              </a:schemeClr>
+            </a:glow>
+            <a:innerShdw blurRad="114300">
+              <a:prstClr val="black"/>
+            </a:innerShdw>
+          </a:effectLst>
+        </p:spPr>
+        <p:style>
+          <a:lnRef idx="2">
+            <a:schemeClr val="accent1">
+              <a:shade val="50000"/>
+            </a:schemeClr>
+          </a:lnRef>
+          <a:fillRef idx="1">
+            <a:schemeClr val="accent1"/>
+          </a:fillRef>
+          <a:effectRef idx="0">
+            <a:schemeClr val="accent1"/>
+          </a:effectRef>
+          <a:fontRef idx="minor">
+            <a:schemeClr val="lt1"/>
+          </a:fontRef>
+        </p:style>
+        <p:txBody>
+          <a:bodyPr rtlCol="0" anchor="ctr"/>
+          <a:lstStyle/>
+          <a:p>
+            <a:pPr algn="ctr"/>
+            <a:endParaRPr lang="en-GB" dirty="0"/>
+          </a:p>
+        </p:txBody>
+      </p:sp>
+      <p:pic>
+        <p:nvPicPr>
+          <p:cNvPr id="12" name="Picture 11" descr="A picture containing night, outdoor, sky, landmark&#10;&#10;Description automatically generated">
+            <a:extLst>
+              <a:ext uri="{FF2B5EF4-FFF2-40B4-BE49-F238E27FC236}">
+                <a16:creationId xmlns:a16="http://schemas.microsoft.com/office/drawing/2014/main" id="{95B99FF3-AC02-7522-EB34-A0FDD17511D3}"/>
+              </a:ext>
+            </a:extLst>
+          </p:cNvPr>
+          <p:cNvPicPr>
+            <a:picLocks noChangeAspect="1"/>
+          </p:cNvPicPr>
+          <p:nvPr/>
+        </p:nvPicPr>
+        <p:blipFill>
+          <a:blip r:embed="rId3">
+            <a:extLst>
+              <a:ext uri="{28A0092B-C50C-407E-A947-70E740481C1C}">
+                <a14:useLocalDpi xmlns:a14="http://schemas.microsoft.com/office/drawing/2010/main" val="0"/>
+              </a:ext>
+            </a:extLst>
+          </a:blip>
+          <a:stretch>
+            <a:fillRect/>
+          </a:stretch>
+        </p:blipFill>
+        <p:spPr>
+          <a:xfrm>
+            <a:off x="659061" y="4001383"/>
+            <a:ext cx="3611298" cy="2500297"/>
+          </a:xfrm>
+          <a:prstGeom prst="rect">
+            <a:avLst/>
+          </a:prstGeom>
+        </p:spPr>
+      </p:pic>
+    </p:spTree>
+    <p:extLst>
+      <p:ext uri="{BB962C8B-B14F-4D97-AF65-F5344CB8AC3E}">
+        <p14:creationId xmlns:p14="http://schemas.microsoft.com/office/powerpoint/2010/main" val="2568636719"/>
       </p:ext>
     </p:extLst>
   </p:cSld>
@@ -29883,24 +32819,86 @@
     <we:reference id="WA200003233" version="2.0.0.3" store="WA200003233" storeType="OMEX"/>
   </we:alternateReferences>
   <we:properties>
+    <we:property name="artifactName" value="&quot;Highest Potential Districts&quot;"/>
+    <we:property name="backgroundColor" value="&quot;#FFF&quot;"/>
+    <we:property name="bookmark" value="&quot;H4sIAAAAAAAAA7VW23LTMBD9lY6eM4xvieW+0RQGBiiFdMoD02FW8jpR61hGlktDJ//OSnbaNECTdNq8RJejPWcvWvmW5aqpS1icwBzZITvS+moO5uogZANWPVzLh0ERyITnGcQyyGUgeUwoXVulq4Yd3jILZor2XDUtlM4gLX6/GDAoy1OYulkBZYMDVqNpdAWl+o0dmLasaXE5YHhTl9qAMzmxYNGZvSY4zUlK+MoxgrTqGicobbf6FWttbD8fSh7EmCUyG4ZRAjDCIqEzTbfrZW7HO1IvbKwrC6oiAW4tFmmKMaGGMspwBMOAR269UdW07F25P3u2qF34mhnQP8VJXBKjs0Nu9lF34LnOHWym8hwrtlzSrhAiiYoixTQVIU8g45ncymPxxgp9sx9TkOQhEfEY8jgWQZhgETpooUrbOy0Wb25qQ5mk/HZMZ7o+IZoO4yDnqwRFA/bW6LkH9xXVtOJni2ZBB5wdbDrkLZusNmj8ZTV4zFLuTFRWWUKyY9VYo6Sltc7/YDm4Q16tIz/g4uATQtMS9xqa6nKCJcXJU4x12c69rA2RujUSv2JxP/FKXOxOjaZCfqCmYbTeiygUlgQkns8mR3O08ETHyqzqNtqMSK9yVxVXmyreqekMG/vjVFsk76lGKMfET/lih0Of7877aC1W26JK57/N0KnyYapyZXtV7zfi1TxzJL10ECX+//hdcS3d76LrH2ukO4n52/tHNA3YTP8aG6TWlPdF19+K1/k1VBJdPPEJaf13ve6Q4U1FLgqPNgrpgzKegbGbzUI/a6U+2SWX+a7JE/ByrXOPycmpNovdK22v5F74OyJHSRyGPIykTCMRJyFA8hJdHmOZC17EUTYsOE+jNMnCl+nyI55yet+ykB6wEAIQQSJewiMe8BCjIC4w4wUGI1mE6VYeNadvg/14IM0iKQpAeq+GgeACk+2R25vHU92j2Rzp68YNdGubGiSeQtW1xborJ4UeR7cfqtxdRj/2L+RHRU9lJ+ocyta/D+5bqPOHdKq+z+1yoCvU5R/mcA90vAkAAA==&quot;"/>
+    <we:property name="creatorSessionId" value="&quot;78aeef5c-1484-48d5-b251-097e2152e7b8&quot;"/>
+    <we:property name="creatorTenantId" value="&quot;ebec9c67-55a5-439b-bb63-b3091205e550&quot;"/>
+    <we:property name="creatorUserId" value="&quot;100320028783E496&quot;"/>
+    <we:property name="datasetId" value="&quot;b140e74d-f57c-4169-9277-6930aac3a6e2&quot;"/>
+    <we:property name="embedUrl" value="&quot;/reportEmbed?reportId=e70feea7-9ed8-4355-bed3-d5381d601e01&amp;config=eyJjbHVzdGVyVXJsIjoiaHR0cHM6Ly9XQUJJLUlORElBLUNFTlRSQUwtQS1QUklNQVJZLXJlZGlyZWN0LmFuYWx5c2lzLndpbmRvd3MubmV0IiwiZW1iZWRGZWF0dXJlcyI6eyJtb2Rlcm5FbWJlZCI6dHJ1ZSwidXNhZ2VNZXRyaWNzVk5leHQiOnRydWV9fQ%3D%3D&amp;disableSensitivityBanner=true&quot;"/>
+    <we:property name="initialStateBookmark" value="&quot;H4sIAAAAAAAAA7VWXU/bMBT9K8jP1ZSvNglvUJg2MaADxB4mhK6dm9Y0jTPHYXSo/33XTgpdt9EWQV8aXx/7nPvhaz+yTNZVAfMzmCHbZ4dKTWegp3s+67Gys52fn5weXJzcnh2cHpNZVUaqsmb7j8yAHqO5lnUDhd2BjN9vegyKYgRjO8qhqLHHKtS1KqGQv7AF05TRDS56DB+qQmmwW14aMGi3vSc4jYnb/xASIwgj7/EShWmtF1gpbbpxXyReiGkk0r4fRAADzCNaU7ezTuZmvCV1woaqNCBLEmBtIY9jDAnVF0GKA+h7SWDttSzHRefK89qreWXjVU+A/ilO/I4Y7T7kZhdmC56pzMImMsuwZIsFzXLOoyDPY4xj7icRpEkqNvIYfDBcPezG5EWZT0RJCFkYcs+PMPctNJeF6Zzm8+OHSlMmKb8t05WqzoimxVjI9TJBQY991GrmwF0J1Q3/0aCe0wK7D9Yt8pFdLifo++vy46WdMrtFaaQhJDuStdFSGLK1/nuL3hNyuoo8wfneKULdEPcKmuryEguKk6MYqqKZOVlrIlWjBV5g/jxwSmzsRlpRIf+hpmZk70TkEgsCEs+5zlAfzh3RkdTLug3WI9Kp3FbFdF3FJzmeYG1uR8ogeU81QjkmfsoX2++7fLfeByux2hRVWv9tglaVC1OZSdOp+rwWr/qNI+mkAy/w/8ufimthfzdt/1gh3UrM396/oKnHJurnUCO1pqwruu5UHGT3UAq08cRXpPXf9bpFhtcV2Si82CiEC8pwAtqsNwv1ppX6apds5tsmT8C7lc49JCfHSs+3r7SdknvjzogYRKHvJ34gRBzwMPIBovfo8hiKjCd5GKT9PEniII5S/326/CCJE7rfUp8uMB884F7E38OjxEt8DLwwxzTJ0RuI3I838sgZvQ1244E4DQTPAem+6ns84RhtjtzOPI7qGc1mSK8b+6EaU1cgcARl2xartpwkOhydfigzexjdt7shv0i6KltR11A07n6wb6HWH9Ipuz73wgL7Qlo2Ovr9BnF7qP6sCQAA&quot;"/>
+    <we:property name="isFiltersActionButtonVisible" value="true"/>
+    <we:property name="isFooterCollapsed" value="true"/>
+    <we:property name="pageDisplayName" value="&quot;Districts with Highest Potential&quot;"/>
+    <we:property name="pageName" value="&quot;ReportSection5c803e94c95124aa6ef4&quot;"/>
     <we:property name="pptInsertionSessionID" value="&quot;22AE5732-23BE-41D2-BC1E-147A5291F598&quot;"/>
-    <we:property name="reportUrl" value="&quot;/groups/me/reports/e70feea7-9ed8-4355-bed3-d5381d601e01/ReportSection5c803e94c95124aa6ef4?ctid=ebec9c67-55a5-439b-bb63-b3091205e550&amp;pbi_source=shareVisual&amp;visual=04d1ff783ad33b014ef1&amp;height=542.53&amp;width=351.59&amp;bookmarkGuid=3c3526b7-872b-4a19-ad9b-2ad392b6b3c5&amp;fromEntryPoint=sharevisual&quot;"/>
-    <we:property name="artifactName" value="&quot;Highest Potential Districts&quot;"/>
+    <we:property name="reportEmbeddedTime" value="&quot;2023-05-18T18:14:09.557Z&quot;"/>
     <we:property name="reportName" value="&quot;Telangana_Tourism_ResumeChallenge&quot;"/>
     <we:property name="reportState" value="&quot;CONNECTED&quot;"/>
-    <we:property name="embedUrl" value="&quot;/reportEmbed?reportId=e70feea7-9ed8-4355-bed3-d5381d601e01&amp;config=eyJjbHVzdGVyVXJsIjoiaHR0cHM6Ly9XQUJJLUlORElBLUNFTlRSQUwtQS1QUklNQVJZLXJlZGlyZWN0LmFuYWx5c2lzLndpbmRvd3MubmV0IiwiZW1iZWRGZWF0dXJlcyI6eyJtb2Rlcm5FbWJlZCI6dHJ1ZSwidXNhZ2VNZXRyaWNzVk5leHQiOnRydWV9fQ%3D%3D&amp;disableSensitivityBanner=true&quot;"/>
-    <we:property name="pageName" value="&quot;ReportSection5c803e94c95124aa6ef4&quot;"/>
-    <we:property name="pageDisplayName" value="&quot;Districts with Highest Potential&quot;"/>
-    <we:property name="datasetId" value="&quot;b140e74d-f57c-4169-9277-6930aac3a6e2&quot;"/>
+    <we:property name="reportUrl" value="&quot;/groups/me/reports/e70feea7-9ed8-4355-bed3-d5381d601e01/ReportSection5c803e94c95124aa6ef4?ctid=ebec9c67-55a5-439b-bb63-b3091205e550&amp;pbi_source=shareVisual&amp;visual=04d1ff783ad33b014ef1&amp;height=542.53&amp;width=351.59&amp;bookmarkGuid=3c3526b7-872b-4a19-ad9b-2ad392b6b3c5&amp;fromEntryPoint=sharevisual&quot;"/>
+  </we:properties>
+  <we:bindings/>
+  <we:snapshot xmlns:r="http://schemas.openxmlformats.org/officeDocument/2006/relationships" r:embed="rId1"/>
+</we:webextension>
+</file>
+
+<file path=ppt/webextensions/webextension34.xml><?xml version="1.0" encoding="utf-8"?>
+<we:webextension xmlns:we="http://schemas.microsoft.com/office/webextensions/webextension/2010/11" id="{0D0BAEB1-F635-492F-8F9E-EA0BAAD926C7}">
+  <we:reference id="wa200003233" version="2.0.0.3" store="en-US" storeType="OMEX"/>
+  <we:alternateReferences>
+    <we:reference id="WA200003233" version="2.0.0.3" store="WA200003233" storeType="OMEX"/>
+  </we:alternateReferences>
+  <we:properties>
+    <we:property name="artifactName" value="&quot;Top 3 Months by Visitors&quot;"/>
     <we:property name="backgroundColor" value="&quot;#FFF&quot;"/>
-    <we:property name="bookmark" value="&quot;H4sIAAAAAAAAA7VW23LTMBD9lY6eM4xvieW+0RQGBiiFdMoD02FW8jpR61hGlktDJ//OSnbaNECTdNq8RJejPWcvWvmW5aqpS1icwBzZITvS+moO5uogZANWPVzLh0ERyITnGcQyyGUgeUwoXVulq4Yd3jILZor2XDUtlM4gLX6/GDAoy1OYulkBZYMDVqNpdAWl+o0dmLasaXE5YHhTl9qAMzmxYNGZvSY4zUlK+MoxgrTqGicobbf6FWttbD8fSh7EmCUyG4ZRAjDCIqEzTbfrZW7HO1IvbKwrC6oiAW4tFmmKMaGGMspwBMOAR269UdW07F25P3u2qF34mhnQP8VJXBKjs0Nu9lF34LnOHWym8hwrtlzSrhAiiYoixTQVIU8g45ncymPxxgp9sx9TkOQhEfEY8jgWQZhgETpooUrbOy0Wb25qQ5mk/HZMZ7o+IZoO4yDnqwRFA/bW6LkH9xXVtOJni2ZBB5wdbDrkLZusNmj8ZTV4zFLuTFRWWUKyY9VYo6Sltc7/YDm4Q16tIz/g4uATQtMS9xqa6nKCJcXJU4x12c69rA2RujUSv2JxP/FKXOxOjaZCfqCmYbTeiygUlgQkns8mR3O08ETHyqzqNtqMSK9yVxVXmyreqekMG/vjVFsk76lGKMfET/lih0Of7877aC1W26JK57/N0KnyYapyZXtV7zfi1TxzJL10ECX+//hdcS3d76LrH2ukO4n52/tHNA3YTP8aG6TWlPdF19+K1/k1VBJdPPEJaf13ve6Q4U1FLgqPNgrpgzKegbGbzUI/a6U+2SWX+a7JE/ByrXOPycmpNovdK22v5F74OyJHSRyGPIykTCMRJyFA8hJdHmOZC17EUTYsOE+jNMnCl+nyI55yet+ykB6wEAIQQSJewiMe8BCjIC4w4wUGI1mE6VYeNadvg/14IM0iKQpAeq+GgeACk+2R25vHU92j2Rzp68YNdGubGiSeQtW1xborJ4UeR7cfqtxdRj/2L+RHRU9lJ+ocyta/D+5bqPOHdKq+z+1yoCvU5R/mcA90vAkAAA==&quot;"/>
-    <we:property name="initialStateBookmark" value="&quot;H4sIAAAAAAAAA7VWXU/bMBT9K8jP1ZSvNglvUJg2MaADxB4mhK6dm9Y0jTPHYXSo/33XTgpdt9EWQV8aXx/7nPvhaz+yTNZVAfMzmCHbZ4dKTWegp3s+67Gys52fn5weXJzcnh2cHpNZVUaqsmb7j8yAHqO5lnUDhd2BjN9vegyKYgRjO8qhqLHHKtS1KqGQv7AF05TRDS56DB+qQmmwW14aMGi3vSc4jYnb/xASIwgj7/EShWmtF1gpbbpxXyReiGkk0r4fRAADzCNaU7ezTuZmvCV1woaqNCBLEmBtIY9jDAnVF0GKA+h7SWDttSzHRefK89qreWXjVU+A/ilO/I4Y7T7kZhdmC56pzMImMsuwZIsFzXLOoyDPY4xj7icRpEkqNvIYfDBcPezG5EWZT0RJCFkYcs+PMPctNJeF6Zzm8+OHSlMmKb8t05WqzoimxVjI9TJBQY991GrmwF0J1Q3/0aCe0wK7D9Yt8pFdLifo++vy46WdMrtFaaQhJDuStdFSGLK1/nuL3hNyuoo8wfneKULdEPcKmuryEguKk6MYqqKZOVlrIlWjBV5g/jxwSmzsRlpRIf+hpmZk70TkEgsCEs+5zlAfzh3RkdTLug3WI9Kp3FbFdF3FJzmeYG1uR8ogeU81QjkmfsoX2++7fLfeByux2hRVWv9tglaVC1OZSdOp+rwWr/qNI+mkAy/w/8ufimthfzdt/1gh3UrM396/oKnHJurnUCO1pqwruu5UHGT3UAq08cRXpPXf9bpFhtcV2Si82CiEC8pwAtqsNwv1ppX6apds5tsmT8C7lc49JCfHSs+3r7SdknvjzogYRKHvJ34gRBzwMPIBovfo8hiKjCd5GKT9PEniII5S/326/CCJE7rfUp8uMB884F7E38OjxEt8DLwwxzTJ0RuI3I838sgZvQ1244E4DQTPAem+6ns84RhtjtzOPI7qGc1mSK8b+6EaU1cgcARl2xartpwkOhydfigzexjdt7shv0i6KltR11A07n6wb6HWH9Ipuz73wgL7Qlo2Ovr9BnF7qP6sCQAA&quot;"/>
-    <we:property name="isFooterCollapsed" value="true"/>
-    <we:property name="isFiltersActionButtonVisible" value="true"/>
-    <we:property name="reportEmbeddedTime" value="&quot;2023-05-18T18:14:09.557Z&quot;"/>
+    <we:property name="bookmark" value="&quot;H4sIAAAAAAAAA+1XW2/bNhT+KwGfjcG6kVLeWncDil6WNkH2MOThkDyK2ciiSlFZ3MD/vYeSnHjCartDsq3A/GKJ/Mjzne9cRN4zbdqmgvV7WCE7ZS+tvVmBuzmJ2IzVfx7jheBxFBWiKEQezTMsUyCUbbyxdctO75kHd43+0rQdVGFDGvz9asagqs7gOryVULU4Yw261tZQmS84gGnKuw43M4Z3TWUdhC3PPXgM294SnN6JSvRTQhZBeXOL56j8MPoRG+v8+J4Xc1lKLTQIjkrGiouU1rTDbE/zMD4Y7YktbO3B1EQgjMWEUFkelYrLSBaQoOwJtqa+rkZXHtderJsgX7sE+ied5CeyGPYhN0fVA3hldYAtjdZYs82GZrNCCdQFlzJJQEkoslQetOPxzkt7932WYpGJVIiUQxRpxVWa5fFzeMSzmCTW+Ry4zOKiTAoon8ejuYp0kmVJSboJlZeC5+I5PMp5XmIpYlTFXOtUx3nOA7Q0lR/TRa5/vmsc1QBVxmDnwjbvycyACZDLbWrHM/aLs6sePNZi28nPHbo1LQj7YDsg79n5doKeP2wf9u20ClvU3nhCsneU0suWRgbf55vZA+5mF/cG1yfvENqOLO+gqZ7PsSKVegMLW3WrntSEou2cwo9YPr70PIJyZ85SA9jlQoMjg9JgpVkw8qvT6F6ueyuvjNsWezwVY6R4LIWbKYUL66E6obww3lLYKLZknOLETpM+zoPf8Y5K+9Wk1b8tMRDq5am18SOh1xOd2qdUsGcNssJvr33Ip034XQ3NdsfiUUymjn+Lzowt7R8Lh9TC9ZhkYw280LdQKxqd2j8ukn+dn4eCOqUTvN/bESS4xRKcnzYF+6Rp+fecCbEevoGE+rTzYVuQe9fWrY9PrGPDedXXQiFlnMSR0CJNBCRyLjP1X+15erdKX5nWO6P8v9L19FTVLZsfrfEdkvR5W98+Gf/x7vfg/R5O/7fAH6sFHhPTq4PnwlRjqRMsEqCjNd0PIjjipGtWdD/6vvNnKTmdoznXnGd09IySOONPb6c39YhmK6QbXniwnW8bUHgG9VDvzSCYwR5HaQ21DonWP/d9/62hD8BA6hKqru964T44+EM8zVjAxywYPkmbr2So3+vADgAA&quot;"/>
+    <we:property name="creatorSessionId" value="&quot;4cbf91af-7019-4c8e-bb85-1592928e7dd5&quot;"/>
     <we:property name="creatorTenantId" value="&quot;ebec9c67-55a5-439b-bb63-b3091205e550&quot;"/>
     <we:property name="creatorUserId" value="&quot;100320028783E496&quot;"/>
-    <we:property name="creatorSessionId" value="&quot;78aeef5c-1484-48d5-b251-097e2152e7b8&quot;"/>
+    <we:property name="datasetId" value="&quot;b140e74d-f57c-4169-9277-6930aac3a6e2&quot;"/>
+    <we:property name="embedUrl" value="&quot;/reportEmbed?reportId=e70feea7-9ed8-4355-bed3-d5381d601e01&amp;config=eyJjbHVzdGVyVXJsIjoiaHR0cHM6Ly9XQUJJLUlORElBLUNFTlRSQUwtQS1QUklNQVJZLXJlZGlyZWN0LmFuYWx5c2lzLndpbmRvd3MubmV0IiwiZW1iZWRGZWF0dXJlcyI6eyJtb2Rlcm5FbWJlZCI6dHJ1ZSwidXNhZ2VNZXRyaWNzVk5leHQiOnRydWV9fQ%3D%3D&amp;disableSensitivityBanner=true&quot;"/>
+    <we:property name="initialStateBookmark" value="&quot;H4sIAAAAAAAAA+1X227jNhD9lYDPRmFJFiXlLevdAkWaS5MgfSiCYkiOYm5kUaWoNG7gf++QkhND6NreImm7QP1ikTrknDlzEfnMlG6bClbnsER2zD4Y87AE+3AUsQmrh7mLi9Ozk6vTX89Pzj7RtGmcNnXLjp+ZA3uP7la3HVR+B5r85W7CoKou4d6PSqhanLAGbWtqqPQf2IPplbMdricMn5rKWPBbXjtw6Ld9JDiNyXb0XUIWQTr9iNcoXT97hY2xbhjnxVSUQmUKMo5SxJJnM1rT9m8Dzf14bzQQm5vaga6JgJ+LCSHTPColF5EoIEERCLa6vq8GV17X3qwar1e7APonncRnsuj3ITcHmT14aZSHLbRSWLP1mt6mhcxQFVyIJAEpoEhnYq8dh09OmKevsxRnaTbLshmHKFKSy1max+/hEU9jkljlU+AijYsyKaB8H4+mMlJJmiYl6ZbJvMx4nr2HRznPSyyzGGUxVWqm4jznHlrqyg3pIlafnhpLNUCV0du5Mc05mekxHnK7Se14wr63ZhnAQ/G1nfitQ7uiBX4fbHvkM7vevKDnnzYPu3Za+i1qpx0h2Rml9KKlmd736XrygnvYxp3i6ugMoe3I8haa6vkaK1IpGJibqlsGUiOKprMSr7B8HQQeXrlLa6gBbHOhyYFBqbFSzBu5sArth1Ww8lHbTbHHYzEGiodSeBhTuDEOqiPKC+0MhY1iS8YpTuw4CXHu/Y63VNqtJq3+eYGeUJCnVtoNhH4Y6dS+pYKBNYgKv7z2JZ/W/nfXN9stiwcxGTv+JToTtjC/zy1SC1dDkg01cKIeoZY0O7Z/WCT/Oj/3BXVMx3u/syMIsPMFWDduCuZN0/LvOeNj3X8DCfV568M2J/fujV0dnliHhvMu1EIhRJzEUaayWZJBIqYilf/Vnqe2q/Sjbp3V0v0rXU+NVd2w+dYa3z5J37f17ZLxH+9+L97v4PR/C/y2WuAhMb3bey6cKSxVgkUCdLSm+0EEB5x09ZLuR193/iwFp3M054rzlI6eURKn/O3tBFOvaLZEuuH5B9O5tgGJl1D39d70gmkMOEprqJVPtPAc+v6Pmj4APalbqLrQ9fx9sPeHeOqhgHcs8LfETQXT70+Wm9KqsA4AAA==&quot;"/>
+    <we:property name="isFiltersActionButtonVisible" value="true"/>
+    <we:property name="isFooterCollapsed" value="true"/>
+    <we:property name="pageDisplayName" value="&quot;Cultural / Corporate Events&quot;"/>
+    <we:property name="pageName" value="&quot;ReportSection890bfbd7da76ecb2c674&quot;"/>
+    <we:property name="pptInsertionSessionID" value="&quot;AEBF5E48-2C9F-40BF-A5FE-0BAEACD3C970&quot;"/>
+    <we:property name="reportEmbeddedTime" value="&quot;2023-05-19T04:18:20.169Z&quot;"/>
+    <we:property name="reportName" value="&quot;Telangana_Tourism_ResumeChallenge&quot;"/>
+    <we:property name="reportState" value="&quot;CONNECTED&quot;"/>
+    <we:property name="reportUrl" value="&quot;/groups/me/reports/e70feea7-9ed8-4355-bed3-d5381d601e01/ReportSection890bfbd7da76ecb2c674?ctid=ebec9c67-55a5-439b-bb63-b3091205e550&amp;pbi_source=shareVisual&amp;visual=868fef72ec90dd4d2886&amp;height=281.68&amp;width=344.91&amp;bookmarkGuid=48aa5d20-917b-4098-bcfe-768f00d46a3e&amp;fromEntryPoint=sharevisual&quot;"/>
+  </we:properties>
+  <we:bindings/>
+  <we:snapshot xmlns:r="http://schemas.openxmlformats.org/officeDocument/2006/relationships" r:embed="rId1"/>
+</we:webextension>
+</file>
+
+<file path=ppt/webextensions/webextension35.xml><?xml version="1.0" encoding="utf-8"?>
+<we:webextension xmlns:we="http://schemas.microsoft.com/office/webextensions/webextension/2010/11" id="{CFB574FD-63F9-4FEA-A4C5-6E9A7BCAC698}">
+  <we:reference id="wa200003233" version="2.0.0.3" store="en-US" storeType="OMEX"/>
+  <we:alternateReferences>
+    <we:reference id="WA200003233" version="2.0.0.3" store="WA200003233" storeType="OMEX"/>
+  </we:alternateReferences>
+  <we:properties>
+    <we:property name="artifactName" value="&quot;Top 3 Districts by Visitors&quot;"/>
+    <we:property name="backgroundColor" value="&quot;#FFF&quot;"/>
+    <we:property name="bookmark" value="&quot;H4sIAAAAAAAAA+1XW2/bNhT+KwGfjcG6UVLeWncDil6WNkH2MOThkDyK2ciiSlFZ3MD/vYeUnHjCartDsq3A/GKK/Mjzne9cRN0zpbu2hvV7WCE7ZS+NuVmBvTmJ2Iw1f56bZwgxL/NCKJDJPIU8jQllWqdN07HTe+bAXqO71F0PtT+QJn+/mjGo6zO49k8V1B3OWIu2Mw3U+gsOYFpytsfNjOFdWxsL/shzBw79sbcEp2eiEv2UkEWQTt/iOUo3zH7E1lg3PhflXFRC5QpyjlLEkucp7emG1UDzMN4bDcQWpnGgGyLg52JCyKyIKslFJEpIUASCnW6u69GVx70X69bL1y2B/kkn8Yks+nPIzVF1D14Z5WFLrRQ2bLOh1ayUOaqSC5EkIAWUWSoO2nF454S5+z5LcZ7laZ6nHKJISS7TrIifwyOexSSxKubARRaXVVJC9TwezWWkkixLKtItl0WV8yJ/Do8KXlRY5THKcq5UquKi4B5a6dqN6SLWP9+1lmqAKmOwc2Ha92RmwHjI5Ta14xn7xZpVAI+12PXic492TRv8OdgNyHt2vl2g8YftYN9JK39E47QjJHtHKb3saGbwfb6ZPeBudnFvcH3yDqHryfIOmur5HGtSKRhYmLpfBVITiqa3Ej9i9fgQeHjlzqyhBrDLhSZHBpXGWjFv5Fer0L5cByuvtN0WezwVY6R4LIWbKYUL46A+obzQzlDYKLZknOLETpMQ58HveEel/WrS7t+W6AkFeRql3Ujo9USn7ikVDKxB1PjtvQ/5tPG/q6HZ7lg8isnU8W/RmbGl+WNhkVq4GpNsrIEX6hYaSbNT+8dF8q/z81BQp3S893s7ggC7WIJ106ZgnjQt/54zPtbDO5BQn3ZebAty79rY9fGJdWw4rw72w1KIOImjXOVpkkMi5iKT/9V+qHYr+JXunNXS/SsdUU0V37L50ZriIUmfty3uk/Ef74wP3u/h9H97/LHa4zExvQqlkSqsVIJlAnS1pu+DCI646eoVfR993/2zEpzu0ZwrzjO6ekZJnPGntxNMPaLZCukLzw9M77oWJJ5BM9R0O4iiMeAodaFRPpnCOPT2t5qa/EDqEuo+dDb/PTj4Qzz1WKTHbBjk3nwFBnQihcAOAAA=&quot;"/>
+    <we:property name="creatorSessionId" value="&quot;a1291ded-fd3a-4b36-9b8d-f6615a98a681&quot;"/>
+    <we:property name="creatorTenantId" value="&quot;ebec9c67-55a5-439b-bb63-b3091205e550&quot;"/>
+    <we:property name="creatorUserId" value="&quot;100320028783E496&quot;"/>
+    <we:property name="datasetId" value="&quot;b140e74d-f57c-4169-9277-6930aac3a6e2&quot;"/>
+    <we:property name="embedUrl" value="&quot;/reportEmbed?reportId=e70feea7-9ed8-4355-bed3-d5381d601e01&amp;config=eyJjbHVzdGVyVXJsIjoiaHR0cHM6Ly9XQUJJLUlORElBLUNFTlRSQUwtQS1QUklNQVJZLXJlZGlyZWN0LmFuYWx5c2lzLndpbmRvd3MubmV0IiwiZW1iZWRGZWF0dXJlcyI6eyJtb2Rlcm5FbWJlZCI6dHJ1ZSwidXNhZ2VNZXRyaWNzVk5leHQiOnRydWV9fQ%3D%3D&amp;disableSensitivityBanner=true&quot;"/>
+    <we:property name="initialStateBookmark" value="&quot;H4sIAAAAAAAAA+1X227jNhD9lYDPRmFJFiXlLevdAkWaS5MgfSiCYkiOYm5kUaWoNG7gf++QkhND6NreImm7QP1ikTrknDlzEfnMlG6bClbnsER2zD4Y87AE+3AUsQmrh7mLi9Ozk6vTX89Pzj7RtGmcNnXLjp+ZA3uP7la3HVR+B5r85W7CoKou4d6PSqhanLAGbWtqqPQf2IPplbMdricMn5rKWPBbXjtw6Ld9JDiNyXb0XUIWQTr9iNcoXT97hY2xbhjnxVSUQmUKMo5SxJJnM1rT9m8Dzf14bzQQm5vaga6JgJ+LCSHTPColF5EoIEERCLa6vq8GV17X3qwar1e7APonncRnsuj3ITcHmT14aZSHLbRSWLP1mt6mhcxQFVyIJAEpoEhnYq8dh09OmKevsxRnaTbLshmHKFKSy1max+/hEU9jkljlU+AijYsyKaB8H4+mMlJJmiYl6ZbJvMx4nr2HRznPSyyzGGUxVWqm4jznHlrqyg3pIlafnhpLNUCV0du5Mc05mekxHnK7Se14wr63ZhnAQ/G1nfitQ7uiBX4fbHvkM7vevKDnnzYPu3Za+i1qpx0h2Rml9KKlmd736XrygnvYxp3i6ugMoe3I8haa6vkaK1IpGJibqlsGUiOKprMSr7B8HQQeXrlLa6gBbHOhyYFBqbFSzBu5sArth1Ww8lHbTbHHYzEGiodSeBhTuDEOqiPKC+0MhY1iS8YpTuw4CXHu/Y63VNqtJq3+eYGeUJCnVtoNhH4Y6dS+pYKBNYgKv7z2JZ/W/nfXN9stiwcxGTv+JToTtjC/zy1SC1dDkg01cKIeoZY0O7Z/WCT/Oj/3BXVMx3u/syMIsPMFWDduCuZN0/LvOeNj3X8DCfV568M2J/fujV0dnliHhvNubz8shIiTOMpUNksySMRUpPK/2g/VdgV/1K2zWrp/pSOqseIbNt9aU9wn6fu2xV0y/uOd8cX7HZz+b4/fVns8JKZ3oTRmCkuVYJEAHa3pfhDBASddvaT70dedP0vB6RzNueI8paNnlMQpf3s7wdQrmi2Rbnj+wXSubUDiJdR9TTe9KBoDjlIXauWTKTyH3v6jpibfk7qFqgudzd8He3+Ipx6KdMcCf0vcVCn9/gQ///i2sA4AAA==&quot;"/>
+    <we:property name="isFiltersActionButtonVisible" value="true"/>
+    <we:property name="isFooterCollapsed" value="true"/>
+    <we:property name="pageDisplayName" value="&quot;Cultural / Corporate Events&quot;"/>
+    <we:property name="pageName" value="&quot;ReportSection890bfbd7da76ecb2c674&quot;"/>
+    <we:property name="pptInsertionSessionID" value="&quot;AEBF5E48-2C9F-40BF-A5FE-0BAEACD3C970&quot;"/>
+    <we:property name="reportEmbeddedTime" value="&quot;2023-05-19T04:20:05.331Z&quot;"/>
+    <we:property name="reportName" value="&quot;Telangana_Tourism_ResumeChallenge&quot;"/>
+    <we:property name="reportState" value="&quot;CONNECTED&quot;"/>
+    <we:property name="reportUrl" value="&quot;/groups/me/reports/e70feea7-9ed8-4355-bed3-d5381d601e01/ReportSection890bfbd7da76ecb2c674?ctid=ebec9c67-55a5-439b-bb63-b3091205e550&amp;pbi_source=shareVisual&amp;visual=9bb23217d7437a3b0b5c&amp;height=281.68&amp;width=344.91&amp;bookmarkGuid=9aa0cc82-f682-4fd8-8918-008e8690c372&amp;fromEntryPoint=sharevisual&quot;"/>
   </we:properties>
   <we:bindings/>
   <we:snapshot xmlns:r="http://schemas.openxmlformats.org/officeDocument/2006/relationships" r:embed="rId1"/>

</xml_diff>